<commit_message>
change include folder for 3rd
</commit_message>
<xml_diff>
--- a/docs/netplus.pptx
+++ b/docs/netplus.pptx
@@ -5,7 +5,7 @@
     <p:sldMasterId id="2147483648" r:id="rId1"/>
   </p:sldMasterIdLst>
   <p:notesMasterIdLst>
-    <p:notesMasterId r:id="rId9"/>
+    <p:notesMasterId r:id="rId11"/>
   </p:notesMasterIdLst>
   <p:sldIdLst>
     <p:sldId id="256" r:id="rId2"/>
@@ -15,6 +15,8 @@
     <p:sldId id="260" r:id="rId6"/>
     <p:sldId id="261" r:id="rId7"/>
     <p:sldId id="262" r:id="rId8"/>
+    <p:sldId id="263" r:id="rId9"/>
+    <p:sldId id="264" r:id="rId10"/>
   </p:sldIdLst>
   <p:sldSz cx="12192000" cy="6858000"/>
   <p:notesSz cx="6858000" cy="9144000"/>
@@ -203,7 +205,7 @@
           <a:p>
             <a:fld id="{2B2CA1C0-8B76-472E-BA93-84788ECC6D2D}" type="datetimeFigureOut">
               <a:rPr lang="zh-CN" altLang="en-US" smtClean="0"/>
-              <a:t>2021/2/28</a:t>
+              <a:t>2021/3/1</a:t>
             </a:fld>
             <a:endParaRPr lang="zh-CN" altLang="en-US"/>
           </a:p>
@@ -704,7 +706,7 @@
           <a:p>
             <a:fld id="{2CC4E832-946B-4973-950A-D08FEA49716C}" type="datetimeFigureOut">
               <a:rPr lang="zh-CN" altLang="en-US" smtClean="0"/>
-              <a:t>2021/2/28</a:t>
+              <a:t>2021/3/1</a:t>
             </a:fld>
             <a:endParaRPr lang="zh-CN" altLang="en-US"/>
           </a:p>
@@ -904,7 +906,7 @@
           <a:p>
             <a:fld id="{2CC4E832-946B-4973-950A-D08FEA49716C}" type="datetimeFigureOut">
               <a:rPr lang="zh-CN" altLang="en-US" smtClean="0"/>
-              <a:t>2021/2/28</a:t>
+              <a:t>2021/3/1</a:t>
             </a:fld>
             <a:endParaRPr lang="zh-CN" altLang="en-US"/>
           </a:p>
@@ -1114,7 +1116,7 @@
           <a:p>
             <a:fld id="{2CC4E832-946B-4973-950A-D08FEA49716C}" type="datetimeFigureOut">
               <a:rPr lang="zh-CN" altLang="en-US" smtClean="0"/>
-              <a:t>2021/2/28</a:t>
+              <a:t>2021/3/1</a:t>
             </a:fld>
             <a:endParaRPr lang="zh-CN" altLang="en-US"/>
           </a:p>
@@ -1314,7 +1316,7 @@
           <a:p>
             <a:fld id="{2CC4E832-946B-4973-950A-D08FEA49716C}" type="datetimeFigureOut">
               <a:rPr lang="zh-CN" altLang="en-US" smtClean="0"/>
-              <a:t>2021/2/28</a:t>
+              <a:t>2021/3/1</a:t>
             </a:fld>
             <a:endParaRPr lang="zh-CN" altLang="en-US"/>
           </a:p>
@@ -1590,7 +1592,7 @@
           <a:p>
             <a:fld id="{2CC4E832-946B-4973-950A-D08FEA49716C}" type="datetimeFigureOut">
               <a:rPr lang="zh-CN" altLang="en-US" smtClean="0"/>
-              <a:t>2021/2/28</a:t>
+              <a:t>2021/3/1</a:t>
             </a:fld>
             <a:endParaRPr lang="zh-CN" altLang="en-US"/>
           </a:p>
@@ -1858,7 +1860,7 @@
           <a:p>
             <a:fld id="{2CC4E832-946B-4973-950A-D08FEA49716C}" type="datetimeFigureOut">
               <a:rPr lang="zh-CN" altLang="en-US" smtClean="0"/>
-              <a:t>2021/2/28</a:t>
+              <a:t>2021/3/1</a:t>
             </a:fld>
             <a:endParaRPr lang="zh-CN" altLang="en-US"/>
           </a:p>
@@ -2273,7 +2275,7 @@
           <a:p>
             <a:fld id="{2CC4E832-946B-4973-950A-D08FEA49716C}" type="datetimeFigureOut">
               <a:rPr lang="zh-CN" altLang="en-US" smtClean="0"/>
-              <a:t>2021/2/28</a:t>
+              <a:t>2021/3/1</a:t>
             </a:fld>
             <a:endParaRPr lang="zh-CN" altLang="en-US"/>
           </a:p>
@@ -2415,7 +2417,7 @@
           <a:p>
             <a:fld id="{2CC4E832-946B-4973-950A-D08FEA49716C}" type="datetimeFigureOut">
               <a:rPr lang="zh-CN" altLang="en-US" smtClean="0"/>
-              <a:t>2021/2/28</a:t>
+              <a:t>2021/3/1</a:t>
             </a:fld>
             <a:endParaRPr lang="zh-CN" altLang="en-US"/>
           </a:p>
@@ -2528,7 +2530,7 @@
           <a:p>
             <a:fld id="{2CC4E832-946B-4973-950A-D08FEA49716C}" type="datetimeFigureOut">
               <a:rPr lang="zh-CN" altLang="en-US" smtClean="0"/>
-              <a:t>2021/2/28</a:t>
+              <a:t>2021/3/1</a:t>
             </a:fld>
             <a:endParaRPr lang="zh-CN" altLang="en-US"/>
           </a:p>
@@ -2841,7 +2843,7 @@
           <a:p>
             <a:fld id="{2CC4E832-946B-4973-950A-D08FEA49716C}" type="datetimeFigureOut">
               <a:rPr lang="zh-CN" altLang="en-US" smtClean="0"/>
-              <a:t>2021/2/28</a:t>
+              <a:t>2021/3/1</a:t>
             </a:fld>
             <a:endParaRPr lang="zh-CN" altLang="en-US"/>
           </a:p>
@@ -3130,7 +3132,7 @@
           <a:p>
             <a:fld id="{2CC4E832-946B-4973-950A-D08FEA49716C}" type="datetimeFigureOut">
               <a:rPr lang="zh-CN" altLang="en-US" smtClean="0"/>
-              <a:t>2021/2/28</a:t>
+              <a:t>2021/3/1</a:t>
             </a:fld>
             <a:endParaRPr lang="zh-CN" altLang="en-US"/>
           </a:p>
@@ -3373,7 +3375,7 @@
           <a:p>
             <a:fld id="{2CC4E832-946B-4973-950A-D08FEA49716C}" type="datetimeFigureOut">
               <a:rPr lang="zh-CN" altLang="en-US" smtClean="0"/>
-              <a:t>2021/2/28</a:t>
+              <a:t>2021/3/1</a:t>
             </a:fld>
             <a:endParaRPr lang="zh-CN" altLang="en-US"/>
           </a:p>
@@ -7350,7 +7352,7 @@
                   <a:ea typeface="Microsoft Himalaya" panose="01010100010101010101" pitchFamily="2" charset="0"/>
                   <a:cs typeface="Dubai" panose="020B0503030403030204" pitchFamily="34" charset="-78"/>
                 </a:rPr>
-                <a:t>://0.0.0.0:22137"</a:t>
+                <a:t>://127.0.0.1:22137"</a:t>
               </a:r>
               <a:r>
                 <a:rPr lang="en-US" altLang="zh-CN" sz="1401" dirty="0">
@@ -18717,6 +18719,4216 @@
     <p:extLst>
       <p:ext uri="{BB962C8B-B14F-4D97-AF65-F5344CB8AC3E}">
         <p14:creationId xmlns:p14="http://schemas.microsoft.com/office/powerpoint/2010/main" val="1527162121"/>
+      </p:ext>
+    </p:extLst>
+  </p:cSld>
+  <p:clrMapOvr>
+    <a:masterClrMapping/>
+  </p:clrMapOvr>
+</p:sld>
+</file>
+
+<file path=ppt/slides/slide8.xml><?xml version="1.0" encoding="utf-8"?>
+<p:sld xmlns:a="http://schemas.openxmlformats.org/drawingml/2006/main" xmlns:r="http://schemas.openxmlformats.org/officeDocument/2006/relationships" xmlns:p="http://schemas.openxmlformats.org/presentationml/2006/main">
+  <p:cSld>
+    <p:spTree>
+      <p:nvGrpSpPr>
+        <p:cNvPr id="1" name=""/>
+        <p:cNvGrpSpPr/>
+        <p:nvPr/>
+      </p:nvGrpSpPr>
+      <p:grpSpPr>
+        <a:xfrm>
+          <a:off x="0" y="0"/>
+          <a:ext cx="0" cy="0"/>
+          <a:chOff x="0" y="0"/>
+          <a:chExt cx="0" cy="0"/>
+        </a:xfrm>
+      </p:grpSpPr>
+      <p:pic>
+        <p:nvPicPr>
+          <p:cNvPr id="4" name="Picture 3">
+            <a:extLst>
+              <a:ext uri="{FF2B5EF4-FFF2-40B4-BE49-F238E27FC236}">
+                <a16:creationId xmlns:a16="http://schemas.microsoft.com/office/drawing/2014/main" id="{B716A5FE-7D3D-481A-978A-6617E5D9C755}"/>
+              </a:ext>
+            </a:extLst>
+          </p:cNvPr>
+          <p:cNvPicPr>
+            <a:picLocks noChangeAspect="1"/>
+          </p:cNvPicPr>
+          <p:nvPr/>
+        </p:nvPicPr>
+        <p:blipFill rotWithShape="1">
+          <a:blip r:embed="rId2">
+            <a:extLst>
+              <a:ext uri="{28A0092B-C50C-407E-A947-70E740481C1C}">
+                <a14:useLocalDpi xmlns:a14="http://schemas.microsoft.com/office/drawing/2010/main" val="0"/>
+              </a:ext>
+            </a:extLst>
+          </a:blip>
+          <a:srcRect l="2" t="150" r="18220"/>
+          <a:stretch/>
+        </p:blipFill>
+        <p:spPr>
+          <a:xfrm>
+            <a:off x="1769638" y="0"/>
+            <a:ext cx="8479692" cy="6858000"/>
+          </a:xfrm>
+          <a:prstGeom prst="rect">
+            <a:avLst/>
+          </a:prstGeom>
+        </p:spPr>
+      </p:pic>
+      <p:sp>
+        <p:nvSpPr>
+          <p:cNvPr id="5" name="TextBox 4">
+            <a:extLst>
+              <a:ext uri="{FF2B5EF4-FFF2-40B4-BE49-F238E27FC236}">
+                <a16:creationId xmlns:a16="http://schemas.microsoft.com/office/drawing/2014/main" id="{44280C20-8317-4782-9969-F7AEA3B0CB23}"/>
+              </a:ext>
+            </a:extLst>
+          </p:cNvPr>
+          <p:cNvSpPr txBox="1"/>
+          <p:nvPr/>
+        </p:nvSpPr>
+        <p:spPr>
+          <a:xfrm>
+            <a:off x="1961346" y="300490"/>
+            <a:ext cx="3754066" cy="2924134"/>
+          </a:xfrm>
+          <a:prstGeom prst="rect">
+            <a:avLst/>
+          </a:prstGeom>
+          <a:noFill/>
+        </p:spPr>
+        <p:txBody>
+          <a:bodyPr wrap="square" rtlCol="0">
+            <a:spAutoFit/>
+          </a:bodyPr>
+          <a:lstStyle/>
+          <a:p>
+            <a:r>
+              <a:rPr lang="zh-CN" altLang="en-US" sz="1600" dirty="0">
+                <a:solidFill>
+                  <a:srgbClr val="FF0000"/>
+                </a:solidFill>
+                <a:latin typeface="微软雅黑" panose="020B0503020204020204" pitchFamily="34" charset="-122"/>
+                <a:ea typeface="微软雅黑" panose="020B0503020204020204" pitchFamily="34" charset="-122"/>
+              </a:rPr>
+              <a:t>不要跟我说什么</a:t>
+            </a:r>
+            <a:endParaRPr lang="en-US" altLang="zh-CN" sz="1600" dirty="0">
+              <a:solidFill>
+                <a:srgbClr val="FF0000"/>
+              </a:solidFill>
+              <a:latin typeface="微软雅黑" panose="020B0503020204020204" pitchFamily="34" charset="-122"/>
+              <a:ea typeface="微软雅黑" panose="020B0503020204020204" pitchFamily="34" charset="-122"/>
+            </a:endParaRPr>
+          </a:p>
+          <a:p>
+            <a:r>
+              <a:rPr lang="en-US" altLang="zh-CN" sz="1600" dirty="0" err="1">
+                <a:solidFill>
+                  <a:srgbClr val="FF0000"/>
+                </a:solidFill>
+                <a:latin typeface="Times New Roman" panose="02020603050405020304" pitchFamily="18" charset="0"/>
+                <a:ea typeface="+mj-ea"/>
+                <a:cs typeface="Times New Roman" panose="02020603050405020304" pitchFamily="18" charset="0"/>
+              </a:rPr>
+              <a:t>linux</a:t>
+            </a:r>
+            <a:r>
+              <a:rPr lang="en-US" altLang="zh-CN" sz="1600" dirty="0">
+                <a:solidFill>
+                  <a:srgbClr val="FF0000"/>
+                </a:solidFill>
+                <a:latin typeface="Times New Roman" panose="02020603050405020304" pitchFamily="18" charset="0"/>
+                <a:ea typeface="+mj-ea"/>
+                <a:cs typeface="Times New Roman" panose="02020603050405020304" pitchFamily="18" charset="0"/>
+              </a:rPr>
+              <a:t>/win/android/</a:t>
+            </a:r>
+            <a:r>
+              <a:rPr lang="en-US" altLang="zh-CN" sz="1600" dirty="0" err="1">
+                <a:solidFill>
+                  <a:srgbClr val="FF0000"/>
+                </a:solidFill>
+                <a:latin typeface="Times New Roman" panose="02020603050405020304" pitchFamily="18" charset="0"/>
+                <a:ea typeface="+mj-ea"/>
+                <a:cs typeface="Times New Roman" panose="02020603050405020304" pitchFamily="18" charset="0"/>
+              </a:rPr>
+              <a:t>ios</a:t>
+            </a:r>
+            <a:endParaRPr lang="en-US" altLang="zh-CN" sz="1600" dirty="0">
+              <a:solidFill>
+                <a:srgbClr val="FF0000"/>
+              </a:solidFill>
+              <a:latin typeface="Times New Roman" panose="02020603050405020304" pitchFamily="18" charset="0"/>
+              <a:ea typeface="+mj-ea"/>
+              <a:cs typeface="Times New Roman" panose="02020603050405020304" pitchFamily="18" charset="0"/>
+            </a:endParaRPr>
+          </a:p>
+          <a:p>
+            <a:r>
+              <a:rPr lang="en-US" altLang="zh-CN" sz="1600" dirty="0" err="1">
+                <a:solidFill>
+                  <a:srgbClr val="FF0000"/>
+                </a:solidFill>
+                <a:latin typeface="Times New Roman" panose="02020603050405020304" pitchFamily="18" charset="0"/>
+                <a:ea typeface="+mj-ea"/>
+                <a:cs typeface="Times New Roman" panose="02020603050405020304" pitchFamily="18" charset="0"/>
+              </a:rPr>
+              <a:t>libuv</a:t>
+            </a:r>
+            <a:r>
+              <a:rPr lang="en-US" altLang="zh-CN" sz="1600" dirty="0">
+                <a:solidFill>
+                  <a:srgbClr val="FF0000"/>
+                </a:solidFill>
+                <a:latin typeface="Times New Roman" panose="02020603050405020304" pitchFamily="18" charset="0"/>
+                <a:ea typeface="+mj-ea"/>
+                <a:cs typeface="Times New Roman" panose="02020603050405020304" pitchFamily="18" charset="0"/>
+              </a:rPr>
+              <a:t>/</a:t>
+            </a:r>
+            <a:r>
+              <a:rPr lang="en-US" altLang="zh-CN" sz="1600" dirty="0" err="1">
+                <a:solidFill>
+                  <a:srgbClr val="FF0000"/>
+                </a:solidFill>
+                <a:latin typeface="Times New Roman" panose="02020603050405020304" pitchFamily="18" charset="0"/>
+                <a:ea typeface="+mj-ea"/>
+                <a:cs typeface="Times New Roman" panose="02020603050405020304" pitchFamily="18" charset="0"/>
+              </a:rPr>
+              <a:t>libev</a:t>
+            </a:r>
+            <a:r>
+              <a:rPr lang="en-US" altLang="zh-CN" sz="1600" dirty="0">
+                <a:solidFill>
+                  <a:srgbClr val="FF0000"/>
+                </a:solidFill>
+                <a:latin typeface="Times New Roman" panose="02020603050405020304" pitchFamily="18" charset="0"/>
+                <a:ea typeface="+mj-ea"/>
+                <a:cs typeface="Times New Roman" panose="02020603050405020304" pitchFamily="18" charset="0"/>
+              </a:rPr>
+              <a:t>/</a:t>
+            </a:r>
+            <a:r>
+              <a:rPr lang="en-US" altLang="zh-CN" sz="1600" dirty="0" err="1">
+                <a:solidFill>
+                  <a:srgbClr val="FF0000"/>
+                </a:solidFill>
+                <a:latin typeface="Times New Roman" panose="02020603050405020304" pitchFamily="18" charset="0"/>
+                <a:ea typeface="+mj-ea"/>
+                <a:cs typeface="Times New Roman" panose="02020603050405020304" pitchFamily="18" charset="0"/>
+              </a:rPr>
+              <a:t>libevent</a:t>
+            </a:r>
+            <a:endParaRPr lang="en-US" altLang="zh-CN" sz="1600" dirty="0">
+              <a:solidFill>
+                <a:srgbClr val="FF0000"/>
+              </a:solidFill>
+              <a:latin typeface="Times New Roman" panose="02020603050405020304" pitchFamily="18" charset="0"/>
+              <a:ea typeface="+mj-ea"/>
+              <a:cs typeface="Times New Roman" panose="02020603050405020304" pitchFamily="18" charset="0"/>
+            </a:endParaRPr>
+          </a:p>
+          <a:p>
+            <a:r>
+              <a:rPr lang="en-US" altLang="zh-CN" sz="1600" dirty="0">
+                <a:solidFill>
+                  <a:srgbClr val="FF0000"/>
+                </a:solidFill>
+                <a:latin typeface="Times New Roman" panose="02020603050405020304" pitchFamily="18" charset="0"/>
+                <a:ea typeface="+mj-ea"/>
+                <a:cs typeface="Times New Roman" panose="02020603050405020304" pitchFamily="18" charset="0"/>
+              </a:rPr>
+              <a:t>socket/</a:t>
+            </a:r>
+            <a:r>
+              <a:rPr lang="en-US" altLang="zh-CN" sz="1600" dirty="0" err="1">
+                <a:solidFill>
+                  <a:srgbClr val="FF0000"/>
+                </a:solidFill>
+                <a:latin typeface="Times New Roman" panose="02020603050405020304" pitchFamily="18" charset="0"/>
+                <a:ea typeface="+mj-ea"/>
+                <a:cs typeface="Times New Roman" panose="02020603050405020304" pitchFamily="18" charset="0"/>
+              </a:rPr>
+              <a:t>epoll</a:t>
+            </a:r>
+            <a:r>
+              <a:rPr lang="en-US" altLang="zh-CN" sz="1600" dirty="0">
+                <a:solidFill>
+                  <a:srgbClr val="FF0000"/>
+                </a:solidFill>
+                <a:latin typeface="Times New Roman" panose="02020603050405020304" pitchFamily="18" charset="0"/>
+                <a:ea typeface="+mj-ea"/>
+                <a:cs typeface="Times New Roman" panose="02020603050405020304" pitchFamily="18" charset="0"/>
+              </a:rPr>
+              <a:t>/</a:t>
+            </a:r>
+            <a:r>
+              <a:rPr lang="en-US" altLang="zh-CN" sz="1600" dirty="0" err="1">
+                <a:solidFill>
+                  <a:srgbClr val="FF0000"/>
+                </a:solidFill>
+                <a:latin typeface="Times New Roman" panose="02020603050405020304" pitchFamily="18" charset="0"/>
+                <a:ea typeface="+mj-ea"/>
+                <a:cs typeface="Times New Roman" panose="02020603050405020304" pitchFamily="18" charset="0"/>
+              </a:rPr>
+              <a:t>iocp</a:t>
+            </a:r>
+            <a:r>
+              <a:rPr lang="en-US" altLang="zh-CN" sz="1600" dirty="0">
+                <a:solidFill>
+                  <a:srgbClr val="FF0000"/>
+                </a:solidFill>
+                <a:latin typeface="Times New Roman" panose="02020603050405020304" pitchFamily="18" charset="0"/>
+                <a:ea typeface="+mj-ea"/>
+                <a:cs typeface="Times New Roman" panose="02020603050405020304" pitchFamily="18" charset="0"/>
+              </a:rPr>
+              <a:t>/</a:t>
+            </a:r>
+            <a:r>
+              <a:rPr lang="en-US" altLang="zh-CN" sz="1600" dirty="0" err="1">
+                <a:solidFill>
+                  <a:srgbClr val="FF0000"/>
+                </a:solidFill>
+                <a:latin typeface="Times New Roman" panose="02020603050405020304" pitchFamily="18" charset="0"/>
+                <a:ea typeface="+mj-ea"/>
+                <a:cs typeface="Times New Roman" panose="02020603050405020304" pitchFamily="18" charset="0"/>
+              </a:rPr>
+              <a:t>kqueue</a:t>
+            </a:r>
+            <a:r>
+              <a:rPr lang="en-US" altLang="zh-CN" sz="1600" dirty="0">
+                <a:solidFill>
+                  <a:srgbClr val="FF0000"/>
+                </a:solidFill>
+                <a:latin typeface="Times New Roman" panose="02020603050405020304" pitchFamily="18" charset="0"/>
+                <a:ea typeface="+mj-ea"/>
+                <a:cs typeface="Times New Roman" panose="02020603050405020304" pitchFamily="18" charset="0"/>
+              </a:rPr>
+              <a:t>/select</a:t>
+            </a:r>
+          </a:p>
+          <a:p>
+            <a:r>
+              <a:rPr lang="zh-CN" altLang="en-US" sz="1600" dirty="0">
+                <a:solidFill>
+                  <a:srgbClr val="FF0000"/>
+                </a:solidFill>
+                <a:latin typeface="微软雅黑" panose="020B0503020204020204" pitchFamily="34" charset="-122"/>
+                <a:ea typeface="微软雅黑" panose="020B0503020204020204" pitchFamily="34" charset="-122"/>
+              </a:rPr>
+              <a:t>老夫收发消息就用</a:t>
+            </a:r>
+            <a:endParaRPr lang="en-US" altLang="zh-CN" sz="1600" dirty="0">
+              <a:solidFill>
+                <a:srgbClr val="FF0000"/>
+              </a:solidFill>
+              <a:latin typeface="微软雅黑" panose="020B0503020204020204" pitchFamily="34" charset="-122"/>
+              <a:ea typeface="微软雅黑" panose="020B0503020204020204" pitchFamily="34" charset="-122"/>
+            </a:endParaRPr>
+          </a:p>
+          <a:p>
+            <a:r>
+              <a:rPr lang="en-US" altLang="zh-CN" sz="3600" dirty="0" err="1">
+                <a:solidFill>
+                  <a:srgbClr val="FF0000"/>
+                </a:solidFill>
+                <a:latin typeface="Arial Black" panose="020B0A04020102020204" pitchFamily="34" charset="0"/>
+              </a:rPr>
+              <a:t>Netplus</a:t>
+            </a:r>
+            <a:endParaRPr lang="en-US" altLang="zh-CN" sz="3600" dirty="0">
+              <a:solidFill>
+                <a:srgbClr val="FF0000"/>
+              </a:solidFill>
+              <a:latin typeface="Arial Black" panose="020B0A04020102020204" pitchFamily="34" charset="0"/>
+            </a:endParaRPr>
+          </a:p>
+          <a:p>
+            <a:r>
+              <a:rPr lang="en-US" altLang="zh-CN" sz="1801" b="1" dirty="0">
+                <a:solidFill>
+                  <a:srgbClr val="FF0000"/>
+                </a:solidFill>
+              </a:rPr>
+              <a:t>http/https/</a:t>
+            </a:r>
+            <a:r>
+              <a:rPr lang="en-US" altLang="zh-CN" sz="1801" b="1" dirty="0" err="1">
+                <a:solidFill>
+                  <a:srgbClr val="FF0000"/>
+                </a:solidFill>
+              </a:rPr>
+              <a:t>websocket</a:t>
+            </a:r>
+            <a:r>
+              <a:rPr lang="en-US" altLang="zh-CN" sz="1801" b="1" dirty="0">
+                <a:solidFill>
+                  <a:srgbClr val="FF0000"/>
+                </a:solidFill>
+              </a:rPr>
+              <a:t>/RPC/</a:t>
+            </a:r>
+            <a:r>
+              <a:rPr lang="en-US" altLang="zh-CN" sz="1801" b="1" dirty="0" err="1">
+                <a:solidFill>
+                  <a:srgbClr val="FF0000"/>
+                </a:solidFill>
+              </a:rPr>
+              <a:t>tlv</a:t>
+            </a:r>
+            <a:r>
+              <a:rPr lang="en-US" altLang="zh-CN" sz="1801" b="1" dirty="0">
+                <a:solidFill>
+                  <a:srgbClr val="FF0000"/>
+                </a:solidFill>
+              </a:rPr>
+              <a:t> </a:t>
+            </a:r>
+          </a:p>
+          <a:p>
+            <a:r>
+              <a:rPr lang="zh-CN" altLang="en-US" sz="2000" dirty="0">
+                <a:solidFill>
+                  <a:srgbClr val="FF0000"/>
+                </a:solidFill>
+                <a:latin typeface="微软雅黑" panose="020B0503020204020204" pitchFamily="34" charset="-122"/>
+                <a:ea typeface="微软雅黑" panose="020B0503020204020204" pitchFamily="34" charset="-122"/>
+              </a:rPr>
+              <a:t>统统一把</a:t>
+            </a:r>
+            <a:r>
+              <a:rPr lang="zh-CN" altLang="en-US" sz="3200" dirty="0">
+                <a:solidFill>
+                  <a:srgbClr val="FF0000"/>
+                </a:solidFill>
+                <a:latin typeface="微软雅黑" panose="020B0503020204020204" pitchFamily="34" charset="-122"/>
+                <a:ea typeface="微软雅黑" panose="020B0503020204020204" pitchFamily="34" charset="-122"/>
+              </a:rPr>
+              <a:t>梭</a:t>
+            </a:r>
+            <a:endParaRPr lang="en-US" altLang="zh-CN" sz="3200" dirty="0">
+              <a:solidFill>
+                <a:srgbClr val="FF0000"/>
+              </a:solidFill>
+              <a:latin typeface="微软雅黑" panose="020B0503020204020204" pitchFamily="34" charset="-122"/>
+              <a:ea typeface="微软雅黑" panose="020B0503020204020204" pitchFamily="34" charset="-122"/>
+            </a:endParaRPr>
+          </a:p>
+          <a:p>
+            <a:endParaRPr lang="zh-CN" altLang="en-US" sz="1801" dirty="0"/>
+          </a:p>
+        </p:txBody>
+      </p:sp>
+      <p:sp>
+        <p:nvSpPr>
+          <p:cNvPr id="6" name="TextBox 5">
+            <a:extLst>
+              <a:ext uri="{FF2B5EF4-FFF2-40B4-BE49-F238E27FC236}">
+                <a16:creationId xmlns:a16="http://schemas.microsoft.com/office/drawing/2014/main" id="{57E30C8C-6933-48E4-B59F-791003167657}"/>
+              </a:ext>
+            </a:extLst>
+          </p:cNvPr>
+          <p:cNvSpPr txBox="1"/>
+          <p:nvPr/>
+        </p:nvSpPr>
+        <p:spPr>
+          <a:xfrm>
+            <a:off x="3915591" y="2911676"/>
+            <a:ext cx="1879309" cy="954364"/>
+          </a:xfrm>
+          <a:prstGeom prst="rect">
+            <a:avLst/>
+          </a:prstGeom>
+          <a:noFill/>
+        </p:spPr>
+        <p:txBody>
+          <a:bodyPr wrap="square" rtlCol="0">
+            <a:spAutoFit/>
+          </a:bodyPr>
+          <a:lstStyle/>
+          <a:p>
+            <a:r>
+              <a:rPr lang="zh-CN" altLang="en-US" sz="1801" dirty="0">
+                <a:solidFill>
+                  <a:srgbClr val="FF0000"/>
+                </a:solidFill>
+                <a:latin typeface="时光慢慢走" panose="02010600010101010101" pitchFamily="2" charset="-122"/>
+                <a:ea typeface="时光慢慢走" panose="02010600010101010101" pitchFamily="2" charset="-122"/>
+              </a:rPr>
+              <a:t>监听</a:t>
+            </a:r>
+            <a:r>
+              <a:rPr lang="en-US" altLang="zh-CN" sz="1801" dirty="0">
+                <a:solidFill>
+                  <a:srgbClr val="FF0000"/>
+                </a:solidFill>
+                <a:latin typeface="时光慢慢走" panose="02010600010101010101" pitchFamily="2" charset="-122"/>
+                <a:ea typeface="时光慢慢走" panose="02010600010101010101" pitchFamily="2" charset="-122"/>
+              </a:rPr>
+              <a:t>/</a:t>
+            </a:r>
+            <a:r>
+              <a:rPr lang="zh-CN" altLang="en-US" sz="1801" dirty="0">
+                <a:solidFill>
+                  <a:srgbClr val="FF0000"/>
+                </a:solidFill>
+                <a:latin typeface="时光慢慢走" panose="02010600010101010101" pitchFamily="2" charset="-122"/>
+                <a:ea typeface="时光慢慢走" panose="02010600010101010101" pitchFamily="2" charset="-122"/>
+              </a:rPr>
+              <a:t>拨号</a:t>
+            </a:r>
+            <a:endParaRPr lang="en-US" altLang="zh-CN" sz="1801" dirty="0">
+              <a:solidFill>
+                <a:srgbClr val="FF0000"/>
+              </a:solidFill>
+              <a:latin typeface="时光慢慢走" panose="02010600010101010101" pitchFamily="2" charset="-122"/>
+              <a:ea typeface="时光慢慢走" panose="02010600010101010101" pitchFamily="2" charset="-122"/>
+            </a:endParaRPr>
+          </a:p>
+          <a:p>
+            <a:r>
+              <a:rPr lang="zh-CN" altLang="en-US" sz="1801" dirty="0">
+                <a:solidFill>
+                  <a:srgbClr val="FF0000"/>
+                </a:solidFill>
+                <a:latin typeface="时光慢慢走" panose="02010600010101010101" pitchFamily="2" charset="-122"/>
+                <a:ea typeface="时光慢慢走" panose="02010600010101010101" pitchFamily="2" charset="-122"/>
+              </a:rPr>
+              <a:t>设置</a:t>
+            </a:r>
+            <a:r>
+              <a:rPr lang="en-US" altLang="zh-CN" sz="1801" b="1" dirty="0">
+                <a:solidFill>
+                  <a:srgbClr val="FF0000"/>
+                </a:solidFill>
+                <a:latin typeface="时光慢慢走" panose="02010600010101010101" pitchFamily="2" charset="-122"/>
+                <a:ea typeface="时光慢慢走" panose="02010600010101010101" pitchFamily="2" charset="-122"/>
+              </a:rPr>
+              <a:t>Handler</a:t>
+            </a:r>
+          </a:p>
+          <a:p>
+            <a:r>
+              <a:rPr lang="zh-CN" altLang="en-US" sz="1801" dirty="0">
+                <a:solidFill>
+                  <a:srgbClr val="FF0000"/>
+                </a:solidFill>
+                <a:latin typeface="时光慢慢走" panose="02010600010101010101" pitchFamily="2" charset="-122"/>
+                <a:ea typeface="时光慢慢走" panose="02010600010101010101" pitchFamily="2" charset="-122"/>
+              </a:rPr>
+              <a:t>简简单单</a:t>
+            </a:r>
+            <a:r>
+              <a:rPr lang="zh-CN" altLang="en-US" sz="2000" b="1" dirty="0">
+                <a:solidFill>
+                  <a:srgbClr val="FF0000"/>
+                </a:solidFill>
+                <a:latin typeface="时光慢慢走" panose="02010600010101010101" pitchFamily="2" charset="-122"/>
+                <a:ea typeface="时光慢慢走" panose="02010600010101010101" pitchFamily="2" charset="-122"/>
+              </a:rPr>
+              <a:t>直接干</a:t>
+            </a:r>
+          </a:p>
+        </p:txBody>
+      </p:sp>
+      <p:sp>
+        <p:nvSpPr>
+          <p:cNvPr id="7" name="TextBox 6">
+            <a:extLst>
+              <a:ext uri="{FF2B5EF4-FFF2-40B4-BE49-F238E27FC236}">
+                <a16:creationId xmlns:a16="http://schemas.microsoft.com/office/drawing/2014/main" id="{10DFA51B-31C0-49A0-B9C4-F04240D80AD6}"/>
+              </a:ext>
+            </a:extLst>
+          </p:cNvPr>
+          <p:cNvSpPr txBox="1"/>
+          <p:nvPr/>
+        </p:nvSpPr>
+        <p:spPr>
+          <a:xfrm>
+            <a:off x="1961670" y="4333332"/>
+            <a:ext cx="5217620" cy="2308324"/>
+          </a:xfrm>
+          <a:prstGeom prst="rect">
+            <a:avLst/>
+          </a:prstGeom>
+          <a:noFill/>
+        </p:spPr>
+        <p:txBody>
+          <a:bodyPr wrap="square" rtlCol="0">
+            <a:spAutoFit/>
+          </a:bodyPr>
+          <a:lstStyle/>
+          <a:p>
+            <a:r>
+              <a:rPr lang="en-US" altLang="zh-CN" sz="1200" dirty="0">
+                <a:solidFill>
+                  <a:srgbClr val="6F008A"/>
+                </a:solidFill>
+                <a:latin typeface="Dubai" panose="020B0503030403030204" pitchFamily="34" charset="-78"/>
+                <a:ea typeface="Microsoft Himalaya" panose="01010100010101010101" pitchFamily="2" charset="0"/>
+                <a:cs typeface="Dubai" panose="020B0503030403030204" pitchFamily="34" charset="-78"/>
+              </a:rPr>
+              <a:t>NRP</a:t>
+            </a:r>
+            <a:r>
+              <a:rPr lang="en-US" altLang="zh-CN" sz="1200" dirty="0">
+                <a:solidFill>
+                  <a:srgbClr val="000000"/>
+                </a:solidFill>
+                <a:latin typeface="Dubai" panose="020B0503030403030204" pitchFamily="34" charset="-78"/>
+                <a:ea typeface="Microsoft Himalaya" panose="01010100010101010101" pitchFamily="2" charset="0"/>
+                <a:cs typeface="Dubai" panose="020B0503030403030204" pitchFamily="34" charset="-78"/>
+              </a:rPr>
+              <a:t>&lt;</a:t>
+            </a:r>
+            <a:r>
+              <a:rPr lang="en-US" altLang="zh-CN" sz="1200" dirty="0" err="1">
+                <a:solidFill>
+                  <a:srgbClr val="000000"/>
+                </a:solidFill>
+                <a:latin typeface="Dubai" panose="020B0503030403030204" pitchFamily="34" charset="-78"/>
+                <a:ea typeface="Microsoft Himalaya" panose="01010100010101010101" pitchFamily="2" charset="0"/>
+                <a:cs typeface="Dubai" panose="020B0503030403030204" pitchFamily="34" charset="-78"/>
+              </a:rPr>
+              <a:t>netp</a:t>
+            </a:r>
+            <a:r>
+              <a:rPr lang="en-US" altLang="zh-CN" sz="1200" dirty="0">
+                <a:solidFill>
+                  <a:srgbClr val="000000"/>
+                </a:solidFill>
+                <a:latin typeface="Dubai" panose="020B0503030403030204" pitchFamily="34" charset="-78"/>
+                <a:ea typeface="Microsoft Himalaya" panose="01010100010101010101" pitchFamily="2" charset="0"/>
+                <a:cs typeface="Dubai" panose="020B0503030403030204" pitchFamily="34" charset="-78"/>
+              </a:rPr>
+              <a:t>::</a:t>
+            </a:r>
+            <a:r>
+              <a:rPr lang="en-US" altLang="zh-CN" sz="1200" dirty="0" err="1">
+                <a:solidFill>
+                  <a:srgbClr val="2B91AF"/>
+                </a:solidFill>
+                <a:latin typeface="Dubai" panose="020B0503030403030204" pitchFamily="34" charset="-78"/>
+                <a:ea typeface="Microsoft Himalaya" panose="01010100010101010101" pitchFamily="2" charset="0"/>
+                <a:cs typeface="Dubai" panose="020B0503030403030204" pitchFamily="34" charset="-78"/>
+              </a:rPr>
+              <a:t>channel_listen_promise</a:t>
+            </a:r>
+            <a:r>
+              <a:rPr lang="en-US" altLang="zh-CN" sz="1200" dirty="0">
+                <a:solidFill>
+                  <a:srgbClr val="000000"/>
+                </a:solidFill>
+                <a:latin typeface="Dubai" panose="020B0503030403030204" pitchFamily="34" charset="-78"/>
+                <a:ea typeface="Microsoft Himalaya" panose="01010100010101010101" pitchFamily="2" charset="0"/>
+                <a:cs typeface="Dubai" panose="020B0503030403030204" pitchFamily="34" charset="-78"/>
+              </a:rPr>
+              <a:t>&gt; </a:t>
+            </a:r>
+            <a:r>
+              <a:rPr lang="en-US" altLang="zh-CN" sz="1200" dirty="0" err="1">
+                <a:solidFill>
+                  <a:srgbClr val="000000"/>
+                </a:solidFill>
+                <a:latin typeface="Dubai" panose="020B0503030403030204" pitchFamily="34" charset="-78"/>
+                <a:ea typeface="Microsoft Himalaya" panose="01010100010101010101" pitchFamily="2" charset="0"/>
+                <a:cs typeface="Dubai" panose="020B0503030403030204" pitchFamily="34" charset="-78"/>
+              </a:rPr>
+              <a:t>listen_p</a:t>
+            </a:r>
+            <a:r>
+              <a:rPr lang="en-US" altLang="zh-CN" sz="1200" dirty="0">
+                <a:solidFill>
+                  <a:srgbClr val="000000"/>
+                </a:solidFill>
+                <a:latin typeface="Dubai" panose="020B0503030403030204" pitchFamily="34" charset="-78"/>
+                <a:ea typeface="Microsoft Himalaya" panose="01010100010101010101" pitchFamily="2" charset="0"/>
+                <a:cs typeface="Dubai" panose="020B0503030403030204" pitchFamily="34" charset="-78"/>
+              </a:rPr>
+              <a:t> = </a:t>
+            </a:r>
+          </a:p>
+          <a:p>
+            <a:r>
+              <a:rPr lang="en-US" altLang="zh-CN" sz="1200" dirty="0" err="1">
+                <a:solidFill>
+                  <a:srgbClr val="000000"/>
+                </a:solidFill>
+                <a:latin typeface="Dubai" panose="020B0503030403030204" pitchFamily="34" charset="-78"/>
+                <a:ea typeface="Microsoft Himalaya" panose="01010100010101010101" pitchFamily="2" charset="0"/>
+                <a:cs typeface="Dubai" panose="020B0503030403030204" pitchFamily="34" charset="-78"/>
+              </a:rPr>
+              <a:t>netp</a:t>
+            </a:r>
+            <a:r>
+              <a:rPr lang="en-US" altLang="zh-CN" sz="1200" dirty="0">
+                <a:solidFill>
+                  <a:srgbClr val="000000"/>
+                </a:solidFill>
+                <a:latin typeface="Dubai" panose="020B0503030403030204" pitchFamily="34" charset="-78"/>
+                <a:ea typeface="Microsoft Himalaya" panose="01010100010101010101" pitchFamily="2" charset="0"/>
+                <a:cs typeface="Dubai" panose="020B0503030403030204" pitchFamily="34" charset="-78"/>
+              </a:rPr>
+              <a:t>::</a:t>
+            </a:r>
+            <a:r>
+              <a:rPr lang="en-US" altLang="zh-CN" sz="1200" dirty="0">
+                <a:solidFill>
+                  <a:srgbClr val="2B91AF"/>
+                </a:solidFill>
+                <a:latin typeface="Dubai" panose="020B0503030403030204" pitchFamily="34" charset="-78"/>
+                <a:ea typeface="Microsoft Himalaya" panose="01010100010101010101" pitchFamily="2" charset="0"/>
+                <a:cs typeface="Dubai" panose="020B0503030403030204" pitchFamily="34" charset="-78"/>
+              </a:rPr>
+              <a:t>socket</a:t>
+            </a:r>
+            <a:r>
+              <a:rPr lang="en-US" altLang="zh-CN" sz="1200" dirty="0">
+                <a:solidFill>
+                  <a:srgbClr val="000000"/>
+                </a:solidFill>
+                <a:latin typeface="Dubai" panose="020B0503030403030204" pitchFamily="34" charset="-78"/>
+                <a:ea typeface="Microsoft Himalaya" panose="01010100010101010101" pitchFamily="2" charset="0"/>
+                <a:cs typeface="Dubai" panose="020B0503030403030204" pitchFamily="34" charset="-78"/>
+              </a:rPr>
+              <a:t>::</a:t>
+            </a:r>
+            <a:r>
+              <a:rPr lang="en-US" altLang="zh-CN" sz="1200" dirty="0" err="1">
+                <a:solidFill>
+                  <a:srgbClr val="000000"/>
+                </a:solidFill>
+                <a:latin typeface="Dubai" panose="020B0503030403030204" pitchFamily="34" charset="-78"/>
+                <a:ea typeface="Microsoft Himalaya" panose="01010100010101010101" pitchFamily="2" charset="0"/>
+                <a:cs typeface="Dubai" panose="020B0503030403030204" pitchFamily="34" charset="-78"/>
+              </a:rPr>
+              <a:t>listen_on</a:t>
+            </a:r>
+            <a:r>
+              <a:rPr lang="en-US" altLang="zh-CN" sz="1200" dirty="0">
+                <a:solidFill>
+                  <a:srgbClr val="000000"/>
+                </a:solidFill>
+                <a:latin typeface="Dubai" panose="020B0503030403030204" pitchFamily="34" charset="-78"/>
+                <a:ea typeface="Microsoft Himalaya" panose="01010100010101010101" pitchFamily="2" charset="0"/>
+                <a:cs typeface="Dubai" panose="020B0503030403030204" pitchFamily="34" charset="-78"/>
+              </a:rPr>
+              <a:t>(</a:t>
+            </a:r>
+            <a:r>
+              <a:rPr lang="en-US" altLang="zh-CN" sz="1200" dirty="0">
+                <a:solidFill>
+                  <a:srgbClr val="A31515"/>
+                </a:solidFill>
+                <a:latin typeface="Dubai" panose="020B0503030403030204" pitchFamily="34" charset="-78"/>
+                <a:ea typeface="Microsoft Himalaya" panose="01010100010101010101" pitchFamily="2" charset="0"/>
+                <a:cs typeface="Dubai" panose="020B0503030403030204" pitchFamily="34" charset="-78"/>
+              </a:rPr>
+              <a:t>"</a:t>
+            </a:r>
+            <a:r>
+              <a:rPr lang="en-US" altLang="zh-CN" sz="1200" dirty="0" err="1">
+                <a:solidFill>
+                  <a:srgbClr val="A31515"/>
+                </a:solidFill>
+                <a:latin typeface="Dubai" panose="020B0503030403030204" pitchFamily="34" charset="-78"/>
+                <a:ea typeface="Microsoft Himalaya" panose="01010100010101010101" pitchFamily="2" charset="0"/>
+                <a:cs typeface="Dubai" panose="020B0503030403030204" pitchFamily="34" charset="-78"/>
+              </a:rPr>
+              <a:t>tcp</a:t>
+            </a:r>
+            <a:r>
+              <a:rPr lang="en-US" altLang="zh-CN" sz="1200" dirty="0">
+                <a:solidFill>
+                  <a:srgbClr val="A31515"/>
+                </a:solidFill>
+                <a:latin typeface="Dubai" panose="020B0503030403030204" pitchFamily="34" charset="-78"/>
+                <a:ea typeface="Microsoft Himalaya" panose="01010100010101010101" pitchFamily="2" charset="0"/>
+                <a:cs typeface="Dubai" panose="020B0503030403030204" pitchFamily="34" charset="-78"/>
+              </a:rPr>
+              <a:t>://0.0.0.0:22137"</a:t>
+            </a:r>
+            <a:r>
+              <a:rPr lang="en-US" altLang="zh-CN" sz="1200" dirty="0">
+                <a:solidFill>
+                  <a:srgbClr val="000000"/>
+                </a:solidFill>
+                <a:latin typeface="Dubai" panose="020B0503030403030204" pitchFamily="34" charset="-78"/>
+                <a:ea typeface="Microsoft Himalaya" panose="01010100010101010101" pitchFamily="2" charset="0"/>
+                <a:cs typeface="Dubai" panose="020B0503030403030204" pitchFamily="34" charset="-78"/>
+              </a:rPr>
+              <a:t>,[](</a:t>
+            </a:r>
+            <a:r>
+              <a:rPr lang="en-US" altLang="zh-CN" sz="1200" dirty="0">
+                <a:solidFill>
+                  <a:srgbClr val="6F008A"/>
+                </a:solidFill>
+                <a:latin typeface="Dubai" panose="020B0503030403030204" pitchFamily="34" charset="-78"/>
+                <a:ea typeface="Microsoft Himalaya" panose="01010100010101010101" pitchFamily="2" charset="0"/>
+                <a:cs typeface="Dubai" panose="020B0503030403030204" pitchFamily="34" charset="-78"/>
+              </a:rPr>
+              <a:t>NRP</a:t>
+            </a:r>
+            <a:r>
+              <a:rPr lang="en-US" altLang="zh-CN" sz="1200" dirty="0">
+                <a:solidFill>
+                  <a:srgbClr val="000000"/>
+                </a:solidFill>
+                <a:latin typeface="Dubai" panose="020B0503030403030204" pitchFamily="34" charset="-78"/>
+                <a:ea typeface="Microsoft Himalaya" panose="01010100010101010101" pitchFamily="2" charset="0"/>
+                <a:cs typeface="Dubai" panose="020B0503030403030204" pitchFamily="34" charset="-78"/>
+              </a:rPr>
+              <a:t>&lt;</a:t>
+            </a:r>
+            <a:r>
+              <a:rPr lang="en-US" altLang="zh-CN" sz="1200" dirty="0" err="1">
+                <a:solidFill>
+                  <a:srgbClr val="000000"/>
+                </a:solidFill>
+                <a:latin typeface="Dubai" panose="020B0503030403030204" pitchFamily="34" charset="-78"/>
+                <a:ea typeface="Microsoft Himalaya" panose="01010100010101010101" pitchFamily="2" charset="0"/>
+                <a:cs typeface="Dubai" panose="020B0503030403030204" pitchFamily="34" charset="-78"/>
+              </a:rPr>
+              <a:t>netp</a:t>
+            </a:r>
+            <a:r>
+              <a:rPr lang="en-US" altLang="zh-CN" sz="1200" dirty="0">
+                <a:solidFill>
+                  <a:srgbClr val="000000"/>
+                </a:solidFill>
+                <a:latin typeface="Dubai" panose="020B0503030403030204" pitchFamily="34" charset="-78"/>
+                <a:ea typeface="Microsoft Himalaya" panose="01010100010101010101" pitchFamily="2" charset="0"/>
+                <a:cs typeface="Dubai" panose="020B0503030403030204" pitchFamily="34" charset="-78"/>
+              </a:rPr>
+              <a:t>::</a:t>
+            </a:r>
+            <a:r>
+              <a:rPr lang="en-US" altLang="zh-CN" sz="1200" dirty="0">
+                <a:solidFill>
+                  <a:srgbClr val="2B91AF"/>
+                </a:solidFill>
+                <a:latin typeface="Dubai" panose="020B0503030403030204" pitchFamily="34" charset="-78"/>
+                <a:ea typeface="Microsoft Himalaya" panose="01010100010101010101" pitchFamily="2" charset="0"/>
+                <a:cs typeface="Dubai" panose="020B0503030403030204" pitchFamily="34" charset="-78"/>
+              </a:rPr>
+              <a:t>channel</a:t>
+            </a:r>
+            <a:r>
+              <a:rPr lang="en-US" altLang="zh-CN" sz="1200" dirty="0">
+                <a:solidFill>
+                  <a:srgbClr val="000000"/>
+                </a:solidFill>
+                <a:latin typeface="Dubai" panose="020B0503030403030204" pitchFamily="34" charset="-78"/>
+                <a:ea typeface="Microsoft Himalaya" panose="01010100010101010101" pitchFamily="2" charset="0"/>
+                <a:cs typeface="Dubai" panose="020B0503030403030204" pitchFamily="34" charset="-78"/>
+              </a:rPr>
+              <a:t>&gt; </a:t>
+            </a:r>
+            <a:r>
+              <a:rPr lang="en-US" altLang="zh-CN" sz="1200" dirty="0">
+                <a:solidFill>
+                  <a:srgbClr val="0000FF"/>
+                </a:solidFill>
+                <a:latin typeface="Dubai" panose="020B0503030403030204" pitchFamily="34" charset="-78"/>
+                <a:ea typeface="Microsoft Himalaya" panose="01010100010101010101" pitchFamily="2" charset="0"/>
+                <a:cs typeface="Dubai" panose="020B0503030403030204" pitchFamily="34" charset="-78"/>
+              </a:rPr>
+              <a:t>const</a:t>
+            </a:r>
+            <a:r>
+              <a:rPr lang="en-US" altLang="zh-CN" sz="1200" dirty="0">
+                <a:solidFill>
+                  <a:srgbClr val="000000"/>
+                </a:solidFill>
+                <a:latin typeface="Dubai" panose="020B0503030403030204" pitchFamily="34" charset="-78"/>
+                <a:ea typeface="Microsoft Himalaya" panose="01010100010101010101" pitchFamily="2" charset="0"/>
+                <a:cs typeface="Dubai" panose="020B0503030403030204" pitchFamily="34" charset="-78"/>
+              </a:rPr>
+              <a:t>&amp; </a:t>
+            </a:r>
+            <a:r>
+              <a:rPr lang="en-US" altLang="zh-CN" sz="1200" dirty="0" err="1">
+                <a:solidFill>
+                  <a:srgbClr val="808080"/>
+                </a:solidFill>
+                <a:latin typeface="Dubai" panose="020B0503030403030204" pitchFamily="34" charset="-78"/>
+                <a:ea typeface="Microsoft Himalaya" panose="01010100010101010101" pitchFamily="2" charset="0"/>
+                <a:cs typeface="Dubai" panose="020B0503030403030204" pitchFamily="34" charset="-78"/>
+              </a:rPr>
+              <a:t>ch</a:t>
+            </a:r>
+            <a:r>
+              <a:rPr lang="en-US" altLang="zh-CN" sz="1200" dirty="0">
+                <a:solidFill>
+                  <a:srgbClr val="000000"/>
+                </a:solidFill>
+                <a:latin typeface="Dubai" panose="020B0503030403030204" pitchFamily="34" charset="-78"/>
+                <a:ea typeface="Microsoft Himalaya" panose="01010100010101010101" pitchFamily="2" charset="0"/>
+                <a:cs typeface="Dubai" panose="020B0503030403030204" pitchFamily="34" charset="-78"/>
+              </a:rPr>
+              <a:t>) {</a:t>
+            </a:r>
+          </a:p>
+          <a:p>
+            <a:r>
+              <a:rPr lang="en-US" altLang="zh-CN" sz="1200" dirty="0">
+                <a:solidFill>
+                  <a:srgbClr val="808080"/>
+                </a:solidFill>
+                <a:latin typeface="Dubai" panose="020B0503030403030204" pitchFamily="34" charset="-78"/>
+                <a:ea typeface="Microsoft Himalaya" panose="01010100010101010101" pitchFamily="2" charset="0"/>
+                <a:cs typeface="Dubai" panose="020B0503030403030204" pitchFamily="34" charset="-78"/>
+              </a:rPr>
+              <a:t>    </a:t>
+            </a:r>
+            <a:r>
+              <a:rPr lang="en-US" altLang="zh-CN" sz="1200" dirty="0" err="1">
+                <a:solidFill>
+                  <a:srgbClr val="808080"/>
+                </a:solidFill>
+                <a:latin typeface="Dubai" panose="020B0503030403030204" pitchFamily="34" charset="-78"/>
+                <a:ea typeface="Microsoft Himalaya" panose="01010100010101010101" pitchFamily="2" charset="0"/>
+                <a:cs typeface="Dubai" panose="020B0503030403030204" pitchFamily="34" charset="-78"/>
+              </a:rPr>
+              <a:t>ch</a:t>
+            </a:r>
+            <a:r>
+              <a:rPr lang="en-US" altLang="zh-CN" sz="1200" dirty="0">
+                <a:solidFill>
+                  <a:srgbClr val="008080"/>
+                </a:solidFill>
+                <a:latin typeface="Dubai" panose="020B0503030403030204" pitchFamily="34" charset="-78"/>
+                <a:ea typeface="Microsoft Himalaya" panose="01010100010101010101" pitchFamily="2" charset="0"/>
+                <a:cs typeface="Dubai" panose="020B0503030403030204" pitchFamily="34" charset="-78"/>
+              </a:rPr>
+              <a:t>-&gt;</a:t>
+            </a:r>
+            <a:r>
+              <a:rPr lang="en-US" altLang="zh-CN" sz="1200" dirty="0">
+                <a:solidFill>
+                  <a:srgbClr val="000000"/>
+                </a:solidFill>
+                <a:latin typeface="Dubai" panose="020B0503030403030204" pitchFamily="34" charset="-78"/>
+                <a:ea typeface="Microsoft Himalaya" panose="01010100010101010101" pitchFamily="2" charset="0"/>
+                <a:cs typeface="Dubai" panose="020B0503030403030204" pitchFamily="34" charset="-78"/>
+              </a:rPr>
+              <a:t>pipeline()</a:t>
+            </a:r>
+            <a:r>
+              <a:rPr lang="en-US" altLang="zh-CN" sz="1200" dirty="0">
+                <a:solidFill>
+                  <a:srgbClr val="008080"/>
+                </a:solidFill>
+                <a:latin typeface="Dubai" panose="020B0503030403030204" pitchFamily="34" charset="-78"/>
+                <a:ea typeface="Microsoft Himalaya" panose="01010100010101010101" pitchFamily="2" charset="0"/>
+                <a:cs typeface="Dubai" panose="020B0503030403030204" pitchFamily="34" charset="-78"/>
+              </a:rPr>
+              <a:t>-&gt;</a:t>
+            </a:r>
+            <a:r>
+              <a:rPr lang="en-US" altLang="zh-CN" sz="1200" dirty="0" err="1">
+                <a:solidFill>
+                  <a:srgbClr val="000000"/>
+                </a:solidFill>
+                <a:latin typeface="Dubai" panose="020B0503030403030204" pitchFamily="34" charset="-78"/>
+                <a:ea typeface="Microsoft Himalaya" panose="01010100010101010101" pitchFamily="2" charset="0"/>
+                <a:cs typeface="Dubai" panose="020B0503030403030204" pitchFamily="34" charset="-78"/>
+              </a:rPr>
+              <a:t>add_last</a:t>
+            </a:r>
+            <a:r>
+              <a:rPr lang="en-US" altLang="zh-CN" sz="1200" dirty="0">
+                <a:solidFill>
+                  <a:srgbClr val="000000"/>
+                </a:solidFill>
+                <a:latin typeface="Dubai" panose="020B0503030403030204" pitchFamily="34" charset="-78"/>
+                <a:ea typeface="Microsoft Himalaya" panose="01010100010101010101" pitchFamily="2" charset="0"/>
+                <a:cs typeface="Dubai" panose="020B0503030403030204" pitchFamily="34" charset="-78"/>
+              </a:rPr>
+              <a:t>(</a:t>
+            </a:r>
+            <a:r>
+              <a:rPr lang="en-US" altLang="zh-CN" sz="1200" dirty="0" err="1">
+                <a:solidFill>
+                  <a:srgbClr val="000000"/>
+                </a:solidFill>
+                <a:latin typeface="Dubai" panose="020B0503030403030204" pitchFamily="34" charset="-78"/>
+                <a:ea typeface="Microsoft Himalaya" panose="01010100010101010101" pitchFamily="2" charset="0"/>
+                <a:cs typeface="Dubai" panose="020B0503030403030204" pitchFamily="34" charset="-78"/>
+              </a:rPr>
+              <a:t>netp</a:t>
+            </a:r>
+            <a:r>
+              <a:rPr lang="en-US" altLang="zh-CN" sz="1200" dirty="0">
+                <a:solidFill>
+                  <a:srgbClr val="000000"/>
+                </a:solidFill>
+                <a:latin typeface="Dubai" panose="020B0503030403030204" pitchFamily="34" charset="-78"/>
+                <a:ea typeface="Microsoft Himalaya" panose="01010100010101010101" pitchFamily="2" charset="0"/>
+                <a:cs typeface="Dubai" panose="020B0503030403030204" pitchFamily="34" charset="-78"/>
+              </a:rPr>
+              <a:t>::</a:t>
+            </a:r>
+            <a:r>
+              <a:rPr lang="en-US" altLang="zh-CN" sz="1200" dirty="0" err="1">
+                <a:solidFill>
+                  <a:srgbClr val="000000"/>
+                </a:solidFill>
+                <a:latin typeface="Dubai" panose="020B0503030403030204" pitchFamily="34" charset="-78"/>
+                <a:ea typeface="Microsoft Himalaya" panose="01010100010101010101" pitchFamily="2" charset="0"/>
+                <a:cs typeface="Dubai" panose="020B0503030403030204" pitchFamily="34" charset="-78"/>
+              </a:rPr>
+              <a:t>make_ref</a:t>
+            </a:r>
+            <a:r>
+              <a:rPr lang="en-US" altLang="zh-CN" sz="1200" dirty="0">
+                <a:solidFill>
+                  <a:srgbClr val="000000"/>
+                </a:solidFill>
+                <a:latin typeface="Dubai" panose="020B0503030403030204" pitchFamily="34" charset="-78"/>
+                <a:ea typeface="Microsoft Himalaya" panose="01010100010101010101" pitchFamily="2" charset="0"/>
+                <a:cs typeface="Dubai" panose="020B0503030403030204" pitchFamily="34" charset="-78"/>
+              </a:rPr>
+              <a:t>&lt;</a:t>
+            </a:r>
+            <a:r>
+              <a:rPr lang="en-US" altLang="zh-CN" sz="1200" dirty="0">
+                <a:solidFill>
+                  <a:srgbClr val="2B91AF"/>
+                </a:solidFill>
+                <a:latin typeface="Dubai" panose="020B0503030403030204" pitchFamily="34" charset="-78"/>
+                <a:ea typeface="Microsoft Himalaya" panose="01010100010101010101" pitchFamily="2" charset="0"/>
+                <a:cs typeface="Dubai" panose="020B0503030403030204" pitchFamily="34" charset="-78"/>
+              </a:rPr>
+              <a:t>Pong</a:t>
+            </a:r>
+            <a:r>
+              <a:rPr lang="en-US" altLang="zh-CN" sz="1200" dirty="0">
+                <a:solidFill>
+                  <a:srgbClr val="000000"/>
+                </a:solidFill>
+                <a:latin typeface="Dubai" panose="020B0503030403030204" pitchFamily="34" charset="-78"/>
+                <a:ea typeface="Microsoft Himalaya" panose="01010100010101010101" pitchFamily="2" charset="0"/>
+                <a:cs typeface="Dubai" panose="020B0503030403030204" pitchFamily="34" charset="-78"/>
+              </a:rPr>
+              <a:t>&gt;());</a:t>
+            </a:r>
+          </a:p>
+          <a:p>
+            <a:r>
+              <a:rPr lang="en-US" altLang="zh-CN" sz="1200" dirty="0">
+                <a:solidFill>
+                  <a:srgbClr val="000000"/>
+                </a:solidFill>
+                <a:latin typeface="Dubai" panose="020B0503030403030204" pitchFamily="34" charset="-78"/>
+                <a:ea typeface="Microsoft Himalaya" panose="01010100010101010101" pitchFamily="2" charset="0"/>
+                <a:cs typeface="Dubai" panose="020B0503030403030204" pitchFamily="34" charset="-78"/>
+              </a:rPr>
+              <a:t>});</a:t>
+            </a:r>
+          </a:p>
+          <a:p>
+            <a:r>
+              <a:rPr lang="en-US" altLang="zh-CN" sz="1200" dirty="0">
+                <a:solidFill>
+                  <a:srgbClr val="000000"/>
+                </a:solidFill>
+                <a:latin typeface="Dubai" panose="020B0503030403030204" pitchFamily="34" charset="-78"/>
+                <a:ea typeface="Microsoft Himalaya" panose="01010100010101010101" pitchFamily="2" charset="0"/>
+                <a:cs typeface="Dubai" panose="020B0503030403030204" pitchFamily="34" charset="-78"/>
+              </a:rPr>
+              <a:t>if(std::get&lt;0&gt;(</a:t>
+            </a:r>
+            <a:r>
+              <a:rPr lang="en-US" altLang="zh-CN" sz="1200" dirty="0" err="1">
+                <a:solidFill>
+                  <a:srgbClr val="000000"/>
+                </a:solidFill>
+                <a:latin typeface="Dubai" panose="020B0503030403030204" pitchFamily="34" charset="-78"/>
+                <a:ea typeface="Microsoft Himalaya" panose="01010100010101010101" pitchFamily="2" charset="0"/>
+                <a:cs typeface="Dubai" panose="020B0503030403030204" pitchFamily="34" charset="-78"/>
+              </a:rPr>
+              <a:t>listen_p</a:t>
+            </a:r>
+            <a:r>
+              <a:rPr lang="en-US" altLang="zh-CN" sz="1200" dirty="0">
+                <a:solidFill>
+                  <a:srgbClr val="008080"/>
+                </a:solidFill>
+                <a:latin typeface="Dubai" panose="020B0503030403030204" pitchFamily="34" charset="-78"/>
+                <a:ea typeface="Microsoft Himalaya" panose="01010100010101010101" pitchFamily="2" charset="0"/>
+                <a:cs typeface="Dubai" panose="020B0503030403030204" pitchFamily="34" charset="-78"/>
+              </a:rPr>
+              <a:t>-&gt;</a:t>
+            </a:r>
+            <a:r>
+              <a:rPr lang="en-US" altLang="zh-CN" sz="1200" dirty="0">
+                <a:solidFill>
+                  <a:srgbClr val="000000"/>
+                </a:solidFill>
+                <a:latin typeface="Dubai" panose="020B0503030403030204" pitchFamily="34" charset="-78"/>
+                <a:ea typeface="Microsoft Himalaya" panose="01010100010101010101" pitchFamily="2" charset="0"/>
+                <a:cs typeface="Dubai" panose="020B0503030403030204" pitchFamily="34" charset="-78"/>
+              </a:rPr>
+              <a:t>get() != </a:t>
+            </a:r>
+            <a:r>
+              <a:rPr lang="en-US" altLang="zh-CN" sz="1200" dirty="0" err="1">
+                <a:solidFill>
+                  <a:srgbClr val="000000"/>
+                </a:solidFill>
+                <a:latin typeface="Dubai" panose="020B0503030403030204" pitchFamily="34" charset="-78"/>
+                <a:ea typeface="Microsoft Himalaya" panose="01010100010101010101" pitchFamily="2" charset="0"/>
+                <a:cs typeface="Dubai" panose="020B0503030403030204" pitchFamily="34" charset="-78"/>
+              </a:rPr>
+              <a:t>netp</a:t>
+            </a:r>
+            <a:r>
+              <a:rPr lang="en-US" altLang="zh-CN" sz="1200" dirty="0">
+                <a:solidFill>
+                  <a:srgbClr val="000000"/>
+                </a:solidFill>
+                <a:latin typeface="Dubai" panose="020B0503030403030204" pitchFamily="34" charset="-78"/>
+                <a:ea typeface="Microsoft Himalaya" panose="01010100010101010101" pitchFamily="2" charset="0"/>
+                <a:cs typeface="Dubai" panose="020B0503030403030204" pitchFamily="34" charset="-78"/>
+              </a:rPr>
+              <a:t>::Ok) {    </a:t>
+            </a:r>
+          </a:p>
+          <a:p>
+            <a:r>
+              <a:rPr lang="en-US" altLang="zh-CN" sz="1200" dirty="0">
+                <a:solidFill>
+                  <a:srgbClr val="000000"/>
+                </a:solidFill>
+                <a:latin typeface="Dubai" panose="020B0503030403030204" pitchFamily="34" charset="-78"/>
+                <a:ea typeface="Microsoft Himalaya" panose="01010100010101010101" pitchFamily="2" charset="0"/>
+                <a:cs typeface="Dubai" panose="020B0503030403030204" pitchFamily="34" charset="-78"/>
+              </a:rPr>
+              <a:t>    //</a:t>
+            </a:r>
+          </a:p>
+          <a:p>
+            <a:r>
+              <a:rPr lang="en-US" altLang="zh-CN" sz="1200" dirty="0">
+                <a:solidFill>
+                  <a:srgbClr val="000000"/>
+                </a:solidFill>
+                <a:latin typeface="Dubai" panose="020B0503030403030204" pitchFamily="34" charset="-78"/>
+                <a:ea typeface="Microsoft Himalaya" panose="01010100010101010101" pitchFamily="2" charset="0"/>
+                <a:cs typeface="Dubai" panose="020B0503030403030204" pitchFamily="34" charset="-78"/>
+              </a:rPr>
+              <a:t>}</a:t>
+            </a:r>
+          </a:p>
+          <a:p>
+            <a:r>
+              <a:rPr lang="en-US" altLang="zh-CN" sz="1200" dirty="0">
+                <a:solidFill>
+                  <a:srgbClr val="000000"/>
+                </a:solidFill>
+                <a:latin typeface="Dubai" panose="020B0503030403030204" pitchFamily="34" charset="-78"/>
+                <a:ea typeface="Microsoft Himalaya" panose="01010100010101010101" pitchFamily="2" charset="0"/>
+                <a:cs typeface="Dubai" panose="020B0503030403030204" pitchFamily="34" charset="-78"/>
+              </a:rPr>
+              <a:t>…</a:t>
+            </a:r>
+            <a:endParaRPr lang="en-US" altLang="zh-CN" sz="1200" dirty="0">
+              <a:latin typeface="Dubai" panose="020B0503030403030204" pitchFamily="34" charset="-78"/>
+              <a:cs typeface="Dubai" panose="020B0503030403030204" pitchFamily="34" charset="-78"/>
+            </a:endParaRPr>
+          </a:p>
+          <a:p>
+            <a:r>
+              <a:rPr lang="en-US" altLang="zh-CN" sz="1200" dirty="0">
+                <a:solidFill>
+                  <a:srgbClr val="6F008A"/>
+                </a:solidFill>
+                <a:latin typeface="Dubai" panose="020B0503030403030204" pitchFamily="34" charset="-78"/>
+                <a:ea typeface="Microsoft Himalaya" panose="01010100010101010101" pitchFamily="2" charset="0"/>
+                <a:cs typeface="Dubai" panose="020B0503030403030204" pitchFamily="34" charset="-78"/>
+              </a:rPr>
+              <a:t>NRP</a:t>
+            </a:r>
+            <a:r>
+              <a:rPr lang="en-US" altLang="zh-CN" sz="1200" dirty="0">
+                <a:solidFill>
+                  <a:srgbClr val="000000"/>
+                </a:solidFill>
+                <a:latin typeface="Dubai" panose="020B0503030403030204" pitchFamily="34" charset="-78"/>
+                <a:ea typeface="Microsoft Himalaya" panose="01010100010101010101" pitchFamily="2" charset="0"/>
+                <a:cs typeface="Dubai" panose="020B0503030403030204" pitchFamily="34" charset="-78"/>
+              </a:rPr>
+              <a:t>&lt;</a:t>
+            </a:r>
+            <a:r>
+              <a:rPr lang="en-US" altLang="zh-CN" sz="1200" dirty="0" err="1">
+                <a:solidFill>
+                  <a:srgbClr val="000000"/>
+                </a:solidFill>
+                <a:latin typeface="Dubai" panose="020B0503030403030204" pitchFamily="34" charset="-78"/>
+                <a:ea typeface="Microsoft Himalaya" panose="01010100010101010101" pitchFamily="2" charset="0"/>
+                <a:cs typeface="Dubai" panose="020B0503030403030204" pitchFamily="34" charset="-78"/>
+              </a:rPr>
+              <a:t>netp</a:t>
+            </a:r>
+            <a:r>
+              <a:rPr lang="en-US" altLang="zh-CN" sz="1200" dirty="0">
+                <a:solidFill>
+                  <a:srgbClr val="000000"/>
+                </a:solidFill>
+                <a:latin typeface="Dubai" panose="020B0503030403030204" pitchFamily="34" charset="-78"/>
+                <a:ea typeface="Microsoft Himalaya" panose="01010100010101010101" pitchFamily="2" charset="0"/>
+                <a:cs typeface="Dubai" panose="020B0503030403030204" pitchFamily="34" charset="-78"/>
+              </a:rPr>
+              <a:t>::</a:t>
+            </a:r>
+            <a:r>
+              <a:rPr lang="en-US" altLang="zh-CN" sz="1200" dirty="0" err="1">
+                <a:solidFill>
+                  <a:srgbClr val="2B91AF"/>
+                </a:solidFill>
+                <a:latin typeface="Dubai" panose="020B0503030403030204" pitchFamily="34" charset="-78"/>
+                <a:ea typeface="Microsoft Himalaya" panose="01010100010101010101" pitchFamily="2" charset="0"/>
+                <a:cs typeface="Dubai" panose="020B0503030403030204" pitchFamily="34" charset="-78"/>
+              </a:rPr>
+              <a:t>channel_dial_promise</a:t>
+            </a:r>
+            <a:r>
+              <a:rPr lang="en-US" altLang="zh-CN" sz="1200" dirty="0">
+                <a:solidFill>
+                  <a:srgbClr val="000000"/>
+                </a:solidFill>
+                <a:latin typeface="Dubai" panose="020B0503030403030204" pitchFamily="34" charset="-78"/>
+                <a:ea typeface="Microsoft Himalaya" panose="01010100010101010101" pitchFamily="2" charset="0"/>
+                <a:cs typeface="Dubai" panose="020B0503030403030204" pitchFamily="34" charset="-78"/>
+              </a:rPr>
+              <a:t>&gt; </a:t>
+            </a:r>
+            <a:r>
+              <a:rPr lang="en-US" altLang="zh-CN" sz="1200" dirty="0" err="1">
+                <a:solidFill>
+                  <a:srgbClr val="000000"/>
+                </a:solidFill>
+                <a:latin typeface="Dubai" panose="020B0503030403030204" pitchFamily="34" charset="-78"/>
+                <a:ea typeface="Microsoft Himalaya" panose="01010100010101010101" pitchFamily="2" charset="0"/>
+                <a:cs typeface="Dubai" panose="020B0503030403030204" pitchFamily="34" charset="-78"/>
+              </a:rPr>
+              <a:t>dial_p</a:t>
+            </a:r>
+            <a:r>
+              <a:rPr lang="en-US" altLang="zh-CN" sz="1200" dirty="0">
+                <a:solidFill>
+                  <a:srgbClr val="000000"/>
+                </a:solidFill>
+                <a:latin typeface="Dubai" panose="020B0503030403030204" pitchFamily="34" charset="-78"/>
+                <a:ea typeface="Microsoft Himalaya" panose="01010100010101010101" pitchFamily="2" charset="0"/>
+                <a:cs typeface="Dubai" panose="020B0503030403030204" pitchFamily="34" charset="-78"/>
+              </a:rPr>
+              <a:t> = </a:t>
+            </a:r>
+          </a:p>
+          <a:p>
+            <a:r>
+              <a:rPr lang="en-US" altLang="zh-CN" sz="1200" dirty="0" err="1">
+                <a:solidFill>
+                  <a:srgbClr val="000000"/>
+                </a:solidFill>
+                <a:latin typeface="Dubai" panose="020B0503030403030204" pitchFamily="34" charset="-78"/>
+                <a:ea typeface="Microsoft Himalaya" panose="01010100010101010101" pitchFamily="2" charset="0"/>
+                <a:cs typeface="Dubai" panose="020B0503030403030204" pitchFamily="34" charset="-78"/>
+              </a:rPr>
+              <a:t>netp</a:t>
+            </a:r>
+            <a:r>
+              <a:rPr lang="en-US" altLang="zh-CN" sz="1200" dirty="0">
+                <a:solidFill>
+                  <a:srgbClr val="000000"/>
+                </a:solidFill>
+                <a:latin typeface="Dubai" panose="020B0503030403030204" pitchFamily="34" charset="-78"/>
+                <a:ea typeface="Microsoft Himalaya" panose="01010100010101010101" pitchFamily="2" charset="0"/>
+                <a:cs typeface="Dubai" panose="020B0503030403030204" pitchFamily="34" charset="-78"/>
+              </a:rPr>
+              <a:t>::</a:t>
+            </a:r>
+            <a:r>
+              <a:rPr lang="en-US" altLang="zh-CN" sz="1200" dirty="0">
+                <a:solidFill>
+                  <a:srgbClr val="2B91AF"/>
+                </a:solidFill>
+                <a:latin typeface="Dubai" panose="020B0503030403030204" pitchFamily="34" charset="-78"/>
+                <a:ea typeface="Microsoft Himalaya" panose="01010100010101010101" pitchFamily="2" charset="0"/>
+                <a:cs typeface="Dubai" panose="020B0503030403030204" pitchFamily="34" charset="-78"/>
+              </a:rPr>
+              <a:t>socket</a:t>
+            </a:r>
+            <a:r>
+              <a:rPr lang="en-US" altLang="zh-CN" sz="1200" dirty="0">
+                <a:solidFill>
+                  <a:srgbClr val="000000"/>
+                </a:solidFill>
+                <a:latin typeface="Dubai" panose="020B0503030403030204" pitchFamily="34" charset="-78"/>
+                <a:ea typeface="Microsoft Himalaya" panose="01010100010101010101" pitchFamily="2" charset="0"/>
+                <a:cs typeface="Dubai" panose="020B0503030403030204" pitchFamily="34" charset="-78"/>
+              </a:rPr>
+              <a:t>::dial(</a:t>
+            </a:r>
+            <a:r>
+              <a:rPr lang="en-US" altLang="zh-CN" sz="1200" dirty="0">
+                <a:solidFill>
+                  <a:srgbClr val="A31515"/>
+                </a:solidFill>
+                <a:latin typeface="Dubai" panose="020B0503030403030204" pitchFamily="34" charset="-78"/>
+                <a:ea typeface="Microsoft Himalaya" panose="01010100010101010101" pitchFamily="2" charset="0"/>
+                <a:cs typeface="Dubai" panose="020B0503030403030204" pitchFamily="34" charset="-78"/>
+              </a:rPr>
+              <a:t>"</a:t>
+            </a:r>
+            <a:r>
+              <a:rPr lang="en-US" altLang="zh-CN" sz="1200" dirty="0" err="1">
+                <a:solidFill>
+                  <a:srgbClr val="A31515"/>
+                </a:solidFill>
+                <a:latin typeface="Dubai" panose="020B0503030403030204" pitchFamily="34" charset="-78"/>
+                <a:ea typeface="Microsoft Himalaya" panose="01010100010101010101" pitchFamily="2" charset="0"/>
+                <a:cs typeface="Dubai" panose="020B0503030403030204" pitchFamily="34" charset="-78"/>
+              </a:rPr>
+              <a:t>tcp</a:t>
+            </a:r>
+            <a:r>
+              <a:rPr lang="en-US" altLang="zh-CN" sz="1200" dirty="0">
+                <a:solidFill>
+                  <a:srgbClr val="A31515"/>
+                </a:solidFill>
+                <a:latin typeface="Dubai" panose="020B0503030403030204" pitchFamily="34" charset="-78"/>
+                <a:ea typeface="Microsoft Himalaya" panose="01010100010101010101" pitchFamily="2" charset="0"/>
+                <a:cs typeface="Dubai" panose="020B0503030403030204" pitchFamily="34" charset="-78"/>
+              </a:rPr>
+              <a:t>://127.0.0.1:22137"</a:t>
+            </a:r>
+            <a:r>
+              <a:rPr lang="en-US" altLang="zh-CN" sz="1200" dirty="0">
+                <a:solidFill>
+                  <a:srgbClr val="000000"/>
+                </a:solidFill>
+                <a:latin typeface="Dubai" panose="020B0503030403030204" pitchFamily="34" charset="-78"/>
+                <a:ea typeface="Microsoft Himalaya" panose="01010100010101010101" pitchFamily="2" charset="0"/>
+                <a:cs typeface="Dubai" panose="020B0503030403030204" pitchFamily="34" charset="-78"/>
+              </a:rPr>
+              <a:t>, [](</a:t>
+            </a:r>
+            <a:r>
+              <a:rPr lang="en-US" altLang="zh-CN" sz="1200" dirty="0">
+                <a:solidFill>
+                  <a:srgbClr val="6F008A"/>
+                </a:solidFill>
+                <a:latin typeface="Dubai" panose="020B0503030403030204" pitchFamily="34" charset="-78"/>
+                <a:ea typeface="Microsoft Himalaya" panose="01010100010101010101" pitchFamily="2" charset="0"/>
+                <a:cs typeface="Dubai" panose="020B0503030403030204" pitchFamily="34" charset="-78"/>
+              </a:rPr>
+              <a:t>NRP</a:t>
+            </a:r>
+            <a:r>
+              <a:rPr lang="en-US" altLang="zh-CN" sz="1200" dirty="0">
+                <a:solidFill>
+                  <a:srgbClr val="000000"/>
+                </a:solidFill>
+                <a:latin typeface="Dubai" panose="020B0503030403030204" pitchFamily="34" charset="-78"/>
+                <a:ea typeface="Microsoft Himalaya" panose="01010100010101010101" pitchFamily="2" charset="0"/>
+                <a:cs typeface="Dubai" panose="020B0503030403030204" pitchFamily="34" charset="-78"/>
+              </a:rPr>
+              <a:t>&lt;</a:t>
+            </a:r>
+            <a:r>
+              <a:rPr lang="en-US" altLang="zh-CN" sz="1200" dirty="0" err="1">
+                <a:solidFill>
+                  <a:srgbClr val="000000"/>
+                </a:solidFill>
+                <a:latin typeface="Dubai" panose="020B0503030403030204" pitchFamily="34" charset="-78"/>
+                <a:ea typeface="Microsoft Himalaya" panose="01010100010101010101" pitchFamily="2" charset="0"/>
+                <a:cs typeface="Dubai" panose="020B0503030403030204" pitchFamily="34" charset="-78"/>
+              </a:rPr>
+              <a:t>netp</a:t>
+            </a:r>
+            <a:r>
+              <a:rPr lang="en-US" altLang="zh-CN" sz="1200" dirty="0">
+                <a:solidFill>
+                  <a:srgbClr val="000000"/>
+                </a:solidFill>
+                <a:latin typeface="Dubai" panose="020B0503030403030204" pitchFamily="34" charset="-78"/>
+                <a:ea typeface="Microsoft Himalaya" panose="01010100010101010101" pitchFamily="2" charset="0"/>
+                <a:cs typeface="Dubai" panose="020B0503030403030204" pitchFamily="34" charset="-78"/>
+              </a:rPr>
+              <a:t>::</a:t>
+            </a:r>
+            <a:r>
+              <a:rPr lang="en-US" altLang="zh-CN" sz="1200" dirty="0">
+                <a:solidFill>
+                  <a:srgbClr val="2B91AF"/>
+                </a:solidFill>
+                <a:latin typeface="Dubai" panose="020B0503030403030204" pitchFamily="34" charset="-78"/>
+                <a:ea typeface="Microsoft Himalaya" panose="01010100010101010101" pitchFamily="2" charset="0"/>
+                <a:cs typeface="Dubai" panose="020B0503030403030204" pitchFamily="34" charset="-78"/>
+              </a:rPr>
+              <a:t>channel</a:t>
+            </a:r>
+            <a:r>
+              <a:rPr lang="en-US" altLang="zh-CN" sz="1200" dirty="0">
+                <a:solidFill>
+                  <a:srgbClr val="000000"/>
+                </a:solidFill>
+                <a:latin typeface="Dubai" panose="020B0503030403030204" pitchFamily="34" charset="-78"/>
+                <a:ea typeface="Microsoft Himalaya" panose="01010100010101010101" pitchFamily="2" charset="0"/>
+                <a:cs typeface="Dubai" panose="020B0503030403030204" pitchFamily="34" charset="-78"/>
+              </a:rPr>
+              <a:t>&gt; </a:t>
+            </a:r>
+            <a:r>
+              <a:rPr lang="en-US" altLang="zh-CN" sz="1200" dirty="0">
+                <a:solidFill>
+                  <a:srgbClr val="0000FF"/>
+                </a:solidFill>
+                <a:latin typeface="Dubai" panose="020B0503030403030204" pitchFamily="34" charset="-78"/>
+                <a:ea typeface="Microsoft Himalaya" panose="01010100010101010101" pitchFamily="2" charset="0"/>
+                <a:cs typeface="Dubai" panose="020B0503030403030204" pitchFamily="34" charset="-78"/>
+              </a:rPr>
+              <a:t>const</a:t>
+            </a:r>
+            <a:r>
+              <a:rPr lang="en-US" altLang="zh-CN" sz="1200" dirty="0">
+                <a:solidFill>
+                  <a:srgbClr val="000000"/>
+                </a:solidFill>
+                <a:latin typeface="Dubai" panose="020B0503030403030204" pitchFamily="34" charset="-78"/>
+                <a:ea typeface="Microsoft Himalaya" panose="01010100010101010101" pitchFamily="2" charset="0"/>
+                <a:cs typeface="Dubai" panose="020B0503030403030204" pitchFamily="34" charset="-78"/>
+              </a:rPr>
+              <a:t>&amp; </a:t>
+            </a:r>
+            <a:r>
+              <a:rPr lang="en-US" altLang="zh-CN" sz="1200" dirty="0" err="1">
+                <a:solidFill>
+                  <a:srgbClr val="808080"/>
+                </a:solidFill>
+                <a:latin typeface="Dubai" panose="020B0503030403030204" pitchFamily="34" charset="-78"/>
+                <a:ea typeface="Microsoft Himalaya" panose="01010100010101010101" pitchFamily="2" charset="0"/>
+                <a:cs typeface="Dubai" panose="020B0503030403030204" pitchFamily="34" charset="-78"/>
+              </a:rPr>
+              <a:t>ch</a:t>
+            </a:r>
+            <a:r>
+              <a:rPr lang="en-US" altLang="zh-CN" sz="1200" dirty="0">
+                <a:solidFill>
+                  <a:srgbClr val="000000"/>
+                </a:solidFill>
+                <a:latin typeface="Dubai" panose="020B0503030403030204" pitchFamily="34" charset="-78"/>
+                <a:ea typeface="Microsoft Himalaya" panose="01010100010101010101" pitchFamily="2" charset="0"/>
+                <a:cs typeface="Dubai" panose="020B0503030403030204" pitchFamily="34" charset="-78"/>
+              </a:rPr>
+              <a:t>) {</a:t>
+            </a:r>
+          </a:p>
+          <a:p>
+            <a:r>
+              <a:rPr lang="en-US" altLang="zh-CN" sz="1200" dirty="0">
+                <a:solidFill>
+                  <a:srgbClr val="808080"/>
+                </a:solidFill>
+                <a:latin typeface="Dubai" panose="020B0503030403030204" pitchFamily="34" charset="-78"/>
+                <a:ea typeface="Microsoft Himalaya" panose="01010100010101010101" pitchFamily="2" charset="0"/>
+                <a:cs typeface="Dubai" panose="020B0503030403030204" pitchFamily="34" charset="-78"/>
+              </a:rPr>
+              <a:t>    </a:t>
+            </a:r>
+            <a:r>
+              <a:rPr lang="en-US" altLang="zh-CN" sz="1200" dirty="0" err="1">
+                <a:solidFill>
+                  <a:srgbClr val="808080"/>
+                </a:solidFill>
+                <a:latin typeface="Dubai" panose="020B0503030403030204" pitchFamily="34" charset="-78"/>
+                <a:ea typeface="Microsoft Himalaya" panose="01010100010101010101" pitchFamily="2" charset="0"/>
+                <a:cs typeface="Dubai" panose="020B0503030403030204" pitchFamily="34" charset="-78"/>
+              </a:rPr>
+              <a:t>ch</a:t>
+            </a:r>
+            <a:r>
+              <a:rPr lang="en-US" altLang="zh-CN" sz="1200" dirty="0">
+                <a:solidFill>
+                  <a:srgbClr val="008080"/>
+                </a:solidFill>
+                <a:latin typeface="Dubai" panose="020B0503030403030204" pitchFamily="34" charset="-78"/>
+                <a:ea typeface="Microsoft Himalaya" panose="01010100010101010101" pitchFamily="2" charset="0"/>
+                <a:cs typeface="Dubai" panose="020B0503030403030204" pitchFamily="34" charset="-78"/>
+              </a:rPr>
+              <a:t>-&gt;</a:t>
+            </a:r>
+            <a:r>
+              <a:rPr lang="en-US" altLang="zh-CN" sz="1200" dirty="0">
+                <a:solidFill>
+                  <a:srgbClr val="000000"/>
+                </a:solidFill>
+                <a:latin typeface="Dubai" panose="020B0503030403030204" pitchFamily="34" charset="-78"/>
+                <a:ea typeface="Microsoft Himalaya" panose="01010100010101010101" pitchFamily="2" charset="0"/>
+                <a:cs typeface="Dubai" panose="020B0503030403030204" pitchFamily="34" charset="-78"/>
+              </a:rPr>
+              <a:t>pipeline()</a:t>
+            </a:r>
+            <a:r>
+              <a:rPr lang="en-US" altLang="zh-CN" sz="1200" dirty="0">
+                <a:solidFill>
+                  <a:srgbClr val="008080"/>
+                </a:solidFill>
+                <a:latin typeface="Dubai" panose="020B0503030403030204" pitchFamily="34" charset="-78"/>
+                <a:ea typeface="Microsoft Himalaya" panose="01010100010101010101" pitchFamily="2" charset="0"/>
+                <a:cs typeface="Dubai" panose="020B0503030403030204" pitchFamily="34" charset="-78"/>
+              </a:rPr>
+              <a:t>-&gt;</a:t>
+            </a:r>
+            <a:r>
+              <a:rPr lang="en-US" altLang="zh-CN" sz="1200" dirty="0" err="1">
+                <a:solidFill>
+                  <a:srgbClr val="000000"/>
+                </a:solidFill>
+                <a:latin typeface="Dubai" panose="020B0503030403030204" pitchFamily="34" charset="-78"/>
+                <a:ea typeface="Microsoft Himalaya" panose="01010100010101010101" pitchFamily="2" charset="0"/>
+                <a:cs typeface="Dubai" panose="020B0503030403030204" pitchFamily="34" charset="-78"/>
+              </a:rPr>
+              <a:t>add_last</a:t>
+            </a:r>
+            <a:r>
+              <a:rPr lang="en-US" altLang="zh-CN" sz="1200" dirty="0">
+                <a:solidFill>
+                  <a:srgbClr val="000000"/>
+                </a:solidFill>
+                <a:latin typeface="Dubai" panose="020B0503030403030204" pitchFamily="34" charset="-78"/>
+                <a:ea typeface="Microsoft Himalaya" panose="01010100010101010101" pitchFamily="2" charset="0"/>
+                <a:cs typeface="Dubai" panose="020B0503030403030204" pitchFamily="34" charset="-78"/>
+              </a:rPr>
+              <a:t>(</a:t>
+            </a:r>
+            <a:r>
+              <a:rPr lang="en-US" altLang="zh-CN" sz="1200" dirty="0" err="1">
+                <a:solidFill>
+                  <a:srgbClr val="000000"/>
+                </a:solidFill>
+                <a:latin typeface="Dubai" panose="020B0503030403030204" pitchFamily="34" charset="-78"/>
+                <a:ea typeface="Microsoft Himalaya" panose="01010100010101010101" pitchFamily="2" charset="0"/>
+                <a:cs typeface="Dubai" panose="020B0503030403030204" pitchFamily="34" charset="-78"/>
+              </a:rPr>
+              <a:t>netp</a:t>
+            </a:r>
+            <a:r>
+              <a:rPr lang="en-US" altLang="zh-CN" sz="1200" dirty="0">
+                <a:solidFill>
+                  <a:srgbClr val="000000"/>
+                </a:solidFill>
+                <a:latin typeface="Dubai" panose="020B0503030403030204" pitchFamily="34" charset="-78"/>
+                <a:ea typeface="Microsoft Himalaya" panose="01010100010101010101" pitchFamily="2" charset="0"/>
+                <a:cs typeface="Dubai" panose="020B0503030403030204" pitchFamily="34" charset="-78"/>
+              </a:rPr>
+              <a:t>::</a:t>
+            </a:r>
+            <a:r>
+              <a:rPr lang="en-US" altLang="zh-CN" sz="1200" dirty="0" err="1">
+                <a:solidFill>
+                  <a:srgbClr val="000000"/>
+                </a:solidFill>
+                <a:latin typeface="Dubai" panose="020B0503030403030204" pitchFamily="34" charset="-78"/>
+                <a:ea typeface="Microsoft Himalaya" panose="01010100010101010101" pitchFamily="2" charset="0"/>
+                <a:cs typeface="Dubai" panose="020B0503030403030204" pitchFamily="34" charset="-78"/>
+              </a:rPr>
+              <a:t>make_ref</a:t>
+            </a:r>
+            <a:r>
+              <a:rPr lang="en-US" altLang="zh-CN" sz="1200" dirty="0">
+                <a:solidFill>
+                  <a:srgbClr val="000000"/>
+                </a:solidFill>
+                <a:latin typeface="Dubai" panose="020B0503030403030204" pitchFamily="34" charset="-78"/>
+                <a:ea typeface="Microsoft Himalaya" panose="01010100010101010101" pitchFamily="2" charset="0"/>
+                <a:cs typeface="Dubai" panose="020B0503030403030204" pitchFamily="34" charset="-78"/>
+              </a:rPr>
+              <a:t>&lt;</a:t>
+            </a:r>
+            <a:r>
+              <a:rPr lang="en-US" altLang="zh-CN" sz="1200" dirty="0">
+                <a:solidFill>
+                  <a:srgbClr val="2B91AF"/>
+                </a:solidFill>
+                <a:latin typeface="Dubai" panose="020B0503030403030204" pitchFamily="34" charset="-78"/>
+                <a:ea typeface="Microsoft Himalaya" panose="01010100010101010101" pitchFamily="2" charset="0"/>
+                <a:cs typeface="Dubai" panose="020B0503030403030204" pitchFamily="34" charset="-78"/>
+              </a:rPr>
+              <a:t>Ping</a:t>
+            </a:r>
+            <a:r>
+              <a:rPr lang="en-US" altLang="zh-CN" sz="1200" dirty="0">
+                <a:solidFill>
+                  <a:srgbClr val="000000"/>
+                </a:solidFill>
+                <a:latin typeface="Dubai" panose="020B0503030403030204" pitchFamily="34" charset="-78"/>
+                <a:ea typeface="Microsoft Himalaya" panose="01010100010101010101" pitchFamily="2" charset="0"/>
+                <a:cs typeface="Dubai" panose="020B0503030403030204" pitchFamily="34" charset="-78"/>
+              </a:rPr>
+              <a:t>&gt;());</a:t>
+            </a:r>
+          </a:p>
+          <a:p>
+            <a:r>
+              <a:rPr lang="en-US" altLang="zh-CN" sz="1200" dirty="0">
+                <a:solidFill>
+                  <a:srgbClr val="000000"/>
+                </a:solidFill>
+                <a:latin typeface="Dubai" panose="020B0503030403030204" pitchFamily="34" charset="-78"/>
+                <a:ea typeface="Microsoft Himalaya" panose="01010100010101010101" pitchFamily="2" charset="0"/>
+                <a:cs typeface="Dubai" panose="020B0503030403030204" pitchFamily="34" charset="-78"/>
+              </a:rPr>
+              <a:t>});</a:t>
+            </a:r>
+            <a:endParaRPr lang="zh-CN" altLang="en-US" sz="1200" dirty="0">
+              <a:latin typeface="Microsoft Himalaya" panose="01010100010101010101" pitchFamily="2" charset="0"/>
+              <a:cs typeface="Microsoft Himalaya" panose="01010100010101010101" pitchFamily="2" charset="0"/>
+            </a:endParaRPr>
+          </a:p>
+        </p:txBody>
+      </p:sp>
+      <p:sp>
+        <p:nvSpPr>
+          <p:cNvPr id="8" name="TextBox 7">
+            <a:extLst>
+              <a:ext uri="{FF2B5EF4-FFF2-40B4-BE49-F238E27FC236}">
+                <a16:creationId xmlns:a16="http://schemas.microsoft.com/office/drawing/2014/main" id="{5277D8A9-DE76-44A0-B7EA-C7CD7E6045B8}"/>
+              </a:ext>
+            </a:extLst>
+          </p:cNvPr>
+          <p:cNvSpPr txBox="1"/>
+          <p:nvPr/>
+        </p:nvSpPr>
+        <p:spPr>
+          <a:xfrm rot="854291">
+            <a:off x="7331180" y="3546648"/>
+            <a:ext cx="623380" cy="307905"/>
+          </a:xfrm>
+          <a:prstGeom prst="rect">
+            <a:avLst/>
+          </a:prstGeom>
+          <a:noFill/>
+        </p:spPr>
+        <p:txBody>
+          <a:bodyPr wrap="square" rtlCol="0">
+            <a:spAutoFit/>
+          </a:bodyPr>
+          <a:lstStyle/>
+          <a:p>
+            <a:r>
+              <a:rPr lang="en-US" altLang="zh-CN" sz="1401" dirty="0">
+                <a:solidFill>
+                  <a:srgbClr val="FF0000"/>
+                </a:solidFill>
+              </a:rPr>
+              <a:t>Net+</a:t>
+            </a:r>
+            <a:endParaRPr lang="zh-CN" altLang="en-US" sz="1401" dirty="0">
+              <a:solidFill>
+                <a:srgbClr val="FF0000"/>
+              </a:solidFill>
+            </a:endParaRPr>
+          </a:p>
+        </p:txBody>
+      </p:sp>
+      <p:sp>
+        <p:nvSpPr>
+          <p:cNvPr id="9" name="TextBox 8">
+            <a:extLst>
+              <a:ext uri="{FF2B5EF4-FFF2-40B4-BE49-F238E27FC236}">
+                <a16:creationId xmlns:a16="http://schemas.microsoft.com/office/drawing/2014/main" id="{2CDD16D5-413D-49AA-BF62-66BAEB32FD9C}"/>
+              </a:ext>
+            </a:extLst>
+          </p:cNvPr>
+          <p:cNvSpPr txBox="1"/>
+          <p:nvPr/>
+        </p:nvSpPr>
+        <p:spPr>
+          <a:xfrm rot="19560390">
+            <a:off x="8635236" y="3262742"/>
+            <a:ext cx="949417" cy="369460"/>
+          </a:xfrm>
+          <a:prstGeom prst="rect">
+            <a:avLst/>
+          </a:prstGeom>
+          <a:noFill/>
+        </p:spPr>
+        <p:txBody>
+          <a:bodyPr wrap="square" rtlCol="0">
+            <a:spAutoFit/>
+          </a:bodyPr>
+          <a:lstStyle/>
+          <a:p>
+            <a:r>
+              <a:rPr lang="en-US" altLang="zh-CN" sz="1801" dirty="0" err="1">
+                <a:solidFill>
+                  <a:srgbClr val="FF0000"/>
+                </a:solidFill>
+              </a:rPr>
+              <a:t>Netplus</a:t>
+            </a:r>
+            <a:endParaRPr lang="zh-CN" altLang="en-US" sz="1801" dirty="0">
+              <a:solidFill>
+                <a:srgbClr val="FF0000"/>
+              </a:solidFill>
+            </a:endParaRPr>
+          </a:p>
+        </p:txBody>
+      </p:sp>
+      <p:sp>
+        <p:nvSpPr>
+          <p:cNvPr id="10" name="TextBox 9">
+            <a:extLst>
+              <a:ext uri="{FF2B5EF4-FFF2-40B4-BE49-F238E27FC236}">
+                <a16:creationId xmlns:a16="http://schemas.microsoft.com/office/drawing/2014/main" id="{D8EE3D10-2259-4FAC-B349-D9710C197883}"/>
+              </a:ext>
+            </a:extLst>
+          </p:cNvPr>
+          <p:cNvSpPr txBox="1"/>
+          <p:nvPr/>
+        </p:nvSpPr>
+        <p:spPr>
+          <a:xfrm rot="17834874">
+            <a:off x="9377192" y="2520461"/>
+            <a:ext cx="699230" cy="368883"/>
+          </a:xfrm>
+          <a:prstGeom prst="rect">
+            <a:avLst/>
+          </a:prstGeom>
+          <a:noFill/>
+        </p:spPr>
+        <p:txBody>
+          <a:bodyPr wrap="none" rtlCol="0">
+            <a:spAutoFit/>
+          </a:bodyPr>
+          <a:lstStyle/>
+          <a:p>
+            <a:r>
+              <a:rPr lang="en-US" altLang="zh-CN" sz="1801" dirty="0">
+                <a:solidFill>
+                  <a:srgbClr val="FF0000"/>
+                </a:solidFill>
+              </a:rPr>
+              <a:t>Net+</a:t>
+            </a:r>
+            <a:endParaRPr lang="zh-CN" altLang="en-US" sz="1801" dirty="0">
+              <a:solidFill>
+                <a:srgbClr val="FF0000"/>
+              </a:solidFill>
+            </a:endParaRPr>
+          </a:p>
+        </p:txBody>
+      </p:sp>
+      <p:pic>
+        <p:nvPicPr>
+          <p:cNvPr id="11" name="Graphic 10" descr="Treble clef">
+            <a:extLst>
+              <a:ext uri="{FF2B5EF4-FFF2-40B4-BE49-F238E27FC236}">
+                <a16:creationId xmlns:a16="http://schemas.microsoft.com/office/drawing/2014/main" id="{1D066A0B-5F28-45FA-A760-3A474C9784A8}"/>
+              </a:ext>
+            </a:extLst>
+          </p:cNvPr>
+          <p:cNvPicPr>
+            <a:picLocks noChangeAspect="1"/>
+          </p:cNvPicPr>
+          <p:nvPr/>
+        </p:nvPicPr>
+        <p:blipFill>
+          <a:blip r:embed="rId3">
+            <a:extLst>
+              <a:ext uri="{28A0092B-C50C-407E-A947-70E740481C1C}">
+                <a14:useLocalDpi xmlns:a14="http://schemas.microsoft.com/office/drawing/2010/main" val="0"/>
+              </a:ext>
+              <a:ext uri="{96DAC541-7B7A-43D3-8B79-37D633B846F1}">
+                <asvg:svgBlip xmlns:asvg="http://schemas.microsoft.com/office/drawing/2016/SVG/main" r:embed="rId4"/>
+              </a:ext>
+            </a:extLst>
+          </a:blip>
+          <a:stretch>
+            <a:fillRect/>
+          </a:stretch>
+        </p:blipFill>
+        <p:spPr>
+          <a:xfrm rot="682169">
+            <a:off x="7975653" y="3682208"/>
+            <a:ext cx="234189" cy="234555"/>
+          </a:xfrm>
+          <a:prstGeom prst="rect">
+            <a:avLst/>
+          </a:prstGeom>
+        </p:spPr>
+      </p:pic>
+      <p:pic>
+        <p:nvPicPr>
+          <p:cNvPr id="12" name="Graphic 11" descr="Music">
+            <a:extLst>
+              <a:ext uri="{FF2B5EF4-FFF2-40B4-BE49-F238E27FC236}">
+                <a16:creationId xmlns:a16="http://schemas.microsoft.com/office/drawing/2014/main" id="{CD62C2C5-DF7D-4279-A947-16C80C252C5A}"/>
+              </a:ext>
+            </a:extLst>
+          </p:cNvPr>
+          <p:cNvPicPr>
+            <a:picLocks noChangeAspect="1"/>
+          </p:cNvPicPr>
+          <p:nvPr/>
+        </p:nvPicPr>
+        <p:blipFill>
+          <a:blip r:embed="rId5">
+            <a:extLst>
+              <a:ext uri="{28A0092B-C50C-407E-A947-70E740481C1C}">
+                <a14:useLocalDpi xmlns:a14="http://schemas.microsoft.com/office/drawing/2010/main" val="0"/>
+              </a:ext>
+              <a:ext uri="{96DAC541-7B7A-43D3-8B79-37D633B846F1}">
+                <asvg:svgBlip xmlns:asvg="http://schemas.microsoft.com/office/drawing/2016/SVG/main" r:embed="rId6"/>
+              </a:ext>
+            </a:extLst>
+          </a:blip>
+          <a:stretch>
+            <a:fillRect/>
+          </a:stretch>
+        </p:blipFill>
+        <p:spPr>
+          <a:xfrm>
+            <a:off x="8154470" y="3739452"/>
+            <a:ext cx="168317" cy="168580"/>
+          </a:xfrm>
+          <a:prstGeom prst="rect">
+            <a:avLst/>
+          </a:prstGeom>
+        </p:spPr>
+      </p:pic>
+      <p:pic>
+        <p:nvPicPr>
+          <p:cNvPr id="15" name="Graphic 14" descr="Music">
+            <a:extLst>
+              <a:ext uri="{FF2B5EF4-FFF2-40B4-BE49-F238E27FC236}">
+                <a16:creationId xmlns:a16="http://schemas.microsoft.com/office/drawing/2014/main" id="{B39B3CEC-DA22-4568-BB9A-967DE97E0660}"/>
+              </a:ext>
+            </a:extLst>
+          </p:cNvPr>
+          <p:cNvPicPr>
+            <a:picLocks noChangeAspect="1"/>
+          </p:cNvPicPr>
+          <p:nvPr/>
+        </p:nvPicPr>
+        <p:blipFill>
+          <a:blip r:embed="rId5">
+            <a:extLst>
+              <a:ext uri="{28A0092B-C50C-407E-A947-70E740481C1C}">
+                <a14:useLocalDpi xmlns:a14="http://schemas.microsoft.com/office/drawing/2010/main" val="0"/>
+              </a:ext>
+              <a:ext uri="{96DAC541-7B7A-43D3-8B79-37D633B846F1}">
+                <asvg:svgBlip xmlns:asvg="http://schemas.microsoft.com/office/drawing/2016/SVG/main" r:embed="rId6"/>
+              </a:ext>
+            </a:extLst>
+          </a:blip>
+          <a:stretch>
+            <a:fillRect/>
+          </a:stretch>
+        </p:blipFill>
+        <p:spPr>
+          <a:xfrm>
+            <a:off x="9882533" y="2127396"/>
+            <a:ext cx="168317" cy="168580"/>
+          </a:xfrm>
+          <a:prstGeom prst="rect">
+            <a:avLst/>
+          </a:prstGeom>
+        </p:spPr>
+      </p:pic>
+      <p:pic>
+        <p:nvPicPr>
+          <p:cNvPr id="16" name="Graphic 15" descr="Treble clef">
+            <a:extLst>
+              <a:ext uri="{FF2B5EF4-FFF2-40B4-BE49-F238E27FC236}">
+                <a16:creationId xmlns:a16="http://schemas.microsoft.com/office/drawing/2014/main" id="{3A867ED4-A070-4336-BCA3-777349349F86}"/>
+              </a:ext>
+            </a:extLst>
+          </p:cNvPr>
+          <p:cNvPicPr>
+            <a:picLocks noChangeAspect="1"/>
+          </p:cNvPicPr>
+          <p:nvPr/>
+        </p:nvPicPr>
+        <p:blipFill>
+          <a:blip r:embed="rId3">
+            <a:extLst>
+              <a:ext uri="{28A0092B-C50C-407E-A947-70E740481C1C}">
+                <a14:useLocalDpi xmlns:a14="http://schemas.microsoft.com/office/drawing/2010/main" val="0"/>
+              </a:ext>
+              <a:ext uri="{96DAC541-7B7A-43D3-8B79-37D633B846F1}">
+                <asvg:svgBlip xmlns:asvg="http://schemas.microsoft.com/office/drawing/2016/SVG/main" r:embed="rId4"/>
+              </a:ext>
+            </a:extLst>
+          </a:blip>
+          <a:stretch>
+            <a:fillRect/>
+          </a:stretch>
+        </p:blipFill>
+        <p:spPr>
+          <a:xfrm rot="682169">
+            <a:off x="9698217" y="2078036"/>
+            <a:ext cx="234189" cy="234555"/>
+          </a:xfrm>
+          <a:prstGeom prst="rect">
+            <a:avLst/>
+          </a:prstGeom>
+        </p:spPr>
+      </p:pic>
+      <p:sp>
+        <p:nvSpPr>
+          <p:cNvPr id="18" name="TextBox 17">
+            <a:extLst>
+              <a:ext uri="{FF2B5EF4-FFF2-40B4-BE49-F238E27FC236}">
+                <a16:creationId xmlns:a16="http://schemas.microsoft.com/office/drawing/2014/main" id="{CCA074FF-1A49-4361-9048-1B85E31002F5}"/>
+              </a:ext>
+            </a:extLst>
+          </p:cNvPr>
+          <p:cNvSpPr txBox="1"/>
+          <p:nvPr/>
+        </p:nvSpPr>
+        <p:spPr>
+          <a:xfrm rot="20380695">
+            <a:off x="5474673" y="4751869"/>
+            <a:ext cx="4654632" cy="246221"/>
+          </a:xfrm>
+          <a:prstGeom prst="rect">
+            <a:avLst/>
+          </a:prstGeom>
+          <a:noFill/>
+        </p:spPr>
+        <p:txBody>
+          <a:bodyPr wrap="square" rtlCol="0">
+            <a:spAutoFit/>
+          </a:bodyPr>
+          <a:lstStyle/>
+          <a:p>
+            <a:r>
+              <a:rPr lang="en-US" altLang="zh-CN" sz="1000" dirty="0">
+                <a:solidFill>
+                  <a:srgbClr val="6F008A"/>
+                </a:solidFill>
+                <a:latin typeface="Dubai" panose="020B0503030403030204" pitchFamily="34" charset="-78"/>
+                <a:ea typeface="Microsoft Himalaya" panose="01010100010101010101" pitchFamily="2" charset="0"/>
+                <a:cs typeface="Dubai" panose="020B0503030403030204" pitchFamily="34" charset="-78"/>
+              </a:rPr>
+              <a:t>NRP</a:t>
+            </a:r>
+            <a:r>
+              <a:rPr lang="en-US" altLang="zh-CN" sz="1000" dirty="0">
+                <a:solidFill>
+                  <a:srgbClr val="000000"/>
+                </a:solidFill>
+                <a:latin typeface="Dubai" panose="020B0503030403030204" pitchFamily="34" charset="-78"/>
+                <a:ea typeface="Microsoft Himalaya" panose="01010100010101010101" pitchFamily="2" charset="0"/>
+                <a:cs typeface="Dubai" panose="020B0503030403030204" pitchFamily="34" charset="-78"/>
+              </a:rPr>
+              <a:t>&lt;</a:t>
+            </a:r>
+            <a:r>
+              <a:rPr lang="en-US" altLang="zh-CN" sz="1000" dirty="0" err="1">
+                <a:solidFill>
+                  <a:srgbClr val="000000"/>
+                </a:solidFill>
+                <a:latin typeface="Dubai" panose="020B0503030403030204" pitchFamily="34" charset="-78"/>
+                <a:ea typeface="Microsoft Himalaya" panose="01010100010101010101" pitchFamily="2" charset="0"/>
+                <a:cs typeface="Dubai" panose="020B0503030403030204" pitchFamily="34" charset="-78"/>
+              </a:rPr>
+              <a:t>netp</a:t>
+            </a:r>
+            <a:r>
+              <a:rPr lang="en-US" altLang="zh-CN" sz="1000" dirty="0">
+                <a:solidFill>
+                  <a:srgbClr val="000000"/>
+                </a:solidFill>
+                <a:latin typeface="Dubai" panose="020B0503030403030204" pitchFamily="34" charset="-78"/>
+                <a:ea typeface="Microsoft Himalaya" panose="01010100010101010101" pitchFamily="2" charset="0"/>
+                <a:cs typeface="Dubai" panose="020B0503030403030204" pitchFamily="34" charset="-78"/>
+              </a:rPr>
+              <a:t>::http::</a:t>
+            </a:r>
+            <a:r>
+              <a:rPr lang="en-US" altLang="zh-CN" sz="1000" dirty="0" err="1">
+                <a:solidFill>
+                  <a:srgbClr val="2B91AF"/>
+                </a:solidFill>
+                <a:latin typeface="Dubai" panose="020B0503030403030204" pitchFamily="34" charset="-78"/>
+                <a:ea typeface="Microsoft Himalaya" panose="01010100010101010101" pitchFamily="2" charset="0"/>
+                <a:cs typeface="Dubai" panose="020B0503030403030204" pitchFamily="34" charset="-78"/>
+              </a:rPr>
+              <a:t>request_promise</a:t>
+            </a:r>
+            <a:r>
+              <a:rPr lang="en-US" altLang="zh-CN" sz="1000" dirty="0">
+                <a:solidFill>
+                  <a:srgbClr val="000000"/>
+                </a:solidFill>
+                <a:latin typeface="Dubai" panose="020B0503030403030204" pitchFamily="34" charset="-78"/>
+                <a:ea typeface="Microsoft Himalaya" panose="01010100010101010101" pitchFamily="2" charset="0"/>
+                <a:cs typeface="Dubai" panose="020B0503030403030204" pitchFamily="34" charset="-78"/>
+              </a:rPr>
+              <a:t>&gt; </a:t>
+            </a:r>
+            <a:r>
+              <a:rPr lang="en-US" altLang="zh-CN" sz="1000" dirty="0" err="1">
+                <a:solidFill>
+                  <a:srgbClr val="000000"/>
+                </a:solidFill>
+                <a:latin typeface="Dubai" panose="020B0503030403030204" pitchFamily="34" charset="-78"/>
+                <a:ea typeface="Microsoft Himalaya" panose="01010100010101010101" pitchFamily="2" charset="0"/>
+                <a:cs typeface="Dubai" panose="020B0503030403030204" pitchFamily="34" charset="-78"/>
+              </a:rPr>
+              <a:t>http_request_p</a:t>
+            </a:r>
+            <a:r>
+              <a:rPr lang="en-US" altLang="zh-CN" sz="1000" dirty="0">
+                <a:solidFill>
+                  <a:srgbClr val="000000"/>
+                </a:solidFill>
+                <a:latin typeface="Dubai" panose="020B0503030403030204" pitchFamily="34" charset="-78"/>
+                <a:ea typeface="Microsoft Himalaya" panose="01010100010101010101" pitchFamily="2" charset="0"/>
+                <a:cs typeface="Dubai" panose="020B0503030403030204" pitchFamily="34" charset="-78"/>
+              </a:rPr>
+              <a:t> = </a:t>
+            </a:r>
+            <a:r>
+              <a:rPr lang="en-US" altLang="zh-CN" sz="1000" dirty="0" err="1">
+                <a:solidFill>
+                  <a:srgbClr val="000000"/>
+                </a:solidFill>
+                <a:latin typeface="Dubai" panose="020B0503030403030204" pitchFamily="34" charset="-78"/>
+                <a:ea typeface="Microsoft Himalaya" panose="01010100010101010101" pitchFamily="2" charset="0"/>
+                <a:cs typeface="Dubai" panose="020B0503030403030204" pitchFamily="34" charset="-78"/>
+              </a:rPr>
+              <a:t>netp</a:t>
+            </a:r>
+            <a:r>
+              <a:rPr lang="en-US" altLang="zh-CN" sz="1000" dirty="0">
+                <a:solidFill>
+                  <a:srgbClr val="000000"/>
+                </a:solidFill>
+                <a:latin typeface="Dubai" panose="020B0503030403030204" pitchFamily="34" charset="-78"/>
+                <a:ea typeface="Microsoft Himalaya" panose="01010100010101010101" pitchFamily="2" charset="0"/>
+                <a:cs typeface="Dubai" panose="020B0503030403030204" pitchFamily="34" charset="-78"/>
+              </a:rPr>
+              <a:t>::http::get(</a:t>
+            </a:r>
+            <a:r>
+              <a:rPr lang="en-US" altLang="zh-CN" sz="1000" dirty="0">
+                <a:solidFill>
+                  <a:srgbClr val="A31515"/>
+                </a:solidFill>
+                <a:latin typeface="Dubai" panose="020B0503030403030204" pitchFamily="34" charset="-78"/>
+                <a:ea typeface="Microsoft Himalaya" panose="01010100010101010101" pitchFamily="2" charset="0"/>
+                <a:cs typeface="Dubai" panose="020B0503030403030204" pitchFamily="34" charset="-78"/>
+              </a:rPr>
+              <a:t>"http://x.cn:80"</a:t>
+            </a:r>
+            <a:r>
+              <a:rPr lang="en-US" altLang="zh-CN" sz="1000" dirty="0">
+                <a:solidFill>
+                  <a:srgbClr val="000000"/>
+                </a:solidFill>
+                <a:latin typeface="Dubai" panose="020B0503030403030204" pitchFamily="34" charset="-78"/>
+                <a:ea typeface="Microsoft Himalaya" panose="01010100010101010101" pitchFamily="2" charset="0"/>
+                <a:cs typeface="Dubai" panose="020B0503030403030204" pitchFamily="34" charset="-78"/>
+              </a:rPr>
+              <a:t>);</a:t>
+            </a:r>
+          </a:p>
+        </p:txBody>
+      </p:sp>
+      <p:sp>
+        <p:nvSpPr>
+          <p:cNvPr id="20" name="TextBox 19">
+            <a:extLst>
+              <a:ext uri="{FF2B5EF4-FFF2-40B4-BE49-F238E27FC236}">
+                <a16:creationId xmlns:a16="http://schemas.microsoft.com/office/drawing/2014/main" id="{A20BFBF9-AF78-426D-8A10-DC99422482F3}"/>
+              </a:ext>
+            </a:extLst>
+          </p:cNvPr>
+          <p:cNvSpPr txBox="1"/>
+          <p:nvPr/>
+        </p:nvSpPr>
+        <p:spPr>
+          <a:xfrm>
+            <a:off x="7424835" y="280080"/>
+            <a:ext cx="2757486" cy="461665"/>
+          </a:xfrm>
+          <a:prstGeom prst="rect">
+            <a:avLst/>
+          </a:prstGeom>
+          <a:noFill/>
+        </p:spPr>
+        <p:txBody>
+          <a:bodyPr wrap="square" rtlCol="0">
+            <a:spAutoFit/>
+          </a:bodyPr>
+          <a:lstStyle/>
+          <a:p>
+            <a:r>
+              <a:rPr lang="en-US" altLang="zh-CN" sz="1200" dirty="0">
+                <a:solidFill>
+                  <a:srgbClr val="FF0000"/>
+                </a:solidFill>
+              </a:rPr>
+              <a:t>https://github.com/netplus/</a:t>
+            </a:r>
+          </a:p>
+          <a:p>
+            <a:r>
+              <a:rPr lang="en-US" altLang="zh-CN" sz="1200" dirty="0">
+                <a:solidFill>
+                  <a:srgbClr val="FF0000"/>
+                </a:solidFill>
+              </a:rPr>
+              <a:t>https://www.zhihu.com/people/netplus</a:t>
+            </a:r>
+            <a:endParaRPr lang="zh-CN" altLang="en-US" sz="1200" dirty="0">
+              <a:solidFill>
+                <a:srgbClr val="FF0000"/>
+              </a:solidFill>
+            </a:endParaRPr>
+          </a:p>
+        </p:txBody>
+      </p:sp>
+    </p:spTree>
+    <p:extLst>
+      <p:ext uri="{BB962C8B-B14F-4D97-AF65-F5344CB8AC3E}">
+        <p14:creationId xmlns:p14="http://schemas.microsoft.com/office/powerpoint/2010/main" val="2091986075"/>
+      </p:ext>
+    </p:extLst>
+  </p:cSld>
+  <p:clrMapOvr>
+    <a:masterClrMapping/>
+  </p:clrMapOvr>
+</p:sld>
+</file>
+
+<file path=ppt/slides/slide9.xml><?xml version="1.0" encoding="utf-8"?>
+<p:sld xmlns:a="http://schemas.openxmlformats.org/drawingml/2006/main" xmlns:r="http://schemas.openxmlformats.org/officeDocument/2006/relationships" xmlns:p="http://schemas.openxmlformats.org/presentationml/2006/main">
+  <p:cSld>
+    <p:spTree>
+      <p:nvGrpSpPr>
+        <p:cNvPr id="1" name=""/>
+        <p:cNvGrpSpPr/>
+        <p:nvPr/>
+      </p:nvGrpSpPr>
+      <p:grpSpPr>
+        <a:xfrm>
+          <a:off x="0" y="0"/>
+          <a:ext cx="0" cy="0"/>
+          <a:chOff x="0" y="0"/>
+          <a:chExt cx="0" cy="0"/>
+        </a:xfrm>
+      </p:grpSpPr>
+      <p:grpSp>
+        <p:nvGrpSpPr>
+          <p:cNvPr id="17" name="Group 16">
+            <a:extLst>
+              <a:ext uri="{FF2B5EF4-FFF2-40B4-BE49-F238E27FC236}">
+                <a16:creationId xmlns:a16="http://schemas.microsoft.com/office/drawing/2014/main" id="{F99B6F75-7B3E-4116-BCCA-131A32D30951}"/>
+              </a:ext>
+            </a:extLst>
+          </p:cNvPr>
+          <p:cNvGrpSpPr/>
+          <p:nvPr/>
+        </p:nvGrpSpPr>
+        <p:grpSpPr>
+          <a:xfrm>
+            <a:off x="2249204" y="81643"/>
+            <a:ext cx="10055968" cy="6817179"/>
+            <a:chOff x="1855538" y="147838"/>
+            <a:chExt cx="9624494" cy="6858000"/>
+          </a:xfrm>
+        </p:grpSpPr>
+        <p:pic>
+          <p:nvPicPr>
+            <p:cNvPr id="4" name="Picture 3">
+              <a:extLst>
+                <a:ext uri="{FF2B5EF4-FFF2-40B4-BE49-F238E27FC236}">
+                  <a16:creationId xmlns:a16="http://schemas.microsoft.com/office/drawing/2014/main" id="{BDEDEF73-B442-430E-A052-CEA438053ED1}"/>
+                </a:ext>
+              </a:extLst>
+            </p:cNvPr>
+            <p:cNvPicPr>
+              <a:picLocks noChangeAspect="1"/>
+            </p:cNvPicPr>
+            <p:nvPr/>
+          </p:nvPicPr>
+          <p:blipFill rotWithShape="1">
+            <a:blip r:embed="rId2">
+              <a:extLst>
+                <a:ext uri="{28A0092B-C50C-407E-A947-70E740481C1C}">
+                  <a14:useLocalDpi xmlns:a14="http://schemas.microsoft.com/office/drawing/2010/main" val="0"/>
+                </a:ext>
+              </a:extLst>
+            </a:blip>
+            <a:srcRect l="2" t="150" r="18220"/>
+            <a:stretch/>
+          </p:blipFill>
+          <p:spPr>
+            <a:xfrm>
+              <a:off x="3000340" y="147838"/>
+              <a:ext cx="8479692" cy="6858000"/>
+            </a:xfrm>
+            <a:prstGeom prst="rect">
+              <a:avLst/>
+            </a:prstGeom>
+          </p:spPr>
+        </p:pic>
+        <p:sp>
+          <p:nvSpPr>
+            <p:cNvPr id="5" name="TextBox 4">
+              <a:extLst>
+                <a:ext uri="{FF2B5EF4-FFF2-40B4-BE49-F238E27FC236}">
+                  <a16:creationId xmlns:a16="http://schemas.microsoft.com/office/drawing/2014/main" id="{D3DF865B-3AC8-480E-9B75-58E47D084366}"/>
+                </a:ext>
+              </a:extLst>
+            </p:cNvPr>
+            <p:cNvSpPr txBox="1"/>
+            <p:nvPr/>
+          </p:nvSpPr>
+          <p:spPr>
+            <a:xfrm>
+              <a:off x="1859296" y="300490"/>
+              <a:ext cx="3754066" cy="2924134"/>
+            </a:xfrm>
+            <a:prstGeom prst="rect">
+              <a:avLst/>
+            </a:prstGeom>
+            <a:noFill/>
+          </p:spPr>
+          <p:txBody>
+            <a:bodyPr wrap="square" rtlCol="0">
+              <a:spAutoFit/>
+            </a:bodyPr>
+            <a:lstStyle/>
+            <a:p>
+              <a:r>
+                <a:rPr lang="zh-CN" altLang="en-US" sz="1600" dirty="0">
+                  <a:solidFill>
+                    <a:srgbClr val="FF0000"/>
+                  </a:solidFill>
+                  <a:latin typeface="微软雅黑" panose="020B0503020204020204" pitchFamily="34" charset="-122"/>
+                  <a:ea typeface="微软雅黑" panose="020B0503020204020204" pitchFamily="34" charset="-122"/>
+                </a:rPr>
+                <a:t>不要跟我说什么</a:t>
+              </a:r>
+              <a:endParaRPr lang="en-US" altLang="zh-CN" sz="1600" dirty="0">
+                <a:solidFill>
+                  <a:srgbClr val="FF0000"/>
+                </a:solidFill>
+                <a:latin typeface="微软雅黑" panose="020B0503020204020204" pitchFamily="34" charset="-122"/>
+                <a:ea typeface="微软雅黑" panose="020B0503020204020204" pitchFamily="34" charset="-122"/>
+              </a:endParaRPr>
+            </a:p>
+            <a:p>
+              <a:r>
+                <a:rPr lang="en-US" altLang="zh-CN" sz="1600" dirty="0" err="1">
+                  <a:solidFill>
+                    <a:srgbClr val="FF0000"/>
+                  </a:solidFill>
+                  <a:latin typeface="Times New Roman" panose="02020603050405020304" pitchFamily="18" charset="0"/>
+                  <a:ea typeface="+mj-ea"/>
+                  <a:cs typeface="Times New Roman" panose="02020603050405020304" pitchFamily="18" charset="0"/>
+                </a:rPr>
+                <a:t>linux</a:t>
+              </a:r>
+              <a:r>
+                <a:rPr lang="en-US" altLang="zh-CN" sz="1600" dirty="0">
+                  <a:solidFill>
+                    <a:srgbClr val="FF0000"/>
+                  </a:solidFill>
+                  <a:latin typeface="Times New Roman" panose="02020603050405020304" pitchFamily="18" charset="0"/>
+                  <a:ea typeface="+mj-ea"/>
+                  <a:cs typeface="Times New Roman" panose="02020603050405020304" pitchFamily="18" charset="0"/>
+                </a:rPr>
+                <a:t>/win/android/</a:t>
+              </a:r>
+              <a:r>
+                <a:rPr lang="en-US" altLang="zh-CN" sz="1600" dirty="0" err="1">
+                  <a:solidFill>
+                    <a:srgbClr val="FF0000"/>
+                  </a:solidFill>
+                  <a:latin typeface="Times New Roman" panose="02020603050405020304" pitchFamily="18" charset="0"/>
+                  <a:ea typeface="+mj-ea"/>
+                  <a:cs typeface="Times New Roman" panose="02020603050405020304" pitchFamily="18" charset="0"/>
+                </a:rPr>
+                <a:t>ios</a:t>
+              </a:r>
+              <a:endParaRPr lang="en-US" altLang="zh-CN" sz="1600" dirty="0">
+                <a:solidFill>
+                  <a:srgbClr val="FF0000"/>
+                </a:solidFill>
+                <a:latin typeface="Times New Roman" panose="02020603050405020304" pitchFamily="18" charset="0"/>
+                <a:ea typeface="+mj-ea"/>
+                <a:cs typeface="Times New Roman" panose="02020603050405020304" pitchFamily="18" charset="0"/>
+              </a:endParaRPr>
+            </a:p>
+            <a:p>
+              <a:r>
+                <a:rPr lang="en-US" altLang="zh-CN" sz="1600" dirty="0" err="1">
+                  <a:solidFill>
+                    <a:srgbClr val="FF0000"/>
+                  </a:solidFill>
+                  <a:latin typeface="Times New Roman" panose="02020603050405020304" pitchFamily="18" charset="0"/>
+                  <a:ea typeface="+mj-ea"/>
+                  <a:cs typeface="Times New Roman" panose="02020603050405020304" pitchFamily="18" charset="0"/>
+                </a:rPr>
+                <a:t>libuv</a:t>
+              </a:r>
+              <a:r>
+                <a:rPr lang="en-US" altLang="zh-CN" sz="1600" dirty="0">
+                  <a:solidFill>
+                    <a:srgbClr val="FF0000"/>
+                  </a:solidFill>
+                  <a:latin typeface="Times New Roman" panose="02020603050405020304" pitchFamily="18" charset="0"/>
+                  <a:ea typeface="+mj-ea"/>
+                  <a:cs typeface="Times New Roman" panose="02020603050405020304" pitchFamily="18" charset="0"/>
+                </a:rPr>
+                <a:t>/</a:t>
+              </a:r>
+              <a:r>
+                <a:rPr lang="en-US" altLang="zh-CN" sz="1600" dirty="0" err="1">
+                  <a:solidFill>
+                    <a:srgbClr val="FF0000"/>
+                  </a:solidFill>
+                  <a:latin typeface="Times New Roman" panose="02020603050405020304" pitchFamily="18" charset="0"/>
+                  <a:ea typeface="+mj-ea"/>
+                  <a:cs typeface="Times New Roman" panose="02020603050405020304" pitchFamily="18" charset="0"/>
+                </a:rPr>
+                <a:t>libev</a:t>
+              </a:r>
+              <a:r>
+                <a:rPr lang="en-US" altLang="zh-CN" sz="1600" dirty="0">
+                  <a:solidFill>
+                    <a:srgbClr val="FF0000"/>
+                  </a:solidFill>
+                  <a:latin typeface="Times New Roman" panose="02020603050405020304" pitchFamily="18" charset="0"/>
+                  <a:ea typeface="+mj-ea"/>
+                  <a:cs typeface="Times New Roman" panose="02020603050405020304" pitchFamily="18" charset="0"/>
+                </a:rPr>
+                <a:t>/</a:t>
+              </a:r>
+              <a:r>
+                <a:rPr lang="en-US" altLang="zh-CN" sz="1600" dirty="0" err="1">
+                  <a:solidFill>
+                    <a:srgbClr val="FF0000"/>
+                  </a:solidFill>
+                  <a:latin typeface="Times New Roman" panose="02020603050405020304" pitchFamily="18" charset="0"/>
+                  <a:ea typeface="+mj-ea"/>
+                  <a:cs typeface="Times New Roman" panose="02020603050405020304" pitchFamily="18" charset="0"/>
+                </a:rPr>
+                <a:t>libevent</a:t>
+              </a:r>
+              <a:endParaRPr lang="en-US" altLang="zh-CN" sz="1600" dirty="0">
+                <a:solidFill>
+                  <a:srgbClr val="FF0000"/>
+                </a:solidFill>
+                <a:latin typeface="Times New Roman" panose="02020603050405020304" pitchFamily="18" charset="0"/>
+                <a:ea typeface="+mj-ea"/>
+                <a:cs typeface="Times New Roman" panose="02020603050405020304" pitchFamily="18" charset="0"/>
+              </a:endParaRPr>
+            </a:p>
+            <a:p>
+              <a:r>
+                <a:rPr lang="en-US" altLang="zh-CN" sz="1600" dirty="0">
+                  <a:solidFill>
+                    <a:srgbClr val="FF0000"/>
+                  </a:solidFill>
+                  <a:latin typeface="Times New Roman" panose="02020603050405020304" pitchFamily="18" charset="0"/>
+                  <a:ea typeface="+mj-ea"/>
+                  <a:cs typeface="Times New Roman" panose="02020603050405020304" pitchFamily="18" charset="0"/>
+                </a:rPr>
+                <a:t>socket/</a:t>
+              </a:r>
+              <a:r>
+                <a:rPr lang="en-US" altLang="zh-CN" sz="1600" dirty="0" err="1">
+                  <a:solidFill>
+                    <a:srgbClr val="FF0000"/>
+                  </a:solidFill>
+                  <a:latin typeface="Times New Roman" panose="02020603050405020304" pitchFamily="18" charset="0"/>
+                  <a:ea typeface="+mj-ea"/>
+                  <a:cs typeface="Times New Roman" panose="02020603050405020304" pitchFamily="18" charset="0"/>
+                </a:rPr>
+                <a:t>epoll</a:t>
+              </a:r>
+              <a:r>
+                <a:rPr lang="en-US" altLang="zh-CN" sz="1600" dirty="0">
+                  <a:solidFill>
+                    <a:srgbClr val="FF0000"/>
+                  </a:solidFill>
+                  <a:latin typeface="Times New Roman" panose="02020603050405020304" pitchFamily="18" charset="0"/>
+                  <a:ea typeface="+mj-ea"/>
+                  <a:cs typeface="Times New Roman" panose="02020603050405020304" pitchFamily="18" charset="0"/>
+                </a:rPr>
+                <a:t>/</a:t>
+              </a:r>
+              <a:r>
+                <a:rPr lang="en-US" altLang="zh-CN" sz="1600" dirty="0" err="1">
+                  <a:solidFill>
+                    <a:srgbClr val="FF0000"/>
+                  </a:solidFill>
+                  <a:latin typeface="Times New Roman" panose="02020603050405020304" pitchFamily="18" charset="0"/>
+                  <a:ea typeface="+mj-ea"/>
+                  <a:cs typeface="Times New Roman" panose="02020603050405020304" pitchFamily="18" charset="0"/>
+                </a:rPr>
+                <a:t>iocp</a:t>
+              </a:r>
+              <a:r>
+                <a:rPr lang="en-US" altLang="zh-CN" sz="1600" dirty="0">
+                  <a:solidFill>
+                    <a:srgbClr val="FF0000"/>
+                  </a:solidFill>
+                  <a:latin typeface="Times New Roman" panose="02020603050405020304" pitchFamily="18" charset="0"/>
+                  <a:ea typeface="+mj-ea"/>
+                  <a:cs typeface="Times New Roman" panose="02020603050405020304" pitchFamily="18" charset="0"/>
+                </a:rPr>
+                <a:t>/</a:t>
+              </a:r>
+              <a:r>
+                <a:rPr lang="en-US" altLang="zh-CN" sz="1600" dirty="0" err="1">
+                  <a:solidFill>
+                    <a:srgbClr val="FF0000"/>
+                  </a:solidFill>
+                  <a:latin typeface="Times New Roman" panose="02020603050405020304" pitchFamily="18" charset="0"/>
+                  <a:ea typeface="+mj-ea"/>
+                  <a:cs typeface="Times New Roman" panose="02020603050405020304" pitchFamily="18" charset="0"/>
+                </a:rPr>
+                <a:t>kqueue</a:t>
+              </a:r>
+              <a:r>
+                <a:rPr lang="en-US" altLang="zh-CN" sz="1600" dirty="0">
+                  <a:solidFill>
+                    <a:srgbClr val="FF0000"/>
+                  </a:solidFill>
+                  <a:latin typeface="Times New Roman" panose="02020603050405020304" pitchFamily="18" charset="0"/>
+                  <a:ea typeface="+mj-ea"/>
+                  <a:cs typeface="Times New Roman" panose="02020603050405020304" pitchFamily="18" charset="0"/>
+                </a:rPr>
+                <a:t>/select</a:t>
+              </a:r>
+            </a:p>
+            <a:p>
+              <a:r>
+                <a:rPr lang="zh-CN" altLang="en-US" sz="1600" dirty="0">
+                  <a:solidFill>
+                    <a:srgbClr val="FF0000"/>
+                  </a:solidFill>
+                  <a:latin typeface="微软雅黑" panose="020B0503020204020204" pitchFamily="34" charset="-122"/>
+                  <a:ea typeface="微软雅黑" panose="020B0503020204020204" pitchFamily="34" charset="-122"/>
+                </a:rPr>
+                <a:t>老夫收发消息就用</a:t>
+              </a:r>
+              <a:endParaRPr lang="en-US" altLang="zh-CN" sz="1600" dirty="0">
+                <a:solidFill>
+                  <a:srgbClr val="FF0000"/>
+                </a:solidFill>
+                <a:latin typeface="微软雅黑" panose="020B0503020204020204" pitchFamily="34" charset="-122"/>
+                <a:ea typeface="微软雅黑" panose="020B0503020204020204" pitchFamily="34" charset="-122"/>
+              </a:endParaRPr>
+            </a:p>
+            <a:p>
+              <a:r>
+                <a:rPr lang="en-US" altLang="zh-CN" sz="3600" dirty="0" err="1">
+                  <a:solidFill>
+                    <a:srgbClr val="FF0000"/>
+                  </a:solidFill>
+                  <a:latin typeface="Arial Black" panose="020B0A04020102020204" pitchFamily="34" charset="0"/>
+                </a:rPr>
+                <a:t>Netplus</a:t>
+              </a:r>
+              <a:endParaRPr lang="en-US" altLang="zh-CN" sz="3600" dirty="0">
+                <a:solidFill>
+                  <a:srgbClr val="FF0000"/>
+                </a:solidFill>
+                <a:latin typeface="Arial Black" panose="020B0A04020102020204" pitchFamily="34" charset="0"/>
+              </a:endParaRPr>
+            </a:p>
+            <a:p>
+              <a:r>
+                <a:rPr lang="en-US" altLang="zh-CN" sz="1801" b="1" dirty="0">
+                  <a:solidFill>
+                    <a:srgbClr val="FF0000"/>
+                  </a:solidFill>
+                </a:rPr>
+                <a:t>http/https/</a:t>
+              </a:r>
+              <a:r>
+                <a:rPr lang="en-US" altLang="zh-CN" sz="1801" b="1" dirty="0" err="1">
+                  <a:solidFill>
+                    <a:srgbClr val="FF0000"/>
+                  </a:solidFill>
+                </a:rPr>
+                <a:t>websocket</a:t>
+              </a:r>
+              <a:r>
+                <a:rPr lang="en-US" altLang="zh-CN" sz="1801" b="1" dirty="0">
+                  <a:solidFill>
+                    <a:srgbClr val="FF0000"/>
+                  </a:solidFill>
+                </a:rPr>
+                <a:t>/RPC/</a:t>
+              </a:r>
+              <a:r>
+                <a:rPr lang="en-US" altLang="zh-CN" sz="1801" b="1" dirty="0" err="1">
+                  <a:solidFill>
+                    <a:srgbClr val="FF0000"/>
+                  </a:solidFill>
+                </a:rPr>
+                <a:t>tlv</a:t>
+              </a:r>
+              <a:r>
+                <a:rPr lang="en-US" altLang="zh-CN" sz="1801" b="1" dirty="0">
+                  <a:solidFill>
+                    <a:srgbClr val="FF0000"/>
+                  </a:solidFill>
+                </a:rPr>
+                <a:t> </a:t>
+              </a:r>
+            </a:p>
+            <a:p>
+              <a:r>
+                <a:rPr lang="zh-CN" altLang="en-US" sz="2000" dirty="0">
+                  <a:solidFill>
+                    <a:srgbClr val="FF0000"/>
+                  </a:solidFill>
+                  <a:latin typeface="微软雅黑" panose="020B0503020204020204" pitchFamily="34" charset="-122"/>
+                  <a:ea typeface="微软雅黑" panose="020B0503020204020204" pitchFamily="34" charset="-122"/>
+                </a:rPr>
+                <a:t>统统一把</a:t>
+              </a:r>
+              <a:r>
+                <a:rPr lang="zh-CN" altLang="en-US" sz="3200" dirty="0">
+                  <a:solidFill>
+                    <a:srgbClr val="FF0000"/>
+                  </a:solidFill>
+                  <a:latin typeface="微软雅黑" panose="020B0503020204020204" pitchFamily="34" charset="-122"/>
+                  <a:ea typeface="微软雅黑" panose="020B0503020204020204" pitchFamily="34" charset="-122"/>
+                </a:rPr>
+                <a:t>梭</a:t>
+              </a:r>
+              <a:endParaRPr lang="en-US" altLang="zh-CN" sz="3200" dirty="0">
+                <a:solidFill>
+                  <a:srgbClr val="FF0000"/>
+                </a:solidFill>
+                <a:latin typeface="微软雅黑" panose="020B0503020204020204" pitchFamily="34" charset="-122"/>
+                <a:ea typeface="微软雅黑" panose="020B0503020204020204" pitchFamily="34" charset="-122"/>
+              </a:endParaRPr>
+            </a:p>
+            <a:p>
+              <a:endParaRPr lang="zh-CN" altLang="en-US" sz="1801" dirty="0"/>
+            </a:p>
+          </p:txBody>
+        </p:sp>
+        <p:sp>
+          <p:nvSpPr>
+            <p:cNvPr id="6" name="TextBox 5">
+              <a:extLst>
+                <a:ext uri="{FF2B5EF4-FFF2-40B4-BE49-F238E27FC236}">
+                  <a16:creationId xmlns:a16="http://schemas.microsoft.com/office/drawing/2014/main" id="{D52014B8-FCBA-4A37-AA65-4EA58AF31B56}"/>
+                </a:ext>
+              </a:extLst>
+            </p:cNvPr>
+            <p:cNvSpPr txBox="1"/>
+            <p:nvPr/>
+          </p:nvSpPr>
+          <p:spPr>
+            <a:xfrm>
+              <a:off x="3915591" y="2911676"/>
+              <a:ext cx="1879309" cy="954364"/>
+            </a:xfrm>
+            <a:prstGeom prst="rect">
+              <a:avLst/>
+            </a:prstGeom>
+            <a:noFill/>
+          </p:spPr>
+          <p:txBody>
+            <a:bodyPr wrap="square" rtlCol="0">
+              <a:spAutoFit/>
+            </a:bodyPr>
+            <a:lstStyle/>
+            <a:p>
+              <a:r>
+                <a:rPr lang="zh-CN" altLang="en-US" sz="1801" dirty="0">
+                  <a:solidFill>
+                    <a:srgbClr val="FF0000"/>
+                  </a:solidFill>
+                  <a:latin typeface="时光慢慢走" panose="02010600010101010101" pitchFamily="2" charset="-122"/>
+                  <a:ea typeface="时光慢慢走" panose="02010600010101010101" pitchFamily="2" charset="-122"/>
+                </a:rPr>
+                <a:t>监听</a:t>
+              </a:r>
+              <a:r>
+                <a:rPr lang="en-US" altLang="zh-CN" sz="1801" dirty="0">
+                  <a:solidFill>
+                    <a:srgbClr val="FF0000"/>
+                  </a:solidFill>
+                  <a:latin typeface="时光慢慢走" panose="02010600010101010101" pitchFamily="2" charset="-122"/>
+                  <a:ea typeface="时光慢慢走" panose="02010600010101010101" pitchFamily="2" charset="-122"/>
+                </a:rPr>
+                <a:t>/</a:t>
+              </a:r>
+              <a:r>
+                <a:rPr lang="zh-CN" altLang="en-US" sz="1801" dirty="0">
+                  <a:solidFill>
+                    <a:srgbClr val="FF0000"/>
+                  </a:solidFill>
+                  <a:latin typeface="时光慢慢走" panose="02010600010101010101" pitchFamily="2" charset="-122"/>
+                  <a:ea typeface="时光慢慢走" panose="02010600010101010101" pitchFamily="2" charset="-122"/>
+                </a:rPr>
+                <a:t>拨号</a:t>
+              </a:r>
+              <a:endParaRPr lang="en-US" altLang="zh-CN" sz="1801" dirty="0">
+                <a:solidFill>
+                  <a:srgbClr val="FF0000"/>
+                </a:solidFill>
+                <a:latin typeface="时光慢慢走" panose="02010600010101010101" pitchFamily="2" charset="-122"/>
+                <a:ea typeface="时光慢慢走" panose="02010600010101010101" pitchFamily="2" charset="-122"/>
+              </a:endParaRPr>
+            </a:p>
+            <a:p>
+              <a:r>
+                <a:rPr lang="zh-CN" altLang="en-US" sz="1801" dirty="0">
+                  <a:solidFill>
+                    <a:srgbClr val="FF0000"/>
+                  </a:solidFill>
+                  <a:latin typeface="时光慢慢走" panose="02010600010101010101" pitchFamily="2" charset="-122"/>
+                  <a:ea typeface="时光慢慢走" panose="02010600010101010101" pitchFamily="2" charset="-122"/>
+                </a:rPr>
+                <a:t>设置</a:t>
+              </a:r>
+              <a:r>
+                <a:rPr lang="en-US" altLang="zh-CN" sz="1801" b="1" dirty="0">
+                  <a:solidFill>
+                    <a:srgbClr val="FF0000"/>
+                  </a:solidFill>
+                  <a:latin typeface="时光慢慢走" panose="02010600010101010101" pitchFamily="2" charset="-122"/>
+                  <a:ea typeface="时光慢慢走" panose="02010600010101010101" pitchFamily="2" charset="-122"/>
+                </a:rPr>
+                <a:t>Handler</a:t>
+              </a:r>
+            </a:p>
+            <a:p>
+              <a:r>
+                <a:rPr lang="zh-CN" altLang="en-US" sz="1801" dirty="0">
+                  <a:solidFill>
+                    <a:srgbClr val="FF0000"/>
+                  </a:solidFill>
+                  <a:latin typeface="时光慢慢走" panose="02010600010101010101" pitchFamily="2" charset="-122"/>
+                  <a:ea typeface="时光慢慢走" panose="02010600010101010101" pitchFamily="2" charset="-122"/>
+                </a:rPr>
+                <a:t>简简单单</a:t>
+              </a:r>
+              <a:r>
+                <a:rPr lang="zh-CN" altLang="en-US" sz="2000" b="1" dirty="0">
+                  <a:solidFill>
+                    <a:srgbClr val="FF0000"/>
+                  </a:solidFill>
+                  <a:latin typeface="时光慢慢走" panose="02010600010101010101" pitchFamily="2" charset="-122"/>
+                  <a:ea typeface="时光慢慢走" panose="02010600010101010101" pitchFamily="2" charset="-122"/>
+                </a:rPr>
+                <a:t>直接干</a:t>
+              </a:r>
+            </a:p>
+          </p:txBody>
+        </p:sp>
+        <p:sp>
+          <p:nvSpPr>
+            <p:cNvPr id="7" name="TextBox 6">
+              <a:extLst>
+                <a:ext uri="{FF2B5EF4-FFF2-40B4-BE49-F238E27FC236}">
+                  <a16:creationId xmlns:a16="http://schemas.microsoft.com/office/drawing/2014/main" id="{7B603B2D-A4F1-473E-9F7F-5AE0E056B339}"/>
+                </a:ext>
+              </a:extLst>
+            </p:cNvPr>
+            <p:cNvSpPr txBox="1"/>
+            <p:nvPr/>
+          </p:nvSpPr>
+          <p:spPr>
+            <a:xfrm>
+              <a:off x="1855538" y="4333332"/>
+              <a:ext cx="5217620" cy="2308324"/>
+            </a:xfrm>
+            <a:prstGeom prst="rect">
+              <a:avLst/>
+            </a:prstGeom>
+            <a:noFill/>
+          </p:spPr>
+          <p:txBody>
+            <a:bodyPr wrap="square" rtlCol="0">
+              <a:spAutoFit/>
+            </a:bodyPr>
+            <a:lstStyle/>
+            <a:p>
+              <a:r>
+                <a:rPr lang="en-US" altLang="zh-CN" sz="1200" dirty="0">
+                  <a:solidFill>
+                    <a:srgbClr val="6F008A"/>
+                  </a:solidFill>
+                  <a:latin typeface="Dubai" panose="020B0503030403030204" pitchFamily="34" charset="-78"/>
+                  <a:ea typeface="Microsoft Himalaya" panose="01010100010101010101" pitchFamily="2" charset="0"/>
+                  <a:cs typeface="Dubai" panose="020B0503030403030204" pitchFamily="34" charset="-78"/>
+                </a:rPr>
+                <a:t>NRP</a:t>
+              </a:r>
+              <a:r>
+                <a:rPr lang="en-US" altLang="zh-CN" sz="1200" dirty="0">
+                  <a:solidFill>
+                    <a:srgbClr val="000000"/>
+                  </a:solidFill>
+                  <a:latin typeface="Dubai" panose="020B0503030403030204" pitchFamily="34" charset="-78"/>
+                  <a:ea typeface="Microsoft Himalaya" panose="01010100010101010101" pitchFamily="2" charset="0"/>
+                  <a:cs typeface="Dubai" panose="020B0503030403030204" pitchFamily="34" charset="-78"/>
+                </a:rPr>
+                <a:t>&lt;</a:t>
+              </a:r>
+              <a:r>
+                <a:rPr lang="en-US" altLang="zh-CN" sz="1200" dirty="0" err="1">
+                  <a:solidFill>
+                    <a:srgbClr val="000000"/>
+                  </a:solidFill>
+                  <a:latin typeface="Dubai" panose="020B0503030403030204" pitchFamily="34" charset="-78"/>
+                  <a:ea typeface="Microsoft Himalaya" panose="01010100010101010101" pitchFamily="2" charset="0"/>
+                  <a:cs typeface="Dubai" panose="020B0503030403030204" pitchFamily="34" charset="-78"/>
+                </a:rPr>
+                <a:t>netp</a:t>
+              </a:r>
+              <a:r>
+                <a:rPr lang="en-US" altLang="zh-CN" sz="1200" dirty="0">
+                  <a:solidFill>
+                    <a:srgbClr val="000000"/>
+                  </a:solidFill>
+                  <a:latin typeface="Dubai" panose="020B0503030403030204" pitchFamily="34" charset="-78"/>
+                  <a:ea typeface="Microsoft Himalaya" panose="01010100010101010101" pitchFamily="2" charset="0"/>
+                  <a:cs typeface="Dubai" panose="020B0503030403030204" pitchFamily="34" charset="-78"/>
+                </a:rPr>
+                <a:t>::</a:t>
+              </a:r>
+              <a:r>
+                <a:rPr lang="en-US" altLang="zh-CN" sz="1200" dirty="0" err="1">
+                  <a:solidFill>
+                    <a:srgbClr val="2B91AF"/>
+                  </a:solidFill>
+                  <a:latin typeface="Dubai" panose="020B0503030403030204" pitchFamily="34" charset="-78"/>
+                  <a:ea typeface="Microsoft Himalaya" panose="01010100010101010101" pitchFamily="2" charset="0"/>
+                  <a:cs typeface="Dubai" panose="020B0503030403030204" pitchFamily="34" charset="-78"/>
+                </a:rPr>
+                <a:t>channel_listen_promise</a:t>
+              </a:r>
+              <a:r>
+                <a:rPr lang="en-US" altLang="zh-CN" sz="1200" dirty="0">
+                  <a:solidFill>
+                    <a:srgbClr val="000000"/>
+                  </a:solidFill>
+                  <a:latin typeface="Dubai" panose="020B0503030403030204" pitchFamily="34" charset="-78"/>
+                  <a:ea typeface="Microsoft Himalaya" panose="01010100010101010101" pitchFamily="2" charset="0"/>
+                  <a:cs typeface="Dubai" panose="020B0503030403030204" pitchFamily="34" charset="-78"/>
+                </a:rPr>
+                <a:t>&gt; </a:t>
+              </a:r>
+              <a:r>
+                <a:rPr lang="en-US" altLang="zh-CN" sz="1200" dirty="0" err="1">
+                  <a:solidFill>
+                    <a:srgbClr val="000000"/>
+                  </a:solidFill>
+                  <a:latin typeface="Dubai" panose="020B0503030403030204" pitchFamily="34" charset="-78"/>
+                  <a:ea typeface="Microsoft Himalaya" panose="01010100010101010101" pitchFamily="2" charset="0"/>
+                  <a:cs typeface="Dubai" panose="020B0503030403030204" pitchFamily="34" charset="-78"/>
+                </a:rPr>
+                <a:t>listen_p</a:t>
+              </a:r>
+              <a:r>
+                <a:rPr lang="en-US" altLang="zh-CN" sz="1200" dirty="0">
+                  <a:solidFill>
+                    <a:srgbClr val="000000"/>
+                  </a:solidFill>
+                  <a:latin typeface="Dubai" panose="020B0503030403030204" pitchFamily="34" charset="-78"/>
+                  <a:ea typeface="Microsoft Himalaya" panose="01010100010101010101" pitchFamily="2" charset="0"/>
+                  <a:cs typeface="Dubai" panose="020B0503030403030204" pitchFamily="34" charset="-78"/>
+                </a:rPr>
+                <a:t> = </a:t>
+              </a:r>
+            </a:p>
+            <a:p>
+              <a:r>
+                <a:rPr lang="en-US" altLang="zh-CN" sz="1200" dirty="0" err="1">
+                  <a:solidFill>
+                    <a:srgbClr val="000000"/>
+                  </a:solidFill>
+                  <a:latin typeface="Dubai" panose="020B0503030403030204" pitchFamily="34" charset="-78"/>
+                  <a:ea typeface="Microsoft Himalaya" panose="01010100010101010101" pitchFamily="2" charset="0"/>
+                  <a:cs typeface="Dubai" panose="020B0503030403030204" pitchFamily="34" charset="-78"/>
+                </a:rPr>
+                <a:t>netp</a:t>
+              </a:r>
+              <a:r>
+                <a:rPr lang="en-US" altLang="zh-CN" sz="1200" dirty="0">
+                  <a:solidFill>
+                    <a:srgbClr val="000000"/>
+                  </a:solidFill>
+                  <a:latin typeface="Dubai" panose="020B0503030403030204" pitchFamily="34" charset="-78"/>
+                  <a:ea typeface="Microsoft Himalaya" panose="01010100010101010101" pitchFamily="2" charset="0"/>
+                  <a:cs typeface="Dubai" panose="020B0503030403030204" pitchFamily="34" charset="-78"/>
+                </a:rPr>
+                <a:t>::</a:t>
+              </a:r>
+              <a:r>
+                <a:rPr lang="en-US" altLang="zh-CN" sz="1200" dirty="0">
+                  <a:solidFill>
+                    <a:srgbClr val="2B91AF"/>
+                  </a:solidFill>
+                  <a:latin typeface="Dubai" panose="020B0503030403030204" pitchFamily="34" charset="-78"/>
+                  <a:ea typeface="Microsoft Himalaya" panose="01010100010101010101" pitchFamily="2" charset="0"/>
+                  <a:cs typeface="Dubai" panose="020B0503030403030204" pitchFamily="34" charset="-78"/>
+                </a:rPr>
+                <a:t>socket</a:t>
+              </a:r>
+              <a:r>
+                <a:rPr lang="en-US" altLang="zh-CN" sz="1200" dirty="0">
+                  <a:solidFill>
+                    <a:srgbClr val="000000"/>
+                  </a:solidFill>
+                  <a:latin typeface="Dubai" panose="020B0503030403030204" pitchFamily="34" charset="-78"/>
+                  <a:ea typeface="Microsoft Himalaya" panose="01010100010101010101" pitchFamily="2" charset="0"/>
+                  <a:cs typeface="Dubai" panose="020B0503030403030204" pitchFamily="34" charset="-78"/>
+                </a:rPr>
+                <a:t>::</a:t>
+              </a:r>
+              <a:r>
+                <a:rPr lang="en-US" altLang="zh-CN" sz="1200" dirty="0" err="1">
+                  <a:solidFill>
+                    <a:srgbClr val="000000"/>
+                  </a:solidFill>
+                  <a:latin typeface="Dubai" panose="020B0503030403030204" pitchFamily="34" charset="-78"/>
+                  <a:ea typeface="Microsoft Himalaya" panose="01010100010101010101" pitchFamily="2" charset="0"/>
+                  <a:cs typeface="Dubai" panose="020B0503030403030204" pitchFamily="34" charset="-78"/>
+                </a:rPr>
+                <a:t>listen_on</a:t>
+              </a:r>
+              <a:r>
+                <a:rPr lang="en-US" altLang="zh-CN" sz="1200" dirty="0">
+                  <a:solidFill>
+                    <a:srgbClr val="000000"/>
+                  </a:solidFill>
+                  <a:latin typeface="Dubai" panose="020B0503030403030204" pitchFamily="34" charset="-78"/>
+                  <a:ea typeface="Microsoft Himalaya" panose="01010100010101010101" pitchFamily="2" charset="0"/>
+                  <a:cs typeface="Dubai" panose="020B0503030403030204" pitchFamily="34" charset="-78"/>
+                </a:rPr>
+                <a:t>(</a:t>
+              </a:r>
+              <a:r>
+                <a:rPr lang="en-US" altLang="zh-CN" sz="1200" dirty="0">
+                  <a:solidFill>
+                    <a:srgbClr val="A31515"/>
+                  </a:solidFill>
+                  <a:latin typeface="Dubai" panose="020B0503030403030204" pitchFamily="34" charset="-78"/>
+                  <a:ea typeface="Microsoft Himalaya" panose="01010100010101010101" pitchFamily="2" charset="0"/>
+                  <a:cs typeface="Dubai" panose="020B0503030403030204" pitchFamily="34" charset="-78"/>
+                </a:rPr>
+                <a:t>"</a:t>
+              </a:r>
+              <a:r>
+                <a:rPr lang="en-US" altLang="zh-CN" sz="1200" dirty="0" err="1">
+                  <a:solidFill>
+                    <a:srgbClr val="A31515"/>
+                  </a:solidFill>
+                  <a:latin typeface="Dubai" panose="020B0503030403030204" pitchFamily="34" charset="-78"/>
+                  <a:ea typeface="Microsoft Himalaya" panose="01010100010101010101" pitchFamily="2" charset="0"/>
+                  <a:cs typeface="Dubai" panose="020B0503030403030204" pitchFamily="34" charset="-78"/>
+                </a:rPr>
+                <a:t>tcp</a:t>
+              </a:r>
+              <a:r>
+                <a:rPr lang="en-US" altLang="zh-CN" sz="1200" dirty="0">
+                  <a:solidFill>
+                    <a:srgbClr val="A31515"/>
+                  </a:solidFill>
+                  <a:latin typeface="Dubai" panose="020B0503030403030204" pitchFamily="34" charset="-78"/>
+                  <a:ea typeface="Microsoft Himalaya" panose="01010100010101010101" pitchFamily="2" charset="0"/>
+                  <a:cs typeface="Dubai" panose="020B0503030403030204" pitchFamily="34" charset="-78"/>
+                </a:rPr>
+                <a:t>://0.0.0.0:22137"</a:t>
+              </a:r>
+              <a:r>
+                <a:rPr lang="en-US" altLang="zh-CN" sz="1200" dirty="0">
+                  <a:solidFill>
+                    <a:srgbClr val="000000"/>
+                  </a:solidFill>
+                  <a:latin typeface="Dubai" panose="020B0503030403030204" pitchFamily="34" charset="-78"/>
+                  <a:ea typeface="Microsoft Himalaya" panose="01010100010101010101" pitchFamily="2" charset="0"/>
+                  <a:cs typeface="Dubai" panose="020B0503030403030204" pitchFamily="34" charset="-78"/>
+                </a:rPr>
+                <a:t>,[](</a:t>
+              </a:r>
+              <a:r>
+                <a:rPr lang="en-US" altLang="zh-CN" sz="1200" dirty="0">
+                  <a:solidFill>
+                    <a:srgbClr val="6F008A"/>
+                  </a:solidFill>
+                  <a:latin typeface="Dubai" panose="020B0503030403030204" pitchFamily="34" charset="-78"/>
+                  <a:ea typeface="Microsoft Himalaya" panose="01010100010101010101" pitchFamily="2" charset="0"/>
+                  <a:cs typeface="Dubai" panose="020B0503030403030204" pitchFamily="34" charset="-78"/>
+                </a:rPr>
+                <a:t>NRP</a:t>
+              </a:r>
+              <a:r>
+                <a:rPr lang="en-US" altLang="zh-CN" sz="1200" dirty="0">
+                  <a:solidFill>
+                    <a:srgbClr val="000000"/>
+                  </a:solidFill>
+                  <a:latin typeface="Dubai" panose="020B0503030403030204" pitchFamily="34" charset="-78"/>
+                  <a:ea typeface="Microsoft Himalaya" panose="01010100010101010101" pitchFamily="2" charset="0"/>
+                  <a:cs typeface="Dubai" panose="020B0503030403030204" pitchFamily="34" charset="-78"/>
+                </a:rPr>
+                <a:t>&lt;</a:t>
+              </a:r>
+              <a:r>
+                <a:rPr lang="en-US" altLang="zh-CN" sz="1200" dirty="0" err="1">
+                  <a:solidFill>
+                    <a:srgbClr val="000000"/>
+                  </a:solidFill>
+                  <a:latin typeface="Dubai" panose="020B0503030403030204" pitchFamily="34" charset="-78"/>
+                  <a:ea typeface="Microsoft Himalaya" panose="01010100010101010101" pitchFamily="2" charset="0"/>
+                  <a:cs typeface="Dubai" panose="020B0503030403030204" pitchFamily="34" charset="-78"/>
+                </a:rPr>
+                <a:t>netp</a:t>
+              </a:r>
+              <a:r>
+                <a:rPr lang="en-US" altLang="zh-CN" sz="1200" dirty="0">
+                  <a:solidFill>
+                    <a:srgbClr val="000000"/>
+                  </a:solidFill>
+                  <a:latin typeface="Dubai" panose="020B0503030403030204" pitchFamily="34" charset="-78"/>
+                  <a:ea typeface="Microsoft Himalaya" panose="01010100010101010101" pitchFamily="2" charset="0"/>
+                  <a:cs typeface="Dubai" panose="020B0503030403030204" pitchFamily="34" charset="-78"/>
+                </a:rPr>
+                <a:t>::</a:t>
+              </a:r>
+              <a:r>
+                <a:rPr lang="en-US" altLang="zh-CN" sz="1200" dirty="0">
+                  <a:solidFill>
+                    <a:srgbClr val="2B91AF"/>
+                  </a:solidFill>
+                  <a:latin typeface="Dubai" panose="020B0503030403030204" pitchFamily="34" charset="-78"/>
+                  <a:ea typeface="Microsoft Himalaya" panose="01010100010101010101" pitchFamily="2" charset="0"/>
+                  <a:cs typeface="Dubai" panose="020B0503030403030204" pitchFamily="34" charset="-78"/>
+                </a:rPr>
+                <a:t>channel</a:t>
+              </a:r>
+              <a:r>
+                <a:rPr lang="en-US" altLang="zh-CN" sz="1200" dirty="0">
+                  <a:solidFill>
+                    <a:srgbClr val="000000"/>
+                  </a:solidFill>
+                  <a:latin typeface="Dubai" panose="020B0503030403030204" pitchFamily="34" charset="-78"/>
+                  <a:ea typeface="Microsoft Himalaya" panose="01010100010101010101" pitchFamily="2" charset="0"/>
+                  <a:cs typeface="Dubai" panose="020B0503030403030204" pitchFamily="34" charset="-78"/>
+                </a:rPr>
+                <a:t>&gt; </a:t>
+              </a:r>
+              <a:r>
+                <a:rPr lang="en-US" altLang="zh-CN" sz="1200" dirty="0">
+                  <a:solidFill>
+                    <a:srgbClr val="0000FF"/>
+                  </a:solidFill>
+                  <a:latin typeface="Dubai" panose="020B0503030403030204" pitchFamily="34" charset="-78"/>
+                  <a:ea typeface="Microsoft Himalaya" panose="01010100010101010101" pitchFamily="2" charset="0"/>
+                  <a:cs typeface="Dubai" panose="020B0503030403030204" pitchFamily="34" charset="-78"/>
+                </a:rPr>
+                <a:t>const</a:t>
+              </a:r>
+              <a:r>
+                <a:rPr lang="en-US" altLang="zh-CN" sz="1200" dirty="0">
+                  <a:solidFill>
+                    <a:srgbClr val="000000"/>
+                  </a:solidFill>
+                  <a:latin typeface="Dubai" panose="020B0503030403030204" pitchFamily="34" charset="-78"/>
+                  <a:ea typeface="Microsoft Himalaya" panose="01010100010101010101" pitchFamily="2" charset="0"/>
+                  <a:cs typeface="Dubai" panose="020B0503030403030204" pitchFamily="34" charset="-78"/>
+                </a:rPr>
+                <a:t>&amp; </a:t>
+              </a:r>
+              <a:r>
+                <a:rPr lang="en-US" altLang="zh-CN" sz="1200" dirty="0" err="1">
+                  <a:solidFill>
+                    <a:srgbClr val="808080"/>
+                  </a:solidFill>
+                  <a:latin typeface="Dubai" panose="020B0503030403030204" pitchFamily="34" charset="-78"/>
+                  <a:ea typeface="Microsoft Himalaya" panose="01010100010101010101" pitchFamily="2" charset="0"/>
+                  <a:cs typeface="Dubai" panose="020B0503030403030204" pitchFamily="34" charset="-78"/>
+                </a:rPr>
+                <a:t>ch</a:t>
+              </a:r>
+              <a:r>
+                <a:rPr lang="en-US" altLang="zh-CN" sz="1200" dirty="0">
+                  <a:solidFill>
+                    <a:srgbClr val="000000"/>
+                  </a:solidFill>
+                  <a:latin typeface="Dubai" panose="020B0503030403030204" pitchFamily="34" charset="-78"/>
+                  <a:ea typeface="Microsoft Himalaya" panose="01010100010101010101" pitchFamily="2" charset="0"/>
+                  <a:cs typeface="Dubai" panose="020B0503030403030204" pitchFamily="34" charset="-78"/>
+                </a:rPr>
+                <a:t>) {</a:t>
+              </a:r>
+            </a:p>
+            <a:p>
+              <a:r>
+                <a:rPr lang="en-US" altLang="zh-CN" sz="1200" dirty="0">
+                  <a:solidFill>
+                    <a:srgbClr val="808080"/>
+                  </a:solidFill>
+                  <a:latin typeface="Dubai" panose="020B0503030403030204" pitchFamily="34" charset="-78"/>
+                  <a:ea typeface="Microsoft Himalaya" panose="01010100010101010101" pitchFamily="2" charset="0"/>
+                  <a:cs typeface="Dubai" panose="020B0503030403030204" pitchFamily="34" charset="-78"/>
+                </a:rPr>
+                <a:t>    </a:t>
+              </a:r>
+              <a:r>
+                <a:rPr lang="en-US" altLang="zh-CN" sz="1200" dirty="0" err="1">
+                  <a:solidFill>
+                    <a:srgbClr val="808080"/>
+                  </a:solidFill>
+                  <a:latin typeface="Dubai" panose="020B0503030403030204" pitchFamily="34" charset="-78"/>
+                  <a:ea typeface="Microsoft Himalaya" panose="01010100010101010101" pitchFamily="2" charset="0"/>
+                  <a:cs typeface="Dubai" panose="020B0503030403030204" pitchFamily="34" charset="-78"/>
+                </a:rPr>
+                <a:t>ch</a:t>
+              </a:r>
+              <a:r>
+                <a:rPr lang="en-US" altLang="zh-CN" sz="1200" dirty="0">
+                  <a:solidFill>
+                    <a:srgbClr val="008080"/>
+                  </a:solidFill>
+                  <a:latin typeface="Dubai" panose="020B0503030403030204" pitchFamily="34" charset="-78"/>
+                  <a:ea typeface="Microsoft Himalaya" panose="01010100010101010101" pitchFamily="2" charset="0"/>
+                  <a:cs typeface="Dubai" panose="020B0503030403030204" pitchFamily="34" charset="-78"/>
+                </a:rPr>
+                <a:t>-&gt;</a:t>
+              </a:r>
+              <a:r>
+                <a:rPr lang="en-US" altLang="zh-CN" sz="1200" dirty="0">
+                  <a:solidFill>
+                    <a:srgbClr val="000000"/>
+                  </a:solidFill>
+                  <a:latin typeface="Dubai" panose="020B0503030403030204" pitchFamily="34" charset="-78"/>
+                  <a:ea typeface="Microsoft Himalaya" panose="01010100010101010101" pitchFamily="2" charset="0"/>
+                  <a:cs typeface="Dubai" panose="020B0503030403030204" pitchFamily="34" charset="-78"/>
+                </a:rPr>
+                <a:t>pipeline()</a:t>
+              </a:r>
+              <a:r>
+                <a:rPr lang="en-US" altLang="zh-CN" sz="1200" dirty="0">
+                  <a:solidFill>
+                    <a:srgbClr val="008080"/>
+                  </a:solidFill>
+                  <a:latin typeface="Dubai" panose="020B0503030403030204" pitchFamily="34" charset="-78"/>
+                  <a:ea typeface="Microsoft Himalaya" panose="01010100010101010101" pitchFamily="2" charset="0"/>
+                  <a:cs typeface="Dubai" panose="020B0503030403030204" pitchFamily="34" charset="-78"/>
+                </a:rPr>
+                <a:t>-&gt;</a:t>
+              </a:r>
+              <a:r>
+                <a:rPr lang="en-US" altLang="zh-CN" sz="1200" dirty="0" err="1">
+                  <a:solidFill>
+                    <a:srgbClr val="000000"/>
+                  </a:solidFill>
+                  <a:latin typeface="Dubai" panose="020B0503030403030204" pitchFamily="34" charset="-78"/>
+                  <a:ea typeface="Microsoft Himalaya" panose="01010100010101010101" pitchFamily="2" charset="0"/>
+                  <a:cs typeface="Dubai" panose="020B0503030403030204" pitchFamily="34" charset="-78"/>
+                </a:rPr>
+                <a:t>add_last</a:t>
+              </a:r>
+              <a:r>
+                <a:rPr lang="en-US" altLang="zh-CN" sz="1200" dirty="0">
+                  <a:solidFill>
+                    <a:srgbClr val="000000"/>
+                  </a:solidFill>
+                  <a:latin typeface="Dubai" panose="020B0503030403030204" pitchFamily="34" charset="-78"/>
+                  <a:ea typeface="Microsoft Himalaya" panose="01010100010101010101" pitchFamily="2" charset="0"/>
+                  <a:cs typeface="Dubai" panose="020B0503030403030204" pitchFamily="34" charset="-78"/>
+                </a:rPr>
+                <a:t>(</a:t>
+              </a:r>
+              <a:r>
+                <a:rPr lang="en-US" altLang="zh-CN" sz="1200" dirty="0" err="1">
+                  <a:solidFill>
+                    <a:srgbClr val="000000"/>
+                  </a:solidFill>
+                  <a:latin typeface="Dubai" panose="020B0503030403030204" pitchFamily="34" charset="-78"/>
+                  <a:ea typeface="Microsoft Himalaya" panose="01010100010101010101" pitchFamily="2" charset="0"/>
+                  <a:cs typeface="Dubai" panose="020B0503030403030204" pitchFamily="34" charset="-78"/>
+                </a:rPr>
+                <a:t>netp</a:t>
+              </a:r>
+              <a:r>
+                <a:rPr lang="en-US" altLang="zh-CN" sz="1200" dirty="0">
+                  <a:solidFill>
+                    <a:srgbClr val="000000"/>
+                  </a:solidFill>
+                  <a:latin typeface="Dubai" panose="020B0503030403030204" pitchFamily="34" charset="-78"/>
+                  <a:ea typeface="Microsoft Himalaya" panose="01010100010101010101" pitchFamily="2" charset="0"/>
+                  <a:cs typeface="Dubai" panose="020B0503030403030204" pitchFamily="34" charset="-78"/>
+                </a:rPr>
+                <a:t>::</a:t>
+              </a:r>
+              <a:r>
+                <a:rPr lang="en-US" altLang="zh-CN" sz="1200" dirty="0" err="1">
+                  <a:solidFill>
+                    <a:srgbClr val="000000"/>
+                  </a:solidFill>
+                  <a:latin typeface="Dubai" panose="020B0503030403030204" pitchFamily="34" charset="-78"/>
+                  <a:ea typeface="Microsoft Himalaya" panose="01010100010101010101" pitchFamily="2" charset="0"/>
+                  <a:cs typeface="Dubai" panose="020B0503030403030204" pitchFamily="34" charset="-78"/>
+                </a:rPr>
+                <a:t>make_ref</a:t>
+              </a:r>
+              <a:r>
+                <a:rPr lang="en-US" altLang="zh-CN" sz="1200" dirty="0">
+                  <a:solidFill>
+                    <a:srgbClr val="000000"/>
+                  </a:solidFill>
+                  <a:latin typeface="Dubai" panose="020B0503030403030204" pitchFamily="34" charset="-78"/>
+                  <a:ea typeface="Microsoft Himalaya" panose="01010100010101010101" pitchFamily="2" charset="0"/>
+                  <a:cs typeface="Dubai" panose="020B0503030403030204" pitchFamily="34" charset="-78"/>
+                </a:rPr>
+                <a:t>&lt;</a:t>
+              </a:r>
+              <a:r>
+                <a:rPr lang="en-US" altLang="zh-CN" sz="1200" dirty="0">
+                  <a:solidFill>
+                    <a:srgbClr val="2B91AF"/>
+                  </a:solidFill>
+                  <a:latin typeface="Dubai" panose="020B0503030403030204" pitchFamily="34" charset="-78"/>
+                  <a:ea typeface="Microsoft Himalaya" panose="01010100010101010101" pitchFamily="2" charset="0"/>
+                  <a:cs typeface="Dubai" panose="020B0503030403030204" pitchFamily="34" charset="-78"/>
+                </a:rPr>
+                <a:t>Pong</a:t>
+              </a:r>
+              <a:r>
+                <a:rPr lang="en-US" altLang="zh-CN" sz="1200" dirty="0">
+                  <a:solidFill>
+                    <a:srgbClr val="000000"/>
+                  </a:solidFill>
+                  <a:latin typeface="Dubai" panose="020B0503030403030204" pitchFamily="34" charset="-78"/>
+                  <a:ea typeface="Microsoft Himalaya" panose="01010100010101010101" pitchFamily="2" charset="0"/>
+                  <a:cs typeface="Dubai" panose="020B0503030403030204" pitchFamily="34" charset="-78"/>
+                </a:rPr>
+                <a:t>&gt;());</a:t>
+              </a:r>
+            </a:p>
+            <a:p>
+              <a:r>
+                <a:rPr lang="en-US" altLang="zh-CN" sz="1200" dirty="0">
+                  <a:solidFill>
+                    <a:srgbClr val="000000"/>
+                  </a:solidFill>
+                  <a:latin typeface="Dubai" panose="020B0503030403030204" pitchFamily="34" charset="-78"/>
+                  <a:ea typeface="Microsoft Himalaya" panose="01010100010101010101" pitchFamily="2" charset="0"/>
+                  <a:cs typeface="Dubai" panose="020B0503030403030204" pitchFamily="34" charset="-78"/>
+                </a:rPr>
+                <a:t>});</a:t>
+              </a:r>
+            </a:p>
+            <a:p>
+              <a:r>
+                <a:rPr lang="en-US" altLang="zh-CN" sz="1200" dirty="0">
+                  <a:solidFill>
+                    <a:srgbClr val="000000"/>
+                  </a:solidFill>
+                  <a:latin typeface="Dubai" panose="020B0503030403030204" pitchFamily="34" charset="-78"/>
+                  <a:ea typeface="Microsoft Himalaya" panose="01010100010101010101" pitchFamily="2" charset="0"/>
+                  <a:cs typeface="Dubai" panose="020B0503030403030204" pitchFamily="34" charset="-78"/>
+                </a:rPr>
+                <a:t>if(std::get&lt;0&gt;(</a:t>
+              </a:r>
+              <a:r>
+                <a:rPr lang="en-US" altLang="zh-CN" sz="1200" dirty="0" err="1">
+                  <a:solidFill>
+                    <a:srgbClr val="000000"/>
+                  </a:solidFill>
+                  <a:latin typeface="Dubai" panose="020B0503030403030204" pitchFamily="34" charset="-78"/>
+                  <a:ea typeface="Microsoft Himalaya" panose="01010100010101010101" pitchFamily="2" charset="0"/>
+                  <a:cs typeface="Dubai" panose="020B0503030403030204" pitchFamily="34" charset="-78"/>
+                </a:rPr>
+                <a:t>listen_p</a:t>
+              </a:r>
+              <a:r>
+                <a:rPr lang="en-US" altLang="zh-CN" sz="1200" dirty="0">
+                  <a:solidFill>
+                    <a:srgbClr val="008080"/>
+                  </a:solidFill>
+                  <a:latin typeface="Dubai" panose="020B0503030403030204" pitchFamily="34" charset="-78"/>
+                  <a:ea typeface="Microsoft Himalaya" panose="01010100010101010101" pitchFamily="2" charset="0"/>
+                  <a:cs typeface="Dubai" panose="020B0503030403030204" pitchFamily="34" charset="-78"/>
+                </a:rPr>
+                <a:t>-&gt;</a:t>
+              </a:r>
+              <a:r>
+                <a:rPr lang="en-US" altLang="zh-CN" sz="1200" dirty="0">
+                  <a:solidFill>
+                    <a:srgbClr val="000000"/>
+                  </a:solidFill>
+                  <a:latin typeface="Dubai" panose="020B0503030403030204" pitchFamily="34" charset="-78"/>
+                  <a:ea typeface="Microsoft Himalaya" panose="01010100010101010101" pitchFamily="2" charset="0"/>
+                  <a:cs typeface="Dubai" panose="020B0503030403030204" pitchFamily="34" charset="-78"/>
+                </a:rPr>
+                <a:t>get() != </a:t>
+              </a:r>
+              <a:r>
+                <a:rPr lang="en-US" altLang="zh-CN" sz="1200" dirty="0" err="1">
+                  <a:solidFill>
+                    <a:srgbClr val="000000"/>
+                  </a:solidFill>
+                  <a:latin typeface="Dubai" panose="020B0503030403030204" pitchFamily="34" charset="-78"/>
+                  <a:ea typeface="Microsoft Himalaya" panose="01010100010101010101" pitchFamily="2" charset="0"/>
+                  <a:cs typeface="Dubai" panose="020B0503030403030204" pitchFamily="34" charset="-78"/>
+                </a:rPr>
+                <a:t>netp</a:t>
+              </a:r>
+              <a:r>
+                <a:rPr lang="en-US" altLang="zh-CN" sz="1200" dirty="0">
+                  <a:solidFill>
+                    <a:srgbClr val="000000"/>
+                  </a:solidFill>
+                  <a:latin typeface="Dubai" panose="020B0503030403030204" pitchFamily="34" charset="-78"/>
+                  <a:ea typeface="Microsoft Himalaya" panose="01010100010101010101" pitchFamily="2" charset="0"/>
+                  <a:cs typeface="Dubai" panose="020B0503030403030204" pitchFamily="34" charset="-78"/>
+                </a:rPr>
+                <a:t>::Ok) {    </a:t>
+              </a:r>
+            </a:p>
+            <a:p>
+              <a:r>
+                <a:rPr lang="en-US" altLang="zh-CN" sz="1200" dirty="0">
+                  <a:solidFill>
+                    <a:srgbClr val="000000"/>
+                  </a:solidFill>
+                  <a:latin typeface="Dubai" panose="020B0503030403030204" pitchFamily="34" charset="-78"/>
+                  <a:ea typeface="Microsoft Himalaya" panose="01010100010101010101" pitchFamily="2" charset="0"/>
+                  <a:cs typeface="Dubai" panose="020B0503030403030204" pitchFamily="34" charset="-78"/>
+                </a:rPr>
+                <a:t>    //</a:t>
+              </a:r>
+            </a:p>
+            <a:p>
+              <a:r>
+                <a:rPr lang="en-US" altLang="zh-CN" sz="1200" dirty="0">
+                  <a:solidFill>
+                    <a:srgbClr val="000000"/>
+                  </a:solidFill>
+                  <a:latin typeface="Dubai" panose="020B0503030403030204" pitchFamily="34" charset="-78"/>
+                  <a:ea typeface="Microsoft Himalaya" panose="01010100010101010101" pitchFamily="2" charset="0"/>
+                  <a:cs typeface="Dubai" panose="020B0503030403030204" pitchFamily="34" charset="-78"/>
+                </a:rPr>
+                <a:t>}</a:t>
+              </a:r>
+            </a:p>
+            <a:p>
+              <a:r>
+                <a:rPr lang="en-US" altLang="zh-CN" sz="1200" dirty="0">
+                  <a:solidFill>
+                    <a:srgbClr val="000000"/>
+                  </a:solidFill>
+                  <a:latin typeface="Dubai" panose="020B0503030403030204" pitchFamily="34" charset="-78"/>
+                  <a:ea typeface="Microsoft Himalaya" panose="01010100010101010101" pitchFamily="2" charset="0"/>
+                  <a:cs typeface="Dubai" panose="020B0503030403030204" pitchFamily="34" charset="-78"/>
+                </a:rPr>
+                <a:t>…</a:t>
+              </a:r>
+              <a:endParaRPr lang="en-US" altLang="zh-CN" sz="1200" dirty="0">
+                <a:latin typeface="Dubai" panose="020B0503030403030204" pitchFamily="34" charset="-78"/>
+                <a:cs typeface="Dubai" panose="020B0503030403030204" pitchFamily="34" charset="-78"/>
+              </a:endParaRPr>
+            </a:p>
+            <a:p>
+              <a:r>
+                <a:rPr lang="en-US" altLang="zh-CN" sz="1200" dirty="0">
+                  <a:solidFill>
+                    <a:srgbClr val="6F008A"/>
+                  </a:solidFill>
+                  <a:latin typeface="Dubai" panose="020B0503030403030204" pitchFamily="34" charset="-78"/>
+                  <a:ea typeface="Microsoft Himalaya" panose="01010100010101010101" pitchFamily="2" charset="0"/>
+                  <a:cs typeface="Dubai" panose="020B0503030403030204" pitchFamily="34" charset="-78"/>
+                </a:rPr>
+                <a:t>NRP</a:t>
+              </a:r>
+              <a:r>
+                <a:rPr lang="en-US" altLang="zh-CN" sz="1200" dirty="0">
+                  <a:solidFill>
+                    <a:srgbClr val="000000"/>
+                  </a:solidFill>
+                  <a:latin typeface="Dubai" panose="020B0503030403030204" pitchFamily="34" charset="-78"/>
+                  <a:ea typeface="Microsoft Himalaya" panose="01010100010101010101" pitchFamily="2" charset="0"/>
+                  <a:cs typeface="Dubai" panose="020B0503030403030204" pitchFamily="34" charset="-78"/>
+                </a:rPr>
+                <a:t>&lt;</a:t>
+              </a:r>
+              <a:r>
+                <a:rPr lang="en-US" altLang="zh-CN" sz="1200" dirty="0" err="1">
+                  <a:solidFill>
+                    <a:srgbClr val="000000"/>
+                  </a:solidFill>
+                  <a:latin typeface="Dubai" panose="020B0503030403030204" pitchFamily="34" charset="-78"/>
+                  <a:ea typeface="Microsoft Himalaya" panose="01010100010101010101" pitchFamily="2" charset="0"/>
+                  <a:cs typeface="Dubai" panose="020B0503030403030204" pitchFamily="34" charset="-78"/>
+                </a:rPr>
+                <a:t>netp</a:t>
+              </a:r>
+              <a:r>
+                <a:rPr lang="en-US" altLang="zh-CN" sz="1200" dirty="0">
+                  <a:solidFill>
+                    <a:srgbClr val="000000"/>
+                  </a:solidFill>
+                  <a:latin typeface="Dubai" panose="020B0503030403030204" pitchFamily="34" charset="-78"/>
+                  <a:ea typeface="Microsoft Himalaya" panose="01010100010101010101" pitchFamily="2" charset="0"/>
+                  <a:cs typeface="Dubai" panose="020B0503030403030204" pitchFamily="34" charset="-78"/>
+                </a:rPr>
+                <a:t>::</a:t>
+              </a:r>
+              <a:r>
+                <a:rPr lang="en-US" altLang="zh-CN" sz="1200" dirty="0" err="1">
+                  <a:solidFill>
+                    <a:srgbClr val="2B91AF"/>
+                  </a:solidFill>
+                  <a:latin typeface="Dubai" panose="020B0503030403030204" pitchFamily="34" charset="-78"/>
+                  <a:ea typeface="Microsoft Himalaya" panose="01010100010101010101" pitchFamily="2" charset="0"/>
+                  <a:cs typeface="Dubai" panose="020B0503030403030204" pitchFamily="34" charset="-78"/>
+                </a:rPr>
+                <a:t>channel_dial_promise</a:t>
+              </a:r>
+              <a:r>
+                <a:rPr lang="en-US" altLang="zh-CN" sz="1200" dirty="0">
+                  <a:solidFill>
+                    <a:srgbClr val="000000"/>
+                  </a:solidFill>
+                  <a:latin typeface="Dubai" panose="020B0503030403030204" pitchFamily="34" charset="-78"/>
+                  <a:ea typeface="Microsoft Himalaya" panose="01010100010101010101" pitchFamily="2" charset="0"/>
+                  <a:cs typeface="Dubai" panose="020B0503030403030204" pitchFamily="34" charset="-78"/>
+                </a:rPr>
+                <a:t>&gt; </a:t>
+              </a:r>
+              <a:r>
+                <a:rPr lang="en-US" altLang="zh-CN" sz="1200" dirty="0" err="1">
+                  <a:solidFill>
+                    <a:srgbClr val="000000"/>
+                  </a:solidFill>
+                  <a:latin typeface="Dubai" panose="020B0503030403030204" pitchFamily="34" charset="-78"/>
+                  <a:ea typeface="Microsoft Himalaya" panose="01010100010101010101" pitchFamily="2" charset="0"/>
+                  <a:cs typeface="Dubai" panose="020B0503030403030204" pitchFamily="34" charset="-78"/>
+                </a:rPr>
+                <a:t>dial_p</a:t>
+              </a:r>
+              <a:r>
+                <a:rPr lang="en-US" altLang="zh-CN" sz="1200" dirty="0">
+                  <a:solidFill>
+                    <a:srgbClr val="000000"/>
+                  </a:solidFill>
+                  <a:latin typeface="Dubai" panose="020B0503030403030204" pitchFamily="34" charset="-78"/>
+                  <a:ea typeface="Microsoft Himalaya" panose="01010100010101010101" pitchFamily="2" charset="0"/>
+                  <a:cs typeface="Dubai" panose="020B0503030403030204" pitchFamily="34" charset="-78"/>
+                </a:rPr>
+                <a:t> = </a:t>
+              </a:r>
+            </a:p>
+            <a:p>
+              <a:r>
+                <a:rPr lang="en-US" altLang="zh-CN" sz="1200" dirty="0" err="1">
+                  <a:solidFill>
+                    <a:srgbClr val="000000"/>
+                  </a:solidFill>
+                  <a:latin typeface="Dubai" panose="020B0503030403030204" pitchFamily="34" charset="-78"/>
+                  <a:ea typeface="Microsoft Himalaya" panose="01010100010101010101" pitchFamily="2" charset="0"/>
+                  <a:cs typeface="Dubai" panose="020B0503030403030204" pitchFamily="34" charset="-78"/>
+                </a:rPr>
+                <a:t>netp</a:t>
+              </a:r>
+              <a:r>
+                <a:rPr lang="en-US" altLang="zh-CN" sz="1200" dirty="0">
+                  <a:solidFill>
+                    <a:srgbClr val="000000"/>
+                  </a:solidFill>
+                  <a:latin typeface="Dubai" panose="020B0503030403030204" pitchFamily="34" charset="-78"/>
+                  <a:ea typeface="Microsoft Himalaya" panose="01010100010101010101" pitchFamily="2" charset="0"/>
+                  <a:cs typeface="Dubai" panose="020B0503030403030204" pitchFamily="34" charset="-78"/>
+                </a:rPr>
+                <a:t>::</a:t>
+              </a:r>
+              <a:r>
+                <a:rPr lang="en-US" altLang="zh-CN" sz="1200" dirty="0">
+                  <a:solidFill>
+                    <a:srgbClr val="2B91AF"/>
+                  </a:solidFill>
+                  <a:latin typeface="Dubai" panose="020B0503030403030204" pitchFamily="34" charset="-78"/>
+                  <a:ea typeface="Microsoft Himalaya" panose="01010100010101010101" pitchFamily="2" charset="0"/>
+                  <a:cs typeface="Dubai" panose="020B0503030403030204" pitchFamily="34" charset="-78"/>
+                </a:rPr>
+                <a:t>socket</a:t>
+              </a:r>
+              <a:r>
+                <a:rPr lang="en-US" altLang="zh-CN" sz="1200" dirty="0">
+                  <a:solidFill>
+                    <a:srgbClr val="000000"/>
+                  </a:solidFill>
+                  <a:latin typeface="Dubai" panose="020B0503030403030204" pitchFamily="34" charset="-78"/>
+                  <a:ea typeface="Microsoft Himalaya" panose="01010100010101010101" pitchFamily="2" charset="0"/>
+                  <a:cs typeface="Dubai" panose="020B0503030403030204" pitchFamily="34" charset="-78"/>
+                </a:rPr>
+                <a:t>::dial(</a:t>
+              </a:r>
+              <a:r>
+                <a:rPr lang="en-US" altLang="zh-CN" sz="1200" dirty="0">
+                  <a:solidFill>
+                    <a:srgbClr val="A31515"/>
+                  </a:solidFill>
+                  <a:latin typeface="Dubai" panose="020B0503030403030204" pitchFamily="34" charset="-78"/>
+                  <a:ea typeface="Microsoft Himalaya" panose="01010100010101010101" pitchFamily="2" charset="0"/>
+                  <a:cs typeface="Dubai" panose="020B0503030403030204" pitchFamily="34" charset="-78"/>
+                </a:rPr>
+                <a:t>"</a:t>
+              </a:r>
+              <a:r>
+                <a:rPr lang="en-US" altLang="zh-CN" sz="1200" dirty="0" err="1">
+                  <a:solidFill>
+                    <a:srgbClr val="A31515"/>
+                  </a:solidFill>
+                  <a:latin typeface="Dubai" panose="020B0503030403030204" pitchFamily="34" charset="-78"/>
+                  <a:ea typeface="Microsoft Himalaya" panose="01010100010101010101" pitchFamily="2" charset="0"/>
+                  <a:cs typeface="Dubai" panose="020B0503030403030204" pitchFamily="34" charset="-78"/>
+                </a:rPr>
+                <a:t>tcp</a:t>
+              </a:r>
+              <a:r>
+                <a:rPr lang="en-US" altLang="zh-CN" sz="1200">
+                  <a:solidFill>
+                    <a:srgbClr val="A31515"/>
+                  </a:solidFill>
+                  <a:latin typeface="Dubai" panose="020B0503030403030204" pitchFamily="34" charset="-78"/>
+                  <a:ea typeface="Microsoft Himalaya" panose="01010100010101010101" pitchFamily="2" charset="0"/>
+                  <a:cs typeface="Dubai" panose="020B0503030403030204" pitchFamily="34" charset="-78"/>
+                </a:rPr>
+                <a:t>://127.0.0.1:22137</a:t>
+              </a:r>
+              <a:r>
+                <a:rPr lang="en-US" altLang="zh-CN" sz="1200" dirty="0">
+                  <a:solidFill>
+                    <a:srgbClr val="A31515"/>
+                  </a:solidFill>
+                  <a:latin typeface="Dubai" panose="020B0503030403030204" pitchFamily="34" charset="-78"/>
+                  <a:ea typeface="Microsoft Himalaya" panose="01010100010101010101" pitchFamily="2" charset="0"/>
+                  <a:cs typeface="Dubai" panose="020B0503030403030204" pitchFamily="34" charset="-78"/>
+                </a:rPr>
+                <a:t>"</a:t>
+              </a:r>
+              <a:r>
+                <a:rPr lang="en-US" altLang="zh-CN" sz="1200" dirty="0">
+                  <a:solidFill>
+                    <a:srgbClr val="000000"/>
+                  </a:solidFill>
+                  <a:latin typeface="Dubai" panose="020B0503030403030204" pitchFamily="34" charset="-78"/>
+                  <a:ea typeface="Microsoft Himalaya" panose="01010100010101010101" pitchFamily="2" charset="0"/>
+                  <a:cs typeface="Dubai" panose="020B0503030403030204" pitchFamily="34" charset="-78"/>
+                </a:rPr>
+                <a:t>, [](</a:t>
+              </a:r>
+              <a:r>
+                <a:rPr lang="en-US" altLang="zh-CN" sz="1200" dirty="0">
+                  <a:solidFill>
+                    <a:srgbClr val="6F008A"/>
+                  </a:solidFill>
+                  <a:latin typeface="Dubai" panose="020B0503030403030204" pitchFamily="34" charset="-78"/>
+                  <a:ea typeface="Microsoft Himalaya" panose="01010100010101010101" pitchFamily="2" charset="0"/>
+                  <a:cs typeface="Dubai" panose="020B0503030403030204" pitchFamily="34" charset="-78"/>
+                </a:rPr>
+                <a:t>NRP</a:t>
+              </a:r>
+              <a:r>
+                <a:rPr lang="en-US" altLang="zh-CN" sz="1200" dirty="0">
+                  <a:solidFill>
+                    <a:srgbClr val="000000"/>
+                  </a:solidFill>
+                  <a:latin typeface="Dubai" panose="020B0503030403030204" pitchFamily="34" charset="-78"/>
+                  <a:ea typeface="Microsoft Himalaya" panose="01010100010101010101" pitchFamily="2" charset="0"/>
+                  <a:cs typeface="Dubai" panose="020B0503030403030204" pitchFamily="34" charset="-78"/>
+                </a:rPr>
+                <a:t>&lt;</a:t>
+              </a:r>
+              <a:r>
+                <a:rPr lang="en-US" altLang="zh-CN" sz="1200" dirty="0" err="1">
+                  <a:solidFill>
+                    <a:srgbClr val="000000"/>
+                  </a:solidFill>
+                  <a:latin typeface="Dubai" panose="020B0503030403030204" pitchFamily="34" charset="-78"/>
+                  <a:ea typeface="Microsoft Himalaya" panose="01010100010101010101" pitchFamily="2" charset="0"/>
+                  <a:cs typeface="Dubai" panose="020B0503030403030204" pitchFamily="34" charset="-78"/>
+                </a:rPr>
+                <a:t>netp</a:t>
+              </a:r>
+              <a:r>
+                <a:rPr lang="en-US" altLang="zh-CN" sz="1200" dirty="0">
+                  <a:solidFill>
+                    <a:srgbClr val="000000"/>
+                  </a:solidFill>
+                  <a:latin typeface="Dubai" panose="020B0503030403030204" pitchFamily="34" charset="-78"/>
+                  <a:ea typeface="Microsoft Himalaya" panose="01010100010101010101" pitchFamily="2" charset="0"/>
+                  <a:cs typeface="Dubai" panose="020B0503030403030204" pitchFamily="34" charset="-78"/>
+                </a:rPr>
+                <a:t>::</a:t>
+              </a:r>
+              <a:r>
+                <a:rPr lang="en-US" altLang="zh-CN" sz="1200" dirty="0">
+                  <a:solidFill>
+                    <a:srgbClr val="2B91AF"/>
+                  </a:solidFill>
+                  <a:latin typeface="Dubai" panose="020B0503030403030204" pitchFamily="34" charset="-78"/>
+                  <a:ea typeface="Microsoft Himalaya" panose="01010100010101010101" pitchFamily="2" charset="0"/>
+                  <a:cs typeface="Dubai" panose="020B0503030403030204" pitchFamily="34" charset="-78"/>
+                </a:rPr>
+                <a:t>channel</a:t>
+              </a:r>
+              <a:r>
+                <a:rPr lang="en-US" altLang="zh-CN" sz="1200" dirty="0">
+                  <a:solidFill>
+                    <a:srgbClr val="000000"/>
+                  </a:solidFill>
+                  <a:latin typeface="Dubai" panose="020B0503030403030204" pitchFamily="34" charset="-78"/>
+                  <a:ea typeface="Microsoft Himalaya" panose="01010100010101010101" pitchFamily="2" charset="0"/>
+                  <a:cs typeface="Dubai" panose="020B0503030403030204" pitchFamily="34" charset="-78"/>
+                </a:rPr>
+                <a:t>&gt; </a:t>
+              </a:r>
+              <a:r>
+                <a:rPr lang="en-US" altLang="zh-CN" sz="1200" dirty="0">
+                  <a:solidFill>
+                    <a:srgbClr val="0000FF"/>
+                  </a:solidFill>
+                  <a:latin typeface="Dubai" panose="020B0503030403030204" pitchFamily="34" charset="-78"/>
+                  <a:ea typeface="Microsoft Himalaya" panose="01010100010101010101" pitchFamily="2" charset="0"/>
+                  <a:cs typeface="Dubai" panose="020B0503030403030204" pitchFamily="34" charset="-78"/>
+                </a:rPr>
+                <a:t>const</a:t>
+              </a:r>
+              <a:r>
+                <a:rPr lang="en-US" altLang="zh-CN" sz="1200" dirty="0">
+                  <a:solidFill>
+                    <a:srgbClr val="000000"/>
+                  </a:solidFill>
+                  <a:latin typeface="Dubai" panose="020B0503030403030204" pitchFamily="34" charset="-78"/>
+                  <a:ea typeface="Microsoft Himalaya" panose="01010100010101010101" pitchFamily="2" charset="0"/>
+                  <a:cs typeface="Dubai" panose="020B0503030403030204" pitchFamily="34" charset="-78"/>
+                </a:rPr>
+                <a:t>&amp; </a:t>
+              </a:r>
+              <a:r>
+                <a:rPr lang="en-US" altLang="zh-CN" sz="1200" dirty="0" err="1">
+                  <a:solidFill>
+                    <a:srgbClr val="808080"/>
+                  </a:solidFill>
+                  <a:latin typeface="Dubai" panose="020B0503030403030204" pitchFamily="34" charset="-78"/>
+                  <a:ea typeface="Microsoft Himalaya" panose="01010100010101010101" pitchFamily="2" charset="0"/>
+                  <a:cs typeface="Dubai" panose="020B0503030403030204" pitchFamily="34" charset="-78"/>
+                </a:rPr>
+                <a:t>ch</a:t>
+              </a:r>
+              <a:r>
+                <a:rPr lang="en-US" altLang="zh-CN" sz="1200" dirty="0">
+                  <a:solidFill>
+                    <a:srgbClr val="000000"/>
+                  </a:solidFill>
+                  <a:latin typeface="Dubai" panose="020B0503030403030204" pitchFamily="34" charset="-78"/>
+                  <a:ea typeface="Microsoft Himalaya" panose="01010100010101010101" pitchFamily="2" charset="0"/>
+                  <a:cs typeface="Dubai" panose="020B0503030403030204" pitchFamily="34" charset="-78"/>
+                </a:rPr>
+                <a:t>) {</a:t>
+              </a:r>
+            </a:p>
+            <a:p>
+              <a:r>
+                <a:rPr lang="en-US" altLang="zh-CN" sz="1200" dirty="0">
+                  <a:solidFill>
+                    <a:srgbClr val="808080"/>
+                  </a:solidFill>
+                  <a:latin typeface="Dubai" panose="020B0503030403030204" pitchFamily="34" charset="-78"/>
+                  <a:ea typeface="Microsoft Himalaya" panose="01010100010101010101" pitchFamily="2" charset="0"/>
+                  <a:cs typeface="Dubai" panose="020B0503030403030204" pitchFamily="34" charset="-78"/>
+                </a:rPr>
+                <a:t>    </a:t>
+              </a:r>
+              <a:r>
+                <a:rPr lang="en-US" altLang="zh-CN" sz="1200" dirty="0" err="1">
+                  <a:solidFill>
+                    <a:srgbClr val="808080"/>
+                  </a:solidFill>
+                  <a:latin typeface="Dubai" panose="020B0503030403030204" pitchFamily="34" charset="-78"/>
+                  <a:ea typeface="Microsoft Himalaya" panose="01010100010101010101" pitchFamily="2" charset="0"/>
+                  <a:cs typeface="Dubai" panose="020B0503030403030204" pitchFamily="34" charset="-78"/>
+                </a:rPr>
+                <a:t>ch</a:t>
+              </a:r>
+              <a:r>
+                <a:rPr lang="en-US" altLang="zh-CN" sz="1200" dirty="0">
+                  <a:solidFill>
+                    <a:srgbClr val="008080"/>
+                  </a:solidFill>
+                  <a:latin typeface="Dubai" panose="020B0503030403030204" pitchFamily="34" charset="-78"/>
+                  <a:ea typeface="Microsoft Himalaya" panose="01010100010101010101" pitchFamily="2" charset="0"/>
+                  <a:cs typeface="Dubai" panose="020B0503030403030204" pitchFamily="34" charset="-78"/>
+                </a:rPr>
+                <a:t>-&gt;</a:t>
+              </a:r>
+              <a:r>
+                <a:rPr lang="en-US" altLang="zh-CN" sz="1200" dirty="0">
+                  <a:solidFill>
+                    <a:srgbClr val="000000"/>
+                  </a:solidFill>
+                  <a:latin typeface="Dubai" panose="020B0503030403030204" pitchFamily="34" charset="-78"/>
+                  <a:ea typeface="Microsoft Himalaya" panose="01010100010101010101" pitchFamily="2" charset="0"/>
+                  <a:cs typeface="Dubai" panose="020B0503030403030204" pitchFamily="34" charset="-78"/>
+                </a:rPr>
+                <a:t>pipeline()</a:t>
+              </a:r>
+              <a:r>
+                <a:rPr lang="en-US" altLang="zh-CN" sz="1200" dirty="0">
+                  <a:solidFill>
+                    <a:srgbClr val="008080"/>
+                  </a:solidFill>
+                  <a:latin typeface="Dubai" panose="020B0503030403030204" pitchFamily="34" charset="-78"/>
+                  <a:ea typeface="Microsoft Himalaya" panose="01010100010101010101" pitchFamily="2" charset="0"/>
+                  <a:cs typeface="Dubai" panose="020B0503030403030204" pitchFamily="34" charset="-78"/>
+                </a:rPr>
+                <a:t>-&gt;</a:t>
+              </a:r>
+              <a:r>
+                <a:rPr lang="en-US" altLang="zh-CN" sz="1200" dirty="0" err="1">
+                  <a:solidFill>
+                    <a:srgbClr val="000000"/>
+                  </a:solidFill>
+                  <a:latin typeface="Dubai" panose="020B0503030403030204" pitchFamily="34" charset="-78"/>
+                  <a:ea typeface="Microsoft Himalaya" panose="01010100010101010101" pitchFamily="2" charset="0"/>
+                  <a:cs typeface="Dubai" panose="020B0503030403030204" pitchFamily="34" charset="-78"/>
+                </a:rPr>
+                <a:t>add_last</a:t>
+              </a:r>
+              <a:r>
+                <a:rPr lang="en-US" altLang="zh-CN" sz="1200" dirty="0">
+                  <a:solidFill>
+                    <a:srgbClr val="000000"/>
+                  </a:solidFill>
+                  <a:latin typeface="Dubai" panose="020B0503030403030204" pitchFamily="34" charset="-78"/>
+                  <a:ea typeface="Microsoft Himalaya" panose="01010100010101010101" pitchFamily="2" charset="0"/>
+                  <a:cs typeface="Dubai" panose="020B0503030403030204" pitchFamily="34" charset="-78"/>
+                </a:rPr>
+                <a:t>(</a:t>
+              </a:r>
+              <a:r>
+                <a:rPr lang="en-US" altLang="zh-CN" sz="1200" dirty="0" err="1">
+                  <a:solidFill>
+                    <a:srgbClr val="000000"/>
+                  </a:solidFill>
+                  <a:latin typeface="Dubai" panose="020B0503030403030204" pitchFamily="34" charset="-78"/>
+                  <a:ea typeface="Microsoft Himalaya" panose="01010100010101010101" pitchFamily="2" charset="0"/>
+                  <a:cs typeface="Dubai" panose="020B0503030403030204" pitchFamily="34" charset="-78"/>
+                </a:rPr>
+                <a:t>netp</a:t>
+              </a:r>
+              <a:r>
+                <a:rPr lang="en-US" altLang="zh-CN" sz="1200" dirty="0">
+                  <a:solidFill>
+                    <a:srgbClr val="000000"/>
+                  </a:solidFill>
+                  <a:latin typeface="Dubai" panose="020B0503030403030204" pitchFamily="34" charset="-78"/>
+                  <a:ea typeface="Microsoft Himalaya" panose="01010100010101010101" pitchFamily="2" charset="0"/>
+                  <a:cs typeface="Dubai" panose="020B0503030403030204" pitchFamily="34" charset="-78"/>
+                </a:rPr>
+                <a:t>::</a:t>
+              </a:r>
+              <a:r>
+                <a:rPr lang="en-US" altLang="zh-CN" sz="1200" dirty="0" err="1">
+                  <a:solidFill>
+                    <a:srgbClr val="000000"/>
+                  </a:solidFill>
+                  <a:latin typeface="Dubai" panose="020B0503030403030204" pitchFamily="34" charset="-78"/>
+                  <a:ea typeface="Microsoft Himalaya" panose="01010100010101010101" pitchFamily="2" charset="0"/>
+                  <a:cs typeface="Dubai" panose="020B0503030403030204" pitchFamily="34" charset="-78"/>
+                </a:rPr>
+                <a:t>make_ref</a:t>
+              </a:r>
+              <a:r>
+                <a:rPr lang="en-US" altLang="zh-CN" sz="1200" dirty="0">
+                  <a:solidFill>
+                    <a:srgbClr val="000000"/>
+                  </a:solidFill>
+                  <a:latin typeface="Dubai" panose="020B0503030403030204" pitchFamily="34" charset="-78"/>
+                  <a:ea typeface="Microsoft Himalaya" panose="01010100010101010101" pitchFamily="2" charset="0"/>
+                  <a:cs typeface="Dubai" panose="020B0503030403030204" pitchFamily="34" charset="-78"/>
+                </a:rPr>
+                <a:t>&lt;</a:t>
+              </a:r>
+              <a:r>
+                <a:rPr lang="en-US" altLang="zh-CN" sz="1200" dirty="0">
+                  <a:solidFill>
+                    <a:srgbClr val="2B91AF"/>
+                  </a:solidFill>
+                  <a:latin typeface="Dubai" panose="020B0503030403030204" pitchFamily="34" charset="-78"/>
+                  <a:ea typeface="Microsoft Himalaya" panose="01010100010101010101" pitchFamily="2" charset="0"/>
+                  <a:cs typeface="Dubai" panose="020B0503030403030204" pitchFamily="34" charset="-78"/>
+                </a:rPr>
+                <a:t>Ping</a:t>
+              </a:r>
+              <a:r>
+                <a:rPr lang="en-US" altLang="zh-CN" sz="1200" dirty="0">
+                  <a:solidFill>
+                    <a:srgbClr val="000000"/>
+                  </a:solidFill>
+                  <a:latin typeface="Dubai" panose="020B0503030403030204" pitchFamily="34" charset="-78"/>
+                  <a:ea typeface="Microsoft Himalaya" panose="01010100010101010101" pitchFamily="2" charset="0"/>
+                  <a:cs typeface="Dubai" panose="020B0503030403030204" pitchFamily="34" charset="-78"/>
+                </a:rPr>
+                <a:t>&gt;());</a:t>
+              </a:r>
+            </a:p>
+            <a:p>
+              <a:r>
+                <a:rPr lang="en-US" altLang="zh-CN" sz="1200" dirty="0">
+                  <a:solidFill>
+                    <a:srgbClr val="000000"/>
+                  </a:solidFill>
+                  <a:latin typeface="Dubai" panose="020B0503030403030204" pitchFamily="34" charset="-78"/>
+                  <a:ea typeface="Microsoft Himalaya" panose="01010100010101010101" pitchFamily="2" charset="0"/>
+                  <a:cs typeface="Dubai" panose="020B0503030403030204" pitchFamily="34" charset="-78"/>
+                </a:rPr>
+                <a:t>});</a:t>
+              </a:r>
+              <a:endParaRPr lang="zh-CN" altLang="en-US" sz="1200" dirty="0">
+                <a:latin typeface="Microsoft Himalaya" panose="01010100010101010101" pitchFamily="2" charset="0"/>
+                <a:cs typeface="Microsoft Himalaya" panose="01010100010101010101" pitchFamily="2" charset="0"/>
+              </a:endParaRPr>
+            </a:p>
+          </p:txBody>
+        </p:sp>
+        <p:sp>
+          <p:nvSpPr>
+            <p:cNvPr id="8" name="TextBox 7">
+              <a:extLst>
+                <a:ext uri="{FF2B5EF4-FFF2-40B4-BE49-F238E27FC236}">
+                  <a16:creationId xmlns:a16="http://schemas.microsoft.com/office/drawing/2014/main" id="{29FCAB2B-B95B-4EFB-990D-ED1E846E0D32}"/>
+                </a:ext>
+              </a:extLst>
+            </p:cNvPr>
+            <p:cNvSpPr txBox="1"/>
+            <p:nvPr/>
+          </p:nvSpPr>
+          <p:spPr>
+            <a:xfrm rot="854291">
+              <a:off x="7400574" y="3546648"/>
+              <a:ext cx="623380" cy="307905"/>
+            </a:xfrm>
+            <a:prstGeom prst="rect">
+              <a:avLst/>
+            </a:prstGeom>
+            <a:noFill/>
+          </p:spPr>
+          <p:txBody>
+            <a:bodyPr wrap="square" rtlCol="0">
+              <a:spAutoFit/>
+            </a:bodyPr>
+            <a:lstStyle/>
+            <a:p>
+              <a:r>
+                <a:rPr lang="en-US" altLang="zh-CN" sz="1401" dirty="0">
+                  <a:solidFill>
+                    <a:srgbClr val="FF0000"/>
+                  </a:solidFill>
+                </a:rPr>
+                <a:t>Net+</a:t>
+              </a:r>
+              <a:endParaRPr lang="zh-CN" altLang="en-US" sz="1401" dirty="0">
+                <a:solidFill>
+                  <a:srgbClr val="FF0000"/>
+                </a:solidFill>
+              </a:endParaRPr>
+            </a:p>
+          </p:txBody>
+        </p:sp>
+        <p:sp>
+          <p:nvSpPr>
+            <p:cNvPr id="9" name="TextBox 8">
+              <a:extLst>
+                <a:ext uri="{FF2B5EF4-FFF2-40B4-BE49-F238E27FC236}">
+                  <a16:creationId xmlns:a16="http://schemas.microsoft.com/office/drawing/2014/main" id="{27682DDC-8CFC-4F26-A10E-91A3B697210B}"/>
+                </a:ext>
+              </a:extLst>
+            </p:cNvPr>
+            <p:cNvSpPr txBox="1"/>
+            <p:nvPr/>
+          </p:nvSpPr>
+          <p:spPr>
+            <a:xfrm rot="19560390">
+              <a:off x="8704630" y="3262742"/>
+              <a:ext cx="949417" cy="369460"/>
+            </a:xfrm>
+            <a:prstGeom prst="rect">
+              <a:avLst/>
+            </a:prstGeom>
+            <a:noFill/>
+          </p:spPr>
+          <p:txBody>
+            <a:bodyPr wrap="square" rtlCol="0">
+              <a:spAutoFit/>
+            </a:bodyPr>
+            <a:lstStyle/>
+            <a:p>
+              <a:r>
+                <a:rPr lang="en-US" altLang="zh-CN" sz="1801" dirty="0" err="1">
+                  <a:solidFill>
+                    <a:srgbClr val="FF0000"/>
+                  </a:solidFill>
+                </a:rPr>
+                <a:t>Netplus</a:t>
+              </a:r>
+              <a:endParaRPr lang="zh-CN" altLang="en-US" sz="1801" dirty="0">
+                <a:solidFill>
+                  <a:srgbClr val="FF0000"/>
+                </a:solidFill>
+              </a:endParaRPr>
+            </a:p>
+          </p:txBody>
+        </p:sp>
+        <p:sp>
+          <p:nvSpPr>
+            <p:cNvPr id="10" name="TextBox 9">
+              <a:extLst>
+                <a:ext uri="{FF2B5EF4-FFF2-40B4-BE49-F238E27FC236}">
+                  <a16:creationId xmlns:a16="http://schemas.microsoft.com/office/drawing/2014/main" id="{2898F0C1-664B-4526-9EE0-EB5FA3DFD73F}"/>
+                </a:ext>
+              </a:extLst>
+            </p:cNvPr>
+            <p:cNvSpPr txBox="1"/>
+            <p:nvPr/>
+          </p:nvSpPr>
+          <p:spPr>
+            <a:xfrm rot="17834874">
+              <a:off x="9446586" y="2520461"/>
+              <a:ext cx="699230" cy="368883"/>
+            </a:xfrm>
+            <a:prstGeom prst="rect">
+              <a:avLst/>
+            </a:prstGeom>
+            <a:noFill/>
+          </p:spPr>
+          <p:txBody>
+            <a:bodyPr wrap="none" rtlCol="0">
+              <a:spAutoFit/>
+            </a:bodyPr>
+            <a:lstStyle/>
+            <a:p>
+              <a:r>
+                <a:rPr lang="en-US" altLang="zh-CN" sz="1801" dirty="0">
+                  <a:solidFill>
+                    <a:srgbClr val="FF0000"/>
+                  </a:solidFill>
+                </a:rPr>
+                <a:t>Net+</a:t>
+              </a:r>
+              <a:endParaRPr lang="zh-CN" altLang="en-US" sz="1801" dirty="0">
+                <a:solidFill>
+                  <a:srgbClr val="FF0000"/>
+                </a:solidFill>
+              </a:endParaRPr>
+            </a:p>
+          </p:txBody>
+        </p:sp>
+        <p:pic>
+          <p:nvPicPr>
+            <p:cNvPr id="11" name="Graphic 10" descr="Treble clef">
+              <a:extLst>
+                <a:ext uri="{FF2B5EF4-FFF2-40B4-BE49-F238E27FC236}">
+                  <a16:creationId xmlns:a16="http://schemas.microsoft.com/office/drawing/2014/main" id="{03093BCB-6652-4894-9D3B-2AC6A9BFACB5}"/>
+                </a:ext>
+              </a:extLst>
+            </p:cNvPr>
+            <p:cNvPicPr>
+              <a:picLocks noChangeAspect="1"/>
+            </p:cNvPicPr>
+            <p:nvPr/>
+          </p:nvPicPr>
+          <p:blipFill>
+            <a:blip r:embed="rId3">
+              <a:extLst>
+                <a:ext uri="{28A0092B-C50C-407E-A947-70E740481C1C}">
+                  <a14:useLocalDpi xmlns:a14="http://schemas.microsoft.com/office/drawing/2010/main" val="0"/>
+                </a:ext>
+                <a:ext uri="{96DAC541-7B7A-43D3-8B79-37D633B846F1}">
+                  <asvg:svgBlip xmlns:asvg="http://schemas.microsoft.com/office/drawing/2016/SVG/main" r:embed="rId4"/>
+                </a:ext>
+              </a:extLst>
+            </a:blip>
+            <a:stretch>
+              <a:fillRect/>
+            </a:stretch>
+          </p:blipFill>
+          <p:spPr>
+            <a:xfrm rot="682169">
+              <a:off x="8045047" y="3682208"/>
+              <a:ext cx="234189" cy="234555"/>
+            </a:xfrm>
+            <a:prstGeom prst="rect">
+              <a:avLst/>
+            </a:prstGeom>
+          </p:spPr>
+        </p:pic>
+        <p:pic>
+          <p:nvPicPr>
+            <p:cNvPr id="12" name="Graphic 11" descr="Music">
+              <a:extLst>
+                <a:ext uri="{FF2B5EF4-FFF2-40B4-BE49-F238E27FC236}">
+                  <a16:creationId xmlns:a16="http://schemas.microsoft.com/office/drawing/2014/main" id="{2F3EDB14-AC3A-46FE-BDC8-CAF048A52118}"/>
+                </a:ext>
+              </a:extLst>
+            </p:cNvPr>
+            <p:cNvPicPr>
+              <a:picLocks noChangeAspect="1"/>
+            </p:cNvPicPr>
+            <p:nvPr/>
+          </p:nvPicPr>
+          <p:blipFill>
+            <a:blip r:embed="rId5">
+              <a:extLst>
+                <a:ext uri="{28A0092B-C50C-407E-A947-70E740481C1C}">
+                  <a14:useLocalDpi xmlns:a14="http://schemas.microsoft.com/office/drawing/2010/main" val="0"/>
+                </a:ext>
+                <a:ext uri="{96DAC541-7B7A-43D3-8B79-37D633B846F1}">
+                  <asvg:svgBlip xmlns:asvg="http://schemas.microsoft.com/office/drawing/2016/SVG/main" r:embed="rId6"/>
+                </a:ext>
+              </a:extLst>
+            </a:blip>
+            <a:stretch>
+              <a:fillRect/>
+            </a:stretch>
+          </p:blipFill>
+          <p:spPr>
+            <a:xfrm>
+              <a:off x="8223864" y="3739452"/>
+              <a:ext cx="168317" cy="168580"/>
+            </a:xfrm>
+            <a:prstGeom prst="rect">
+              <a:avLst/>
+            </a:prstGeom>
+          </p:spPr>
+        </p:pic>
+        <p:pic>
+          <p:nvPicPr>
+            <p:cNvPr id="13" name="Graphic 12" descr="Music">
+              <a:extLst>
+                <a:ext uri="{FF2B5EF4-FFF2-40B4-BE49-F238E27FC236}">
+                  <a16:creationId xmlns:a16="http://schemas.microsoft.com/office/drawing/2014/main" id="{61A99675-F474-42DD-8DB9-D584F32A1379}"/>
+                </a:ext>
+              </a:extLst>
+            </p:cNvPr>
+            <p:cNvPicPr>
+              <a:picLocks noChangeAspect="1"/>
+            </p:cNvPicPr>
+            <p:nvPr/>
+          </p:nvPicPr>
+          <p:blipFill>
+            <a:blip r:embed="rId5">
+              <a:extLst>
+                <a:ext uri="{28A0092B-C50C-407E-A947-70E740481C1C}">
+                  <a14:useLocalDpi xmlns:a14="http://schemas.microsoft.com/office/drawing/2010/main" val="0"/>
+                </a:ext>
+                <a:ext uri="{96DAC541-7B7A-43D3-8B79-37D633B846F1}">
+                  <asvg:svgBlip xmlns:asvg="http://schemas.microsoft.com/office/drawing/2016/SVG/main" r:embed="rId6"/>
+                </a:ext>
+              </a:extLst>
+            </a:blip>
+            <a:stretch>
+              <a:fillRect/>
+            </a:stretch>
+          </p:blipFill>
+          <p:spPr>
+            <a:xfrm>
+              <a:off x="9951927" y="2127396"/>
+              <a:ext cx="168317" cy="168580"/>
+            </a:xfrm>
+            <a:prstGeom prst="rect">
+              <a:avLst/>
+            </a:prstGeom>
+          </p:spPr>
+        </p:pic>
+        <p:pic>
+          <p:nvPicPr>
+            <p:cNvPr id="14" name="Graphic 13" descr="Treble clef">
+              <a:extLst>
+                <a:ext uri="{FF2B5EF4-FFF2-40B4-BE49-F238E27FC236}">
+                  <a16:creationId xmlns:a16="http://schemas.microsoft.com/office/drawing/2014/main" id="{91AF4558-2813-472A-B284-CC544A44472D}"/>
+                </a:ext>
+              </a:extLst>
+            </p:cNvPr>
+            <p:cNvPicPr>
+              <a:picLocks noChangeAspect="1"/>
+            </p:cNvPicPr>
+            <p:nvPr/>
+          </p:nvPicPr>
+          <p:blipFill>
+            <a:blip r:embed="rId3">
+              <a:extLst>
+                <a:ext uri="{28A0092B-C50C-407E-A947-70E740481C1C}">
+                  <a14:useLocalDpi xmlns:a14="http://schemas.microsoft.com/office/drawing/2010/main" val="0"/>
+                </a:ext>
+                <a:ext uri="{96DAC541-7B7A-43D3-8B79-37D633B846F1}">
+                  <asvg:svgBlip xmlns:asvg="http://schemas.microsoft.com/office/drawing/2016/SVG/main" r:embed="rId4"/>
+                </a:ext>
+              </a:extLst>
+            </a:blip>
+            <a:stretch>
+              <a:fillRect/>
+            </a:stretch>
+          </p:blipFill>
+          <p:spPr>
+            <a:xfrm rot="682169">
+              <a:off x="9767611" y="2078036"/>
+              <a:ext cx="234189" cy="234555"/>
+            </a:xfrm>
+            <a:prstGeom prst="rect">
+              <a:avLst/>
+            </a:prstGeom>
+          </p:spPr>
+        </p:pic>
+        <p:sp>
+          <p:nvSpPr>
+            <p:cNvPr id="15" name="TextBox 14">
+              <a:extLst>
+                <a:ext uri="{FF2B5EF4-FFF2-40B4-BE49-F238E27FC236}">
+                  <a16:creationId xmlns:a16="http://schemas.microsoft.com/office/drawing/2014/main" id="{E44FAD44-5B54-4604-A92D-BA7977A0E5BC}"/>
+                </a:ext>
+              </a:extLst>
+            </p:cNvPr>
+            <p:cNvSpPr txBox="1"/>
+            <p:nvPr/>
+          </p:nvSpPr>
+          <p:spPr>
+            <a:xfrm rot="20380695">
+              <a:off x="5686940" y="4645736"/>
+              <a:ext cx="4654632" cy="246221"/>
+            </a:xfrm>
+            <a:prstGeom prst="rect">
+              <a:avLst/>
+            </a:prstGeom>
+            <a:noFill/>
+          </p:spPr>
+          <p:txBody>
+            <a:bodyPr wrap="square" rtlCol="0">
+              <a:spAutoFit/>
+            </a:bodyPr>
+            <a:lstStyle/>
+            <a:p>
+              <a:r>
+                <a:rPr lang="en-US" altLang="zh-CN" sz="1000" dirty="0">
+                  <a:solidFill>
+                    <a:srgbClr val="6F008A"/>
+                  </a:solidFill>
+                  <a:latin typeface="Dubai" panose="020B0503030403030204" pitchFamily="34" charset="-78"/>
+                  <a:ea typeface="Microsoft Himalaya" panose="01010100010101010101" pitchFamily="2" charset="0"/>
+                  <a:cs typeface="Dubai" panose="020B0503030403030204" pitchFamily="34" charset="-78"/>
+                </a:rPr>
+                <a:t>NRP</a:t>
+              </a:r>
+              <a:r>
+                <a:rPr lang="en-US" altLang="zh-CN" sz="1000" dirty="0">
+                  <a:solidFill>
+                    <a:srgbClr val="000000"/>
+                  </a:solidFill>
+                  <a:latin typeface="Dubai" panose="020B0503030403030204" pitchFamily="34" charset="-78"/>
+                  <a:ea typeface="Microsoft Himalaya" panose="01010100010101010101" pitchFamily="2" charset="0"/>
+                  <a:cs typeface="Dubai" panose="020B0503030403030204" pitchFamily="34" charset="-78"/>
+                </a:rPr>
+                <a:t>&lt;</a:t>
+              </a:r>
+              <a:r>
+                <a:rPr lang="en-US" altLang="zh-CN" sz="1000" dirty="0" err="1">
+                  <a:solidFill>
+                    <a:srgbClr val="000000"/>
+                  </a:solidFill>
+                  <a:latin typeface="Dubai" panose="020B0503030403030204" pitchFamily="34" charset="-78"/>
+                  <a:ea typeface="Microsoft Himalaya" panose="01010100010101010101" pitchFamily="2" charset="0"/>
+                  <a:cs typeface="Dubai" panose="020B0503030403030204" pitchFamily="34" charset="-78"/>
+                </a:rPr>
+                <a:t>netp</a:t>
+              </a:r>
+              <a:r>
+                <a:rPr lang="en-US" altLang="zh-CN" sz="1000" dirty="0">
+                  <a:solidFill>
+                    <a:srgbClr val="000000"/>
+                  </a:solidFill>
+                  <a:latin typeface="Dubai" panose="020B0503030403030204" pitchFamily="34" charset="-78"/>
+                  <a:ea typeface="Microsoft Himalaya" panose="01010100010101010101" pitchFamily="2" charset="0"/>
+                  <a:cs typeface="Dubai" panose="020B0503030403030204" pitchFamily="34" charset="-78"/>
+                </a:rPr>
+                <a:t>::http::</a:t>
+              </a:r>
+              <a:r>
+                <a:rPr lang="en-US" altLang="zh-CN" sz="1000" dirty="0" err="1">
+                  <a:solidFill>
+                    <a:srgbClr val="2B91AF"/>
+                  </a:solidFill>
+                  <a:latin typeface="Dubai" panose="020B0503030403030204" pitchFamily="34" charset="-78"/>
+                  <a:ea typeface="Microsoft Himalaya" panose="01010100010101010101" pitchFamily="2" charset="0"/>
+                  <a:cs typeface="Dubai" panose="020B0503030403030204" pitchFamily="34" charset="-78"/>
+                </a:rPr>
+                <a:t>request_promise</a:t>
+              </a:r>
+              <a:r>
+                <a:rPr lang="en-US" altLang="zh-CN" sz="1000" dirty="0">
+                  <a:solidFill>
+                    <a:srgbClr val="000000"/>
+                  </a:solidFill>
+                  <a:latin typeface="Dubai" panose="020B0503030403030204" pitchFamily="34" charset="-78"/>
+                  <a:ea typeface="Microsoft Himalaya" panose="01010100010101010101" pitchFamily="2" charset="0"/>
+                  <a:cs typeface="Dubai" panose="020B0503030403030204" pitchFamily="34" charset="-78"/>
+                </a:rPr>
+                <a:t>&gt; </a:t>
+              </a:r>
+              <a:r>
+                <a:rPr lang="en-US" altLang="zh-CN" sz="1000" dirty="0" err="1">
+                  <a:solidFill>
+                    <a:srgbClr val="000000"/>
+                  </a:solidFill>
+                  <a:latin typeface="Dubai" panose="020B0503030403030204" pitchFamily="34" charset="-78"/>
+                  <a:ea typeface="Microsoft Himalaya" panose="01010100010101010101" pitchFamily="2" charset="0"/>
+                  <a:cs typeface="Dubai" panose="020B0503030403030204" pitchFamily="34" charset="-78"/>
+                </a:rPr>
+                <a:t>http_request_p</a:t>
+              </a:r>
+              <a:r>
+                <a:rPr lang="en-US" altLang="zh-CN" sz="1000" dirty="0">
+                  <a:solidFill>
+                    <a:srgbClr val="000000"/>
+                  </a:solidFill>
+                  <a:latin typeface="Dubai" panose="020B0503030403030204" pitchFamily="34" charset="-78"/>
+                  <a:ea typeface="Microsoft Himalaya" panose="01010100010101010101" pitchFamily="2" charset="0"/>
+                  <a:cs typeface="Dubai" panose="020B0503030403030204" pitchFamily="34" charset="-78"/>
+                </a:rPr>
+                <a:t> = </a:t>
+              </a:r>
+              <a:r>
+                <a:rPr lang="en-US" altLang="zh-CN" sz="1000" dirty="0" err="1">
+                  <a:solidFill>
+                    <a:srgbClr val="000000"/>
+                  </a:solidFill>
+                  <a:latin typeface="Dubai" panose="020B0503030403030204" pitchFamily="34" charset="-78"/>
+                  <a:ea typeface="Microsoft Himalaya" panose="01010100010101010101" pitchFamily="2" charset="0"/>
+                  <a:cs typeface="Dubai" panose="020B0503030403030204" pitchFamily="34" charset="-78"/>
+                </a:rPr>
+                <a:t>netp</a:t>
+              </a:r>
+              <a:r>
+                <a:rPr lang="en-US" altLang="zh-CN" sz="1000" dirty="0">
+                  <a:solidFill>
+                    <a:srgbClr val="000000"/>
+                  </a:solidFill>
+                  <a:latin typeface="Dubai" panose="020B0503030403030204" pitchFamily="34" charset="-78"/>
+                  <a:ea typeface="Microsoft Himalaya" panose="01010100010101010101" pitchFamily="2" charset="0"/>
+                  <a:cs typeface="Dubai" panose="020B0503030403030204" pitchFamily="34" charset="-78"/>
+                </a:rPr>
+                <a:t>::http::get(</a:t>
+              </a:r>
+              <a:r>
+                <a:rPr lang="en-US" altLang="zh-CN" sz="1000" dirty="0">
+                  <a:solidFill>
+                    <a:srgbClr val="A31515"/>
+                  </a:solidFill>
+                  <a:latin typeface="Dubai" panose="020B0503030403030204" pitchFamily="34" charset="-78"/>
+                  <a:ea typeface="Microsoft Himalaya" panose="01010100010101010101" pitchFamily="2" charset="0"/>
+                  <a:cs typeface="Dubai" panose="020B0503030403030204" pitchFamily="34" charset="-78"/>
+                </a:rPr>
+                <a:t>"http://x.cn:80"</a:t>
+              </a:r>
+              <a:r>
+                <a:rPr lang="en-US" altLang="zh-CN" sz="1000" dirty="0">
+                  <a:solidFill>
+                    <a:srgbClr val="000000"/>
+                  </a:solidFill>
+                  <a:latin typeface="Dubai" panose="020B0503030403030204" pitchFamily="34" charset="-78"/>
+                  <a:ea typeface="Microsoft Himalaya" panose="01010100010101010101" pitchFamily="2" charset="0"/>
+                  <a:cs typeface="Dubai" panose="020B0503030403030204" pitchFamily="34" charset="-78"/>
+                </a:rPr>
+                <a:t>);</a:t>
+              </a:r>
+            </a:p>
+          </p:txBody>
+        </p:sp>
+        <p:sp>
+          <p:nvSpPr>
+            <p:cNvPr id="16" name="TextBox 15">
+              <a:extLst>
+                <a:ext uri="{FF2B5EF4-FFF2-40B4-BE49-F238E27FC236}">
+                  <a16:creationId xmlns:a16="http://schemas.microsoft.com/office/drawing/2014/main" id="{9B48228C-BB99-4B47-9A3F-144503AF1DEE}"/>
+                </a:ext>
+              </a:extLst>
+            </p:cNvPr>
+            <p:cNvSpPr txBox="1"/>
+            <p:nvPr/>
+          </p:nvSpPr>
+          <p:spPr>
+            <a:xfrm>
+              <a:off x="7481983" y="280080"/>
+              <a:ext cx="2757486" cy="461665"/>
+            </a:xfrm>
+            <a:prstGeom prst="rect">
+              <a:avLst/>
+            </a:prstGeom>
+            <a:noFill/>
+          </p:spPr>
+          <p:txBody>
+            <a:bodyPr wrap="square" rtlCol="0">
+              <a:spAutoFit/>
+            </a:bodyPr>
+            <a:lstStyle/>
+            <a:p>
+              <a:r>
+                <a:rPr lang="en-US" altLang="zh-CN" sz="1200" dirty="0">
+                  <a:solidFill>
+                    <a:srgbClr val="FF0000"/>
+                  </a:solidFill>
+                </a:rPr>
+                <a:t>https://github.com/netplus/</a:t>
+              </a:r>
+            </a:p>
+            <a:p>
+              <a:r>
+                <a:rPr lang="en-US" altLang="zh-CN" sz="1200" dirty="0">
+                  <a:solidFill>
+                    <a:srgbClr val="FF0000"/>
+                  </a:solidFill>
+                </a:rPr>
+                <a:t>https://www.zhihu.com/people/netplus</a:t>
+              </a:r>
+              <a:endParaRPr lang="zh-CN" altLang="en-US" sz="1200" dirty="0">
+                <a:solidFill>
+                  <a:srgbClr val="FF0000"/>
+                </a:solidFill>
+              </a:endParaRPr>
+            </a:p>
+          </p:txBody>
+        </p:sp>
+      </p:grpSp>
+    </p:spTree>
+    <p:extLst>
+      <p:ext uri="{BB962C8B-B14F-4D97-AF65-F5344CB8AC3E}">
+        <p14:creationId xmlns:p14="http://schemas.microsoft.com/office/powerpoint/2010/main" val="3354518560"/>
       </p:ext>
     </p:extLst>
   </p:cSld>

</xml_diff>